<commit_message>
added content for implementations, specs
</commit_message>
<xml_diff>
--- a/resources/LangDev 2024 Talk.pptx
+++ b/resources/LangDev 2024 Talk.pptx
@@ -16,7 +16,7 @@
     <p:sldId id="301" r:id="rId7"/>
     <p:sldId id="302" r:id="rId8"/>
     <p:sldId id="303" r:id="rId9"/>
-    <p:sldId id="312" r:id="rId10"/>
+    <p:sldId id="330" r:id="rId10"/>
     <p:sldId id="313" r:id="rId11"/>
     <p:sldId id="304" r:id="rId12"/>
     <p:sldId id="305" r:id="rId13"/>
@@ -2865,12 +2865,12 @@
     <dgm:cxn modelId="{25BA2731-2CA3-A64C-8556-6E1E23B1C9B8}" type="presOf" srcId="{189425EE-D43E-294D-8B36-254B971B826A}" destId="{2319823D-AB26-544C-9C6D-CF510A6E0BE2}" srcOrd="0" destOrd="0" presId="urn:microsoft.com/office/officeart/2009/layout/CirclePictureHierarchy"/>
     <dgm:cxn modelId="{E46DA632-6AFE-3F40-A695-2210A0368B98}" type="presOf" srcId="{1F5579C1-214E-1F45-BBFE-2626B34C5F36}" destId="{18065C05-7756-6747-B5FD-BAD510BA0F81}" srcOrd="0" destOrd="0" presId="urn:microsoft.com/office/officeart/2009/layout/CirclePictureHierarchy"/>
     <dgm:cxn modelId="{FE6CB63D-1136-0F49-93BB-385DE2FD2B8E}" srcId="{2F00C97E-86D5-FB44-896C-689FCDC1B423}" destId="{FFCD8269-6359-0B47-B683-B39C21E9289F}" srcOrd="0" destOrd="0" parTransId="{0B93AAD1-11C9-8F4C-B3D6-6787A9A8BD2E}" sibTransId="{35CAE358-5E66-C64A-A808-2AF9E0F7AA94}"/>
+    <dgm:cxn modelId="{DF374D68-72D3-6547-9BBA-5BF892EE18D8}" type="presOf" srcId="{84A69D06-4DCA-B644-8933-369AE4F3E19B}" destId="{6B3386BD-CF2E-384B-BE09-BF57C1348A3B}" srcOrd="0" destOrd="0" presId="urn:microsoft.com/office/officeart/2009/layout/CirclePictureHierarchy"/>
+    <dgm:cxn modelId="{A2020D6E-8C1E-BB47-A738-072D16ABED0D}" type="presOf" srcId="{FFCD8269-6359-0B47-B683-B39C21E9289F}" destId="{F749A1ED-7DC7-7642-8B05-9AB36ED104A8}" srcOrd="0" destOrd="0" presId="urn:microsoft.com/office/officeart/2009/layout/CirclePictureHierarchy"/>
     <dgm:cxn modelId="{BBAD8D4E-C3BB-404E-8F7D-D68E55FC7D02}" type="presOf" srcId="{B51E94E8-5EBB-F140-A967-A9BAB466450A}" destId="{81290B24-1AEC-2440-AB9A-0CF3FB71623B}" srcOrd="0" destOrd="0" presId="urn:microsoft.com/office/officeart/2009/layout/CirclePictureHierarchy"/>
     <dgm:cxn modelId="{D3569455-BD10-0842-B6B1-7E3B6FFF394F}" type="presOf" srcId="{ECC3DEB8-0051-1147-847C-7DCC2DFAACFA}" destId="{B6331A6E-3FA1-D84A-AD41-2FD4EC05420E}" srcOrd="0" destOrd="0" presId="urn:microsoft.com/office/officeart/2009/layout/CirclePictureHierarchy"/>
     <dgm:cxn modelId="{368AD655-5653-FB4C-9C61-8D2114FDA1A0}" type="presOf" srcId="{82248127-34D8-824E-9AB2-807628697886}" destId="{9873AD2C-7B29-304E-AB8A-D1C524EFA026}" srcOrd="0" destOrd="0" presId="urn:microsoft.com/office/officeart/2009/layout/CirclePictureHierarchy"/>
     <dgm:cxn modelId="{3DE82459-51F7-FD4F-96CE-A1DD3F31D4BE}" type="presOf" srcId="{01101797-645F-384B-A269-7880D06CCAA2}" destId="{C1151D66-2E81-6243-93E9-06E11E58AAE2}" srcOrd="0" destOrd="0" presId="urn:microsoft.com/office/officeart/2009/layout/CirclePictureHierarchy"/>
-    <dgm:cxn modelId="{DF374D68-72D3-6547-9BBA-5BF892EE18D8}" type="presOf" srcId="{84A69D06-4DCA-B644-8933-369AE4F3E19B}" destId="{6B3386BD-CF2E-384B-BE09-BF57C1348A3B}" srcOrd="0" destOrd="0" presId="urn:microsoft.com/office/officeart/2009/layout/CirclePictureHierarchy"/>
-    <dgm:cxn modelId="{A2020D6E-8C1E-BB47-A738-072D16ABED0D}" type="presOf" srcId="{FFCD8269-6359-0B47-B683-B39C21E9289F}" destId="{F749A1ED-7DC7-7642-8B05-9AB36ED104A8}" srcOrd="0" destOrd="0" presId="urn:microsoft.com/office/officeart/2009/layout/CirclePictureHierarchy"/>
     <dgm:cxn modelId="{6615D97B-5F0B-1847-B2F7-7E552C21C7D7}" type="presOf" srcId="{2F00C97E-86D5-FB44-896C-689FCDC1B423}" destId="{F84B2064-2101-194A-A846-1CB18CDACF7A}" srcOrd="0" destOrd="0" presId="urn:microsoft.com/office/officeart/2009/layout/CirclePictureHierarchy"/>
     <dgm:cxn modelId="{2D306C88-2ABF-CE4F-A8E4-4A9C5FA754D5}" type="presOf" srcId="{38A29F5E-CDED-D54B-8DAF-2D4844B29446}" destId="{DF642858-1507-A945-87B3-0F4EABEE3323}" srcOrd="0" destOrd="0" presId="urn:microsoft.com/office/officeart/2009/layout/CirclePictureHierarchy"/>
     <dgm:cxn modelId="{5404648A-F59C-4741-98C9-06E0EBBEC599}" srcId="{FFCD8269-6359-0B47-B683-B39C21E9289F}" destId="{82248127-34D8-824E-9AB2-807628697886}" srcOrd="1" destOrd="0" parTransId="{E561224A-6CBA-BF40-8B37-C4256F3A6D00}" sibTransId="{B3D968AC-113C-DD42-AF76-07613FD75DD5}"/>
@@ -3284,10 +3284,10 @@
     <dgm:cxn modelId="{CDF33511-A81F-C847-A004-BFB2176AE406}" srcId="{FFCD8269-6359-0B47-B683-B39C21E9289F}" destId="{896AECA1-542B-5A4B-8317-777732D893D0}" srcOrd="1" destOrd="0" parTransId="{DAEBC619-7AED-5C43-9371-006DFC18CDE5}" sibTransId="{891D6C4C-AF1C-8D45-9C15-B8E13EEE7AA2}"/>
     <dgm:cxn modelId="{28E96B20-5EF5-A548-8A92-AF22968294B2}" type="presOf" srcId="{7E4E3A51-D450-C448-B7EE-CEB39CCB71A3}" destId="{850591A1-1303-FC40-8081-23D41A324AC2}" srcOrd="0" destOrd="0" presId="urn:microsoft.com/office/officeart/2009/layout/CirclePictureHierarchy"/>
     <dgm:cxn modelId="{FE6CB63D-1136-0F49-93BB-385DE2FD2B8E}" srcId="{01101797-645F-384B-A269-7880D06CCAA2}" destId="{FFCD8269-6359-0B47-B683-B39C21E9289F}" srcOrd="0" destOrd="0" parTransId="{0B93AAD1-11C9-8F4C-B3D6-6787A9A8BD2E}" sibTransId="{35CAE358-5E66-C64A-A808-2AF9E0F7AA94}"/>
+    <dgm:cxn modelId="{DF0FD55C-E3AC-D44B-BDC5-A94A01CF625E}" srcId="{FFCD8269-6359-0B47-B683-B39C21E9289F}" destId="{9F71DB2B-9F4A-E649-B85A-82E20F1FED66}" srcOrd="0" destOrd="0" parTransId="{7E4E3A51-D450-C448-B7EE-CEB39CCB71A3}" sibTransId="{D86D8590-4B76-3045-B3D2-E2495152121A}"/>
+    <dgm:cxn modelId="{DF374D68-72D3-6547-9BBA-5BF892EE18D8}" type="presOf" srcId="{84A69D06-4DCA-B644-8933-369AE4F3E19B}" destId="{6B3386BD-CF2E-384B-BE09-BF57C1348A3B}" srcOrd="0" destOrd="0" presId="urn:microsoft.com/office/officeart/2009/layout/CirclePictureHierarchy"/>
     <dgm:cxn modelId="{B15A6850-2C47-984A-85B6-DC16EC662E45}" type="presOf" srcId="{01101797-645F-384B-A269-7880D06CCAA2}" destId="{D80B5D43-A76A-AE4F-869E-FB43EB09E3A6}" srcOrd="0" destOrd="0" presId="urn:microsoft.com/office/officeart/2009/layout/CirclePictureHierarchy"/>
     <dgm:cxn modelId="{8FFA6555-FB04-974F-A7F4-1D16C54C56F2}" type="presOf" srcId="{0B93AAD1-11C9-8F4C-B3D6-6787A9A8BD2E}" destId="{4367957F-1173-EC44-89C3-8A2F56C4944E}" srcOrd="0" destOrd="0" presId="urn:microsoft.com/office/officeart/2009/layout/CirclePictureHierarchy"/>
-    <dgm:cxn modelId="{DF0FD55C-E3AC-D44B-BDC5-A94A01CF625E}" srcId="{FFCD8269-6359-0B47-B683-B39C21E9289F}" destId="{9F71DB2B-9F4A-E649-B85A-82E20F1FED66}" srcOrd="0" destOrd="0" parTransId="{7E4E3A51-D450-C448-B7EE-CEB39CCB71A3}" sibTransId="{D86D8590-4B76-3045-B3D2-E2495152121A}"/>
-    <dgm:cxn modelId="{DF374D68-72D3-6547-9BBA-5BF892EE18D8}" type="presOf" srcId="{84A69D06-4DCA-B644-8933-369AE4F3E19B}" destId="{6B3386BD-CF2E-384B-BE09-BF57C1348A3B}" srcOrd="0" destOrd="0" presId="urn:microsoft.com/office/officeart/2009/layout/CirclePictureHierarchy"/>
     <dgm:cxn modelId="{AEC2D47E-8B66-424B-B109-4BE913876A81}" type="presOf" srcId="{FFCD8269-6359-0B47-B683-B39C21E9289F}" destId="{A4677163-1942-2D4D-8F8F-3C02F6BE1D10}" srcOrd="0" destOrd="0" presId="urn:microsoft.com/office/officeart/2009/layout/CirclePictureHierarchy"/>
     <dgm:cxn modelId="{E7BDA18C-519D-1F49-948D-CE9CF91EDFA3}" srcId="{84A69D06-4DCA-B644-8933-369AE4F3E19B}" destId="{01101797-645F-384B-A269-7880D06CCAA2}" srcOrd="0" destOrd="0" parTransId="{ECC3DEB8-0051-1147-847C-7DCC2DFAACFA}" sibTransId="{5E905DE6-BC88-DC47-ABA7-F4887AC985AB}"/>
     <dgm:cxn modelId="{1778CE8F-6467-6B48-B650-D2485403A93E}" type="presOf" srcId="{F17ACAC4-312E-CF41-820D-9F98D1BE14F2}" destId="{B1D6D055-68FD-CF41-B8BC-1AB29ACF217B}" srcOrd="0" destOrd="0" presId="urn:microsoft.com/office/officeart/2009/layout/CirclePictureHierarchy"/>
@@ -3747,10 +3747,10 @@
     <dgm:cxn modelId="{CDF33511-A81F-C847-A004-BFB2176AE406}" srcId="{FFCD8269-6359-0B47-B683-B39C21E9289F}" destId="{896AECA1-542B-5A4B-8317-777732D893D0}" srcOrd="1" destOrd="0" parTransId="{DAEBC619-7AED-5C43-9371-006DFC18CDE5}" sibTransId="{891D6C4C-AF1C-8D45-9C15-B8E13EEE7AA2}"/>
     <dgm:cxn modelId="{5667E311-79AB-6746-8DF9-F994B64E432E}" type="presOf" srcId="{DAEBC619-7AED-5C43-9371-006DFC18CDE5}" destId="{ECD7DA7F-1489-2047-8B39-5D77EE2F619F}" srcOrd="0" destOrd="0" presId="urn:microsoft.com/office/officeart/2009/layout/CirclePictureHierarchy"/>
     <dgm:cxn modelId="{FE6CB63D-1136-0F49-93BB-385DE2FD2B8E}" srcId="{01101797-645F-384B-A269-7880D06CCAA2}" destId="{FFCD8269-6359-0B47-B683-B39C21E9289F}" srcOrd="0" destOrd="0" parTransId="{0B93AAD1-11C9-8F4C-B3D6-6787A9A8BD2E}" sibTransId="{35CAE358-5E66-C64A-A808-2AF9E0F7AA94}"/>
+    <dgm:cxn modelId="{DF0FD55C-E3AC-D44B-BDC5-A94A01CF625E}" srcId="{FFCD8269-6359-0B47-B683-B39C21E9289F}" destId="{9F71DB2B-9F4A-E649-B85A-82E20F1FED66}" srcOrd="0" destOrd="0" parTransId="{7E4E3A51-D450-C448-B7EE-CEB39CCB71A3}" sibTransId="{D86D8590-4B76-3045-B3D2-E2495152121A}"/>
     <dgm:cxn modelId="{B2724344-941B-324F-83F9-DFDABD18A837}" srcId="{01101797-645F-384B-A269-7880D06CCAA2}" destId="{076BAFA0-A3A5-C84B-9240-69BBC15267CF}" srcOrd="1" destOrd="0" parTransId="{386E37EA-0902-2840-8961-F751C9D65ECB}" sibTransId="{E20053DF-E82A-6F4B-9CB8-F024A3171C16}"/>
+    <dgm:cxn modelId="{DF374D68-72D3-6547-9BBA-5BF892EE18D8}" type="presOf" srcId="{84A69D06-4DCA-B644-8933-369AE4F3E19B}" destId="{6B3386BD-CF2E-384B-BE09-BF57C1348A3B}" srcOrd="0" destOrd="0" presId="urn:microsoft.com/office/officeart/2009/layout/CirclePictureHierarchy"/>
     <dgm:cxn modelId="{46E0EC56-97DD-1B4B-9923-DC8E0AE4AF90}" type="presOf" srcId="{0B93AAD1-11C9-8F4C-B3D6-6787A9A8BD2E}" destId="{1700B9FF-875C-AE49-ABE8-38182680A9D1}" srcOrd="0" destOrd="0" presId="urn:microsoft.com/office/officeart/2009/layout/CirclePictureHierarchy"/>
-    <dgm:cxn modelId="{DF0FD55C-E3AC-D44B-BDC5-A94A01CF625E}" srcId="{FFCD8269-6359-0B47-B683-B39C21E9289F}" destId="{9F71DB2B-9F4A-E649-B85A-82E20F1FED66}" srcOrd="0" destOrd="0" parTransId="{7E4E3A51-D450-C448-B7EE-CEB39CCB71A3}" sibTransId="{D86D8590-4B76-3045-B3D2-E2495152121A}"/>
-    <dgm:cxn modelId="{DF374D68-72D3-6547-9BBA-5BF892EE18D8}" type="presOf" srcId="{84A69D06-4DCA-B644-8933-369AE4F3E19B}" destId="{6B3386BD-CF2E-384B-BE09-BF57C1348A3B}" srcOrd="0" destOrd="0" presId="urn:microsoft.com/office/officeart/2009/layout/CirclePictureHierarchy"/>
     <dgm:cxn modelId="{7922CF7A-8D23-4F41-894A-977297009C08}" type="presOf" srcId="{076BAFA0-A3A5-C84B-9240-69BBC15267CF}" destId="{4C45DB5F-E5E5-E646-B43C-725EC0AE9E11}" srcOrd="0" destOrd="0" presId="urn:microsoft.com/office/officeart/2009/layout/CirclePictureHierarchy"/>
     <dgm:cxn modelId="{1DDB957C-7F49-A740-9D6F-4AE07860148B}" type="presOf" srcId="{01101797-645F-384B-A269-7880D06CCAA2}" destId="{AB5C572F-235E-B346-8D49-E9F3A52A6F24}" srcOrd="0" destOrd="0" presId="urn:microsoft.com/office/officeart/2009/layout/CirclePictureHierarchy"/>
     <dgm:cxn modelId="{B8C0187D-B130-F54D-9291-657E1A321C2F}" type="presOf" srcId="{7E4E3A51-D450-C448-B7EE-CEB39CCB71A3}" destId="{165D8681-4E1B-DD4D-9473-5C58DCEFB122}" srcOrd="0" destOrd="0" presId="urn:microsoft.com/office/officeart/2009/layout/CirclePictureHierarchy"/>
@@ -15473,10 +15473,9 @@
           <a:lstStyle/>
           <a:p>
             <a:r>
-              <a:rPr lang="en-US"/>
+              <a:rPr lang="en-US" dirty="0"/>
               <a:t>LionWeb: Status Update</a:t>
             </a:r>
-            <a:endParaRPr lang="en-US" dirty="0"/>
           </a:p>
         </p:txBody>
       </p:sp>
@@ -15516,13 +15515,8 @@
           <a:p>
             <a:r>
               <a:rPr lang="en-US" dirty="0"/>
-              <a:t>Jos Warmer, Niko </a:t>
+              <a:t>Jos Warmer, Niko Stotz</a:t>
             </a:r>
-            <a:r>
-              <a:rPr lang="en-US" dirty="0" err="1"/>
-              <a:t>Stotz</a:t>
-            </a:r>
-            <a:endParaRPr lang="en-US" dirty="0"/>
           </a:p>
         </p:txBody>
       </p:sp>
@@ -15540,8 +15534,8 @@
         </p:nvGrpSpPr>
         <p:grpSpPr>
           <a:xfrm>
-            <a:off x="5434091" y="3429000"/>
-            <a:ext cx="1323818" cy="1329191"/>
+            <a:off x="4587790" y="1566981"/>
+            <a:ext cx="3016419" cy="3028662"/>
             <a:chOff x="4690787" y="1999494"/>
             <a:chExt cx="2826698" cy="2838171"/>
           </a:xfrm>
@@ -15651,7 +15645,7 @@
                 </a:bodyPr>
                 <a:lstStyle/>
                 <a:p>
-                  <a:endParaRPr sz="2400">
+                  <a:endParaRPr sz="2400" dirty="0">
                     <a:solidFill>
                       <a:srgbClr val="000000"/>
                     </a:solidFill>
@@ -15728,7 +15722,7 @@
                 </a:bodyPr>
                 <a:lstStyle/>
                 <a:p>
-                  <a:endParaRPr sz="2400">
+                  <a:endParaRPr sz="2400" dirty="0">
                     <a:solidFill>
                       <a:srgbClr val="000000"/>
                     </a:solidFill>
@@ -15805,7 +15799,7 @@
                 </a:bodyPr>
                 <a:lstStyle/>
                 <a:p>
-                  <a:endParaRPr sz="2400">
+                  <a:endParaRPr sz="2400" dirty="0">
                     <a:solidFill>
                       <a:srgbClr val="000000"/>
                     </a:solidFill>
@@ -15882,7 +15876,7 @@
                 </a:bodyPr>
                 <a:lstStyle/>
                 <a:p>
-                  <a:endParaRPr sz="2400">
+                  <a:endParaRPr sz="2400" dirty="0">
                     <a:solidFill>
                       <a:srgbClr val="000000"/>
                     </a:solidFill>
@@ -15959,7 +15953,7 @@
                 </a:bodyPr>
                 <a:lstStyle/>
                 <a:p>
-                  <a:endParaRPr sz="2400">
+                  <a:endParaRPr sz="2400" dirty="0">
                     <a:solidFill>
                       <a:srgbClr val="000000"/>
                     </a:solidFill>
@@ -16036,7 +16030,7 @@
                 </a:bodyPr>
                 <a:lstStyle/>
                 <a:p>
-                  <a:endParaRPr sz="2400">
+                  <a:endParaRPr sz="2400" dirty="0">
                     <a:solidFill>
                       <a:srgbClr val="000000"/>
                     </a:solidFill>
@@ -16120,7 +16114,7 @@
                 </a:bodyPr>
                 <a:lstStyle/>
                 <a:p>
-                  <a:endParaRPr sz="2400">
+                  <a:endParaRPr sz="2400" dirty="0">
                     <a:solidFill>
                       <a:srgbClr val="000000"/>
                     </a:solidFill>
@@ -16183,7 +16177,7 @@
                 </a:bodyPr>
                 <a:lstStyle/>
                 <a:p>
-                  <a:endParaRPr sz="2400">
+                  <a:endParaRPr sz="2400" dirty="0">
                     <a:solidFill>
                       <a:srgbClr val="000000"/>
                     </a:solidFill>
@@ -16246,7 +16240,7 @@
                 </a:bodyPr>
                 <a:lstStyle/>
                 <a:p>
-                  <a:endParaRPr sz="2400">
+                  <a:endParaRPr sz="2400" dirty="0">
                     <a:solidFill>
                       <a:srgbClr val="000000"/>
                     </a:solidFill>
@@ -16309,7 +16303,7 @@
                 </a:bodyPr>
                 <a:lstStyle/>
                 <a:p>
-                  <a:endParaRPr sz="2400">
+                  <a:endParaRPr sz="2400" dirty="0">
                     <a:solidFill>
                       <a:srgbClr val="000000"/>
                     </a:solidFill>
@@ -16372,7 +16366,7 @@
                 </a:bodyPr>
                 <a:lstStyle/>
                 <a:p>
-                  <a:endParaRPr sz="2400">
+                  <a:endParaRPr sz="2400" dirty="0">
                     <a:solidFill>
                       <a:srgbClr val="000000"/>
                     </a:solidFill>
@@ -16486,7 +16480,7 @@
                 </a:bodyPr>
                 <a:lstStyle/>
                 <a:p>
-                  <a:endParaRPr sz="2400">
+                  <a:endParaRPr sz="2400" dirty="0">
                     <a:solidFill>
                       <a:srgbClr val="000000"/>
                     </a:solidFill>
@@ -16574,7 +16568,7 @@
                 </a:bodyPr>
                 <a:lstStyle/>
                 <a:p>
-                  <a:endParaRPr sz="2400">
+                  <a:endParaRPr sz="2400" dirty="0">
                     <a:solidFill>
                       <a:srgbClr val="000000"/>
                     </a:solidFill>
@@ -16658,7 +16652,7 @@
                 </a:bodyPr>
                 <a:lstStyle/>
                 <a:p>
-                  <a:endParaRPr sz="2400">
+                  <a:endParaRPr sz="2400" dirty="0">
                     <a:solidFill>
                       <a:srgbClr val="000000"/>
                     </a:solidFill>
@@ -16825,7 +16819,7 @@
                 </a:bodyPr>
                 <a:lstStyle/>
                 <a:p>
-                  <a:endParaRPr sz="2400">
+                  <a:endParaRPr sz="2400" dirty="0">
                     <a:solidFill>
                       <a:srgbClr val="000000"/>
                     </a:solidFill>
@@ -16962,7 +16956,7 @@
                 </a:bodyPr>
                 <a:lstStyle/>
                 <a:p>
-                  <a:endParaRPr sz="2400">
+                  <a:endParaRPr sz="2400" dirty="0">
                     <a:solidFill>
                       <a:srgbClr val="000000"/>
                     </a:solidFill>
@@ -17050,7 +17044,7 @@
                 </a:bodyPr>
                 <a:lstStyle/>
                 <a:p>
-                  <a:endParaRPr sz="2400">
+                  <a:endParaRPr sz="2400" dirty="0">
                     <a:solidFill>
                       <a:srgbClr val="000000"/>
                     </a:solidFill>
@@ -17217,7 +17211,7 @@
                 </a:bodyPr>
                 <a:lstStyle/>
                 <a:p>
-                  <a:endParaRPr sz="2400">
+                  <a:endParaRPr sz="2400" dirty="0">
                     <a:solidFill>
                       <a:srgbClr val="000000"/>
                     </a:solidFill>
@@ -17307,7 +17301,7 @@
                 </a:bodyPr>
                 <a:lstStyle/>
                 <a:p>
-                  <a:endParaRPr sz="2400">
+                  <a:endParaRPr sz="2400" dirty="0">
                     <a:solidFill>
                       <a:srgbClr val="000000"/>
                     </a:solidFill>
@@ -17373,7 +17367,7 @@
                 </a:bodyPr>
                 <a:lstStyle/>
                 <a:p>
-                  <a:endParaRPr sz="2400">
+                  <a:endParaRPr sz="2400" dirty="0">
                     <a:solidFill>
                       <a:srgbClr val="000000"/>
                     </a:solidFill>
@@ -17457,7 +17451,7 @@
                 </a:bodyPr>
                 <a:lstStyle/>
                 <a:p>
-                  <a:endParaRPr sz="2400">
+                  <a:endParaRPr sz="2400" dirty="0">
                     <a:solidFill>
                       <a:srgbClr val="000000"/>
                     </a:solidFill>
@@ -17535,7 +17529,7 @@
                 </a:bodyPr>
                 <a:lstStyle/>
                 <a:p>
-                  <a:endParaRPr sz="2400">
+                  <a:endParaRPr sz="2400" dirty="0">
                     <a:solidFill>
                       <a:srgbClr val="000000"/>
                     </a:solidFill>
@@ -17625,7 +17619,7 @@
                 </a:bodyPr>
                 <a:lstStyle/>
                 <a:p>
-                  <a:endParaRPr sz="2400">
+                  <a:endParaRPr sz="2400" dirty="0">
                     <a:solidFill>
                       <a:srgbClr val="000000"/>
                     </a:solidFill>
@@ -17793,7 +17787,7 @@
                 </a:bodyPr>
                 <a:lstStyle/>
                 <a:p>
-                  <a:endParaRPr sz="2400">
+                  <a:endParaRPr sz="2400" dirty="0">
                     <a:solidFill>
                       <a:srgbClr val="000000"/>
                     </a:solidFill>
@@ -17877,7 +17871,7 @@
                 </a:bodyPr>
                 <a:lstStyle/>
                 <a:p>
-                  <a:endParaRPr sz="2400">
+                  <a:endParaRPr sz="2400" dirty="0">
                     <a:solidFill>
                       <a:srgbClr val="000000"/>
                     </a:solidFill>
@@ -17965,7 +17959,7 @@
                 </a:bodyPr>
                 <a:lstStyle/>
                 <a:p>
-                  <a:endParaRPr sz="2400">
+                  <a:endParaRPr sz="2400" dirty="0">
                     <a:solidFill>
                       <a:srgbClr val="000000"/>
                     </a:solidFill>
@@ -18123,7 +18117,7 @@
                 </a:bodyPr>
                 <a:lstStyle/>
                 <a:p>
-                  <a:endParaRPr sz="2400">
+                  <a:endParaRPr sz="2400" dirty="0">
                     <a:solidFill>
                       <a:srgbClr val="000000"/>
                     </a:solidFill>
@@ -18213,7 +18207,7 @@
                 </a:bodyPr>
                 <a:lstStyle/>
                 <a:p>
-                  <a:endParaRPr sz="2400">
+                  <a:endParaRPr sz="2400" dirty="0">
                     <a:solidFill>
                       <a:srgbClr val="000000"/>
                     </a:solidFill>
@@ -18411,7 +18405,7 @@
                 </a:bodyPr>
                 <a:lstStyle/>
                 <a:p>
-                  <a:endParaRPr sz="2400">
+                  <a:endParaRPr sz="2400" dirty="0">
                     <a:solidFill>
                       <a:srgbClr val="000000"/>
                     </a:solidFill>
@@ -18487,7 +18481,7 @@
               </a:bodyPr>
               <a:lstStyle/>
               <a:p>
-                <a:endParaRPr sz="2400">
+                <a:endParaRPr sz="2400" dirty="0">
                   <a:solidFill>
                     <a:srgbClr val="000000"/>
                   </a:solidFill>
@@ -18583,7 +18577,7 @@
               </a:bodyPr>
               <a:lstStyle/>
               <a:p>
-                <a:endParaRPr sz="2400">
+                <a:endParaRPr sz="2400" dirty="0">
                   <a:solidFill>
                     <a:srgbClr val="000000"/>
                   </a:solidFill>
@@ -18754,7 +18748,7 @@
                 </a:bodyPr>
                 <a:lstStyle/>
                 <a:p>
-                  <a:endParaRPr sz="2400">
+                  <a:endParaRPr sz="2400" dirty="0">
                     <a:solidFill>
                       <a:srgbClr val="000000"/>
                     </a:solidFill>
@@ -18838,7 +18832,7 @@
                 </a:bodyPr>
                 <a:lstStyle/>
                 <a:p>
-                  <a:endParaRPr sz="2400">
+                  <a:endParaRPr sz="2400" dirty="0">
                     <a:solidFill>
                       <a:srgbClr val="000000"/>
                     </a:solidFill>
@@ -18916,7 +18910,7 @@
                 </a:bodyPr>
                 <a:lstStyle/>
                 <a:p>
-                  <a:endParaRPr sz="2400">
+                  <a:endParaRPr sz="2400" dirty="0">
                     <a:solidFill>
                       <a:srgbClr val="000000"/>
                     </a:solidFill>
@@ -19006,7 +19000,7 @@
                 </a:bodyPr>
                 <a:lstStyle/>
                 <a:p>
-                  <a:endParaRPr sz="2400">
+                  <a:endParaRPr sz="2400" dirty="0">
                     <a:solidFill>
                       <a:srgbClr val="000000"/>
                     </a:solidFill>
@@ -19096,7 +19090,7 @@
                 </a:bodyPr>
                 <a:lstStyle/>
                 <a:p>
-                  <a:endParaRPr sz="2400">
+                  <a:endParaRPr sz="2400" dirty="0">
                     <a:solidFill>
                       <a:srgbClr val="000000"/>
                     </a:solidFill>
@@ -19189,7 +19183,7 @@
                 </a:bodyPr>
                 <a:lstStyle/>
                 <a:p>
-                  <a:endParaRPr sz="2400">
+                  <a:endParaRPr sz="2400" dirty="0">
                     <a:solidFill>
                       <a:srgbClr val="000000"/>
                     </a:solidFill>
@@ -19279,7 +19273,7 @@
                 </a:bodyPr>
                 <a:lstStyle/>
                 <a:p>
-                  <a:endParaRPr sz="2400">
+                  <a:endParaRPr sz="2400" dirty="0">
                     <a:solidFill>
                       <a:srgbClr val="000000"/>
                     </a:solidFill>
@@ -19452,7 +19446,7 @@
                 </a:bodyPr>
                 <a:lstStyle/>
                 <a:p>
-                  <a:endParaRPr sz="2400">
+                  <a:endParaRPr sz="2400" dirty="0">
                     <a:solidFill>
                       <a:srgbClr val="000000"/>
                     </a:solidFill>
@@ -19551,14 +19545,14 @@
           <p:nvPr>
             <p:extLst>
               <p:ext uri="{D42A27DB-BD31-4B8C-83A1-F6EECF244321}">
-                <p14:modId xmlns:p14="http://schemas.microsoft.com/office/powerpoint/2010/main" val="839354219"/>
+                <p14:modId xmlns:p14="http://schemas.microsoft.com/office/powerpoint/2010/main" val="2562542664"/>
               </p:ext>
             </p:extLst>
           </p:nvPr>
         </p:nvGraphicFramePr>
         <p:xfrm>
-          <a:off x="1013480" y="1911927"/>
-          <a:ext cx="10165039" cy="4199994"/>
+          <a:off x="1013480" y="1693813"/>
+          <a:ext cx="10165039" cy="4724799"/>
         </p:xfrm>
         <a:graphic>
           <a:graphicData uri="http://schemas.openxmlformats.org/drawingml/2006/table">
@@ -19644,10 +19638,22 @@
                       <a:r>
                         <a:rPr lang="en-GB" sz="1600" b="1" i="0" dirty="0">
                           <a:latin typeface="Gilmer Medium" pitchFamily="2" charset="77"/>
+                          <a:hlinkClick r:id="rId2"/>
                         </a:rPr>
                         <a:t>Language Engineering for Language Migrations</a:t>
                       </a:r>
-                      <a:endParaRPr lang="en-NL" sz="1600" b="1" i="0" dirty="0">
+                      <a:endParaRPr lang="en-GB" sz="1600" b="1" i="0" dirty="0">
+                        <a:latin typeface="Gilmer Medium" pitchFamily="2" charset="77"/>
+                      </a:endParaRPr>
+                    </a:p>
+                    <a:p>
+                      <a:r>
+                        <a:rPr lang="en-US" sz="1600" b="0" i="0" dirty="0">
+                          <a:latin typeface="Gilmer Medium" pitchFamily="2" charset="77"/>
+                        </a:rPr>
+                        <a:t>Thursday 18:00 Track 1: Salon de Grados</a:t>
+                      </a:r>
+                      <a:endParaRPr lang="en-NL" sz="1600" b="0" i="0" dirty="0">
                         <a:latin typeface="Gilmer Medium" pitchFamily="2" charset="77"/>
                       </a:endParaRPr>
                     </a:p>
@@ -19711,16 +19717,29 @@
                       <a:r>
                         <a:rPr lang="en-GB" sz="1600" b="1" i="0" dirty="0" err="1">
                           <a:latin typeface="Gilmer Medium" pitchFamily="2" charset="77"/>
+                          <a:hlinkClick r:id="rId3"/>
                         </a:rPr>
                         <a:t>GenFPL</a:t>
                       </a:r>
                       <a:r>
                         <a:rPr lang="en-GB" sz="1600" b="1" i="0" dirty="0">
                           <a:latin typeface="Gilmer Medium" pitchFamily="2" charset="77"/>
+                          <a:hlinkClick r:id="rId3"/>
                         </a:rPr>
                         <a:t>: DSL-embeddable functional programming languages</a:t>
                       </a:r>
-                      <a:endParaRPr lang="en-NL" sz="1600" b="1" i="0" dirty="0">
+                      <a:endParaRPr lang="en-GB" sz="1600" b="1" i="0" dirty="0">
+                        <a:latin typeface="Gilmer Medium" pitchFamily="2" charset="77"/>
+                      </a:endParaRPr>
+                    </a:p>
+                    <a:p>
+                      <a:r>
+                        <a:rPr lang="en-GB" sz="1600" b="0" i="0" dirty="0">
+                          <a:latin typeface="Gilmer Medium" pitchFamily="2" charset="77"/>
+                        </a:rPr>
+                        <a:t>Friday 10:00 Track 1: Salon de Grados</a:t>
+                      </a:r>
+                      <a:endParaRPr lang="en-NL" sz="1600" b="0" i="0" dirty="0">
                         <a:latin typeface="Gilmer Medium" pitchFamily="2" charset="77"/>
                       </a:endParaRPr>
                     </a:p>
@@ -19784,21 +19803,38 @@
                       <a:r>
                         <a:rPr lang="en-GB" sz="1600" b="1" i="0" dirty="0">
                           <a:latin typeface="Gilmer Medium" pitchFamily="2" charset="77"/>
+                          <a:hlinkClick r:id="rId4"/>
                         </a:rPr>
                         <a:t>LionWeb and </a:t>
                       </a:r>
                       <a:r>
                         <a:rPr lang="en-GB" sz="1600" b="1" i="0" dirty="0" err="1">
                           <a:latin typeface="Gilmer Medium" pitchFamily="2" charset="77"/>
+                          <a:hlinkClick r:id="rId4"/>
                         </a:rPr>
                         <a:t>Kolasu</a:t>
                       </a:r>
                       <a:r>
                         <a:rPr lang="en-GB" sz="1600" b="1" i="0" dirty="0">
                           <a:latin typeface="Gilmer Medium" pitchFamily="2" charset="77"/>
+                          <a:hlinkClick r:id="rId4"/>
                         </a:rPr>
                         <a:t>: an integration story</a:t>
                       </a:r>
+                      <a:endParaRPr lang="en-GB" sz="1600" b="1" i="0" dirty="0">
+                        <a:latin typeface="Gilmer Medium" pitchFamily="2" charset="77"/>
+                      </a:endParaRPr>
+                    </a:p>
+                    <a:p>
+                      <a:r>
+                        <a:rPr lang="en-GB" sz="1600" b="0" i="0" dirty="0">
+                          <a:latin typeface="Gilmer Medium" pitchFamily="2" charset="77"/>
+                        </a:rPr>
+                        <a:t>Friday 11:30 Track 1: Salon de Grados</a:t>
+                      </a:r>
+                      <a:endParaRPr lang="en-GB" sz="1600" b="1" i="0" dirty="0">
+                        <a:latin typeface="Gilmer Medium" pitchFamily="2" charset="77"/>
+                      </a:endParaRPr>
                     </a:p>
                     <a:p>
                       <a:endParaRPr lang="en-NL" sz="1600" b="1" i="0" dirty="0">
@@ -19871,8 +19907,20 @@
                       <a:r>
                         <a:rPr lang="en-GB" sz="1600" b="1" i="0" dirty="0">
                           <a:latin typeface="Gilmer Medium" pitchFamily="2" charset="77"/>
+                          <a:hlinkClick r:id="rId5"/>
                         </a:rPr>
                         <a:t>Implementing LionWeb in Rascal</a:t>
+                      </a:r>
+                      <a:endParaRPr lang="en-GB" sz="1600" b="1" i="0" dirty="0">
+                        <a:latin typeface="Gilmer Medium" pitchFamily="2" charset="77"/>
+                      </a:endParaRPr>
+                    </a:p>
+                    <a:p>
+                      <a:r>
+                        <a:rPr lang="en-GB" sz="1600" b="0" i="0" dirty="0">
+                          <a:latin typeface="Gilmer Medium" pitchFamily="2" charset="77"/>
+                        </a:rPr>
+                        <a:t>Friday 12:00 Track 1: Salon de Grados</a:t>
                       </a:r>
                     </a:p>
                     <a:p>
@@ -19937,9 +19985,24 @@
                       <a:r>
                         <a:rPr lang="en-GB" sz="1600" b="1" i="0" dirty="0">
                           <a:latin typeface="Gilmer Medium" pitchFamily="2" charset="77"/>
+                          <a:hlinkClick r:id="rId6"/>
                         </a:rPr>
                         <a:t>A Case Study: Execution of LionWeb nodes in Truffle Language Framework</a:t>
                       </a:r>
+                      <a:endParaRPr lang="en-GB" sz="1600" b="1" i="0" dirty="0">
+                        <a:latin typeface="Gilmer Medium" pitchFamily="2" charset="77"/>
+                      </a:endParaRPr>
+                    </a:p>
+                    <a:p>
+                      <a:r>
+                        <a:rPr lang="en-GB" sz="1600" b="0" i="0" dirty="0">
+                          <a:latin typeface="Gilmer Medium" pitchFamily="2" charset="77"/>
+                        </a:rPr>
+                        <a:t>Friday 12:30 Track 1: Salon de Grados</a:t>
+                      </a:r>
+                      <a:endParaRPr lang="en-GB" sz="1600" b="1" i="0" dirty="0">
+                        <a:latin typeface="Gilmer Medium" pitchFamily="2" charset="77"/>
+                      </a:endParaRPr>
                     </a:p>
                   </a:txBody>
                   <a:tcPr/>
@@ -20213,15 +20276,7 @@
             <a:pPr lvl="1"/>
             <a:r>
               <a:rPr lang="en-US" dirty="0"/>
-              <a:t>The LionWeb </a:t>
-            </a:r>
-            <a:r>
-              <a:rPr lang="en-US" dirty="0" err="1"/>
-              <a:t>Respository</a:t>
-            </a:r>
-            <a:r>
-              <a:rPr lang="en-US" dirty="0"/>
-              <a:t> guarantees that the stored model is and will always be a properly structured tree, e.g.:</a:t>
+              <a:t>The LionWeb Repository guarantees that the stored model is and will always be a properly structured tree, e.g.:</a:t>
             </a:r>
           </a:p>
           <a:p>
@@ -20235,7 +20290,7 @@
             <a:pPr lvl="2"/>
             <a:r>
               <a:rPr lang="en-US" dirty="0"/>
-              <a:t>Node id’s are unique</a:t>
+              <a:t>Node ids are unique</a:t>
             </a:r>
           </a:p>
           <a:p>
@@ -20264,13 +20319,6 @@
             </a:r>
           </a:p>
           <a:p>
-            <a:r>
-              <a:rPr lang="en-US" dirty="0"/>
-              <a:t>URL</a:t>
-            </a:r>
-          </a:p>
-          <a:p>
-            <a:pPr lvl="1"/>
             <a:r>
               <a:rPr lang="en-US" dirty="0">
                 <a:hlinkClick r:id="rId2"/>
@@ -20621,22 +20669,105 @@
         </p:nvSpPr>
         <p:spPr/>
         <p:txBody>
-          <a:bodyPr/>
+          <a:bodyPr>
+            <a:normAutofit fontScale="92500" lnSpcReduction="20000"/>
+          </a:bodyPr>
           <a:lstStyle/>
           <a:p>
             <a:r>
-              <a:rPr lang="en-NL" dirty="0"/>
-              <a:t>TODO</a:t>
+              <a:rPr lang="en-US" dirty="0"/>
+              <a:t>Streaming, memory-efficient M1/M2 (de)serializer with custom error handling</a:t>
             </a:r>
           </a:p>
           <a:p>
             <a:r>
-              <a:rPr lang="en-NL" dirty="0"/>
-              <a:t>URL</a:t>
+              <a:rPr lang="en-US" dirty="0"/>
+              <a:t>Low-level serialization API, high-level semantic-enforcing node API</a:t>
+            </a:r>
+          </a:p>
+          <a:p>
+            <a:r>
+              <a:rPr lang="en-US" dirty="0"/>
+              <a:t>Annotations, dynamic &amp; lenient nodes</a:t>
+            </a:r>
+          </a:p>
+          <a:p>
+            <a:r>
+              <a:rPr lang="en-US" dirty="0"/>
+              <a:t>Roslyn-based generator LionWeb M2 </a:t>
+            </a:r>
+            <a:r>
+              <a:rPr lang="en-US" dirty="0">
+                <a:sym typeface="Wingdings" panose="05000000000000000000" pitchFamily="2" charset="2"/>
+              </a:rPr>
+              <a:t> C# types</a:t>
+            </a:r>
+          </a:p>
+          <a:p>
+            <a:r>
+              <a:rPr lang="en-US" dirty="0"/>
+              <a:t>Node and language navigation utils</a:t>
+            </a:r>
+            <a:endParaRPr lang="en-US" dirty="0">
+              <a:sym typeface="Wingdings" panose="05000000000000000000" pitchFamily="2" charset="2"/>
+            </a:endParaRPr>
+          </a:p>
+          <a:p>
+            <a:r>
+              <a:rPr lang="en-US" dirty="0">
+                <a:sym typeface="Wingdings" panose="05000000000000000000" pitchFamily="2" charset="2"/>
+              </a:rPr>
+              <a:t>Advanced utilities</a:t>
             </a:r>
           </a:p>
           <a:p>
             <a:pPr lvl="1"/>
+            <a:r>
+              <a:rPr lang="en-US" dirty="0">
+                <a:sym typeface="Wingdings" panose="05000000000000000000" pitchFamily="2" charset="2"/>
+              </a:rPr>
+              <a:t>Cloner</a:t>
+            </a:r>
+          </a:p>
+          <a:p>
+            <a:pPr lvl="1"/>
+            <a:r>
+              <a:rPr lang="en-US" dirty="0">
+                <a:sym typeface="Wingdings" panose="05000000000000000000" pitchFamily="2" charset="2"/>
+              </a:rPr>
+              <a:t>Comparer</a:t>
+            </a:r>
+          </a:p>
+          <a:p>
+            <a:pPr lvl="1"/>
+            <a:r>
+              <a:rPr lang="en-US" dirty="0" err="1">
+                <a:sym typeface="Wingdings" panose="05000000000000000000" pitchFamily="2" charset="2"/>
+              </a:rPr>
+              <a:t>Textualizer</a:t>
+            </a:r>
+            <a:endParaRPr lang="en-US" dirty="0">
+              <a:sym typeface="Wingdings" panose="05000000000000000000" pitchFamily="2" charset="2"/>
+            </a:endParaRPr>
+          </a:p>
+          <a:p>
+            <a:pPr lvl="1"/>
+            <a:r>
+              <a:rPr lang="en-US" dirty="0">
+                <a:sym typeface="Wingdings" panose="05000000000000000000" pitchFamily="2" charset="2"/>
+              </a:rPr>
+              <a:t>Reference finder</a:t>
+            </a:r>
+          </a:p>
+          <a:p>
+            <a:r>
+              <a:rPr lang="en-US" dirty="0">
+                <a:sym typeface="Wingdings" panose="05000000000000000000" pitchFamily="2" charset="2"/>
+              </a:rPr>
+              <a:t>Extensive test coverage</a:t>
+            </a:r>
+          </a:p>
+          <a:p>
             <a:r>
               <a:rPr lang="en-GB" dirty="0">
                 <a:hlinkClick r:id="rId2"/>
@@ -20733,18 +20864,65 @@
           <a:lstStyle/>
           <a:p>
             <a:r>
-              <a:rPr lang="en-NL" dirty="0"/>
-              <a:t>TODO</a:t>
+              <a:rPr lang="en-US" dirty="0"/>
+              <a:t>Memory-efficient M1/M2 (de)serializer with pluggable workers</a:t>
             </a:r>
           </a:p>
           <a:p>
             <a:r>
-              <a:rPr lang="en-NL" dirty="0"/>
-              <a:t>URL</a:t>
+              <a:rPr lang="en-US" dirty="0"/>
+              <a:t>Low-level serialization API, high-level node API</a:t>
+            </a:r>
+          </a:p>
+          <a:p>
+            <a:r>
+              <a:rPr lang="en-US" dirty="0"/>
+              <a:t>Annotations, dynamic &amp; proxy nodes</a:t>
+            </a:r>
+          </a:p>
+          <a:p>
+            <a:r>
+              <a:rPr lang="en-US" dirty="0"/>
+              <a:t>Node and language navigation utils</a:t>
+            </a:r>
+            <a:endParaRPr lang="en-US" dirty="0">
+              <a:sym typeface="Wingdings" panose="05000000000000000000" pitchFamily="2" charset="2"/>
+            </a:endParaRPr>
+          </a:p>
+          <a:p>
+            <a:r>
+              <a:rPr lang="en-US" dirty="0">
+                <a:sym typeface="Wingdings" panose="05000000000000000000" pitchFamily="2" charset="2"/>
+              </a:rPr>
+              <a:t>Advanced utilities</a:t>
             </a:r>
           </a:p>
           <a:p>
             <a:pPr lvl="1"/>
+            <a:r>
+              <a:rPr lang="en-US" dirty="0">
+                <a:sym typeface="Wingdings" panose="05000000000000000000" pitchFamily="2" charset="2"/>
+              </a:rPr>
+              <a:t>Model comparator</a:t>
+            </a:r>
+          </a:p>
+          <a:p>
+            <a:pPr lvl="1"/>
+            <a:r>
+              <a:rPr lang="en-US" dirty="0">
+                <a:sym typeface="Wingdings" panose="05000000000000000000" pitchFamily="2" charset="2"/>
+              </a:rPr>
+              <a:t>Validator</a:t>
+            </a:r>
+          </a:p>
+          <a:p>
+            <a:r>
+              <a:rPr lang="en-US" dirty="0"/>
+              <a:t>EMF M1/M2 Importer + Exporter</a:t>
+            </a:r>
+            <a:endParaRPr lang="en-NL" dirty="0"/>
+          </a:p>
+          <a:p>
             <a:r>
               <a:rPr lang="en-GB" dirty="0">
                 <a:hlinkClick r:id="rId2"/>
@@ -20841,18 +21019,71 @@
           <a:lstStyle/>
           <a:p>
             <a:r>
-              <a:rPr lang="en-NL" dirty="0"/>
-              <a:t>TODO</a:t>
+              <a:rPr lang="en-US" dirty="0"/>
+              <a:t>Kotlin-like adaptions of Java APIs</a:t>
             </a:r>
           </a:p>
           <a:p>
             <a:r>
-              <a:rPr lang="en-NL" dirty="0"/>
-              <a:t>URL</a:t>
+              <a:rPr lang="en-US" dirty="0"/>
+              <a:t>Generator LionWeb M2 </a:t>
+            </a:r>
+            <a:r>
+              <a:rPr lang="en-US" dirty="0">
+                <a:sym typeface="Wingdings" panose="05000000000000000000" pitchFamily="2" charset="2"/>
+              </a:rPr>
+              <a:t> Kotlin types (together with </a:t>
+            </a:r>
+            <a:r>
+              <a:rPr lang="en-US" dirty="0" err="1">
+                <a:sym typeface="Wingdings" panose="05000000000000000000" pitchFamily="2" charset="2"/>
+              </a:rPr>
+              <a:t>Starlasu</a:t>
+            </a:r>
+            <a:r>
+              <a:rPr lang="en-US" dirty="0">
+                <a:sym typeface="Wingdings" panose="05000000000000000000" pitchFamily="2" charset="2"/>
+              </a:rPr>
+              <a:t>)</a:t>
+            </a:r>
+          </a:p>
+          <a:p>
+            <a:r>
+              <a:rPr lang="en-US" dirty="0">
+                <a:sym typeface="Wingdings" panose="05000000000000000000" pitchFamily="2" charset="2"/>
+              </a:rPr>
+              <a:t>Repository client</a:t>
             </a:r>
           </a:p>
           <a:p>
             <a:pPr lvl="1"/>
+            <a:r>
+              <a:rPr lang="en-US" dirty="0">
+                <a:sym typeface="Wingdings" panose="05000000000000000000" pitchFamily="2" charset="2"/>
+              </a:rPr>
+              <a:t>Bulk API</a:t>
+            </a:r>
+          </a:p>
+          <a:p>
+            <a:pPr lvl="1"/>
+            <a:r>
+              <a:rPr lang="en-US" dirty="0">
+                <a:sym typeface="Wingdings" panose="05000000000000000000" pitchFamily="2" charset="2"/>
+              </a:rPr>
+              <a:t>Mass upload API</a:t>
+            </a:r>
+          </a:p>
+          <a:p>
+            <a:pPr lvl="1"/>
+            <a:r>
+              <a:rPr lang="en-US" dirty="0">
+                <a:sym typeface="Wingdings" panose="05000000000000000000" pitchFamily="2" charset="2"/>
+              </a:rPr>
+              <a:t>Compression</a:t>
+            </a:r>
+            <a:endParaRPr lang="en-NL" dirty="0"/>
+          </a:p>
+          <a:p>
             <a:r>
               <a:rPr lang="en-GB" dirty="0">
                 <a:hlinkClick r:id="rId2"/>
@@ -20955,115 +21186,140 @@
           </a:xfrm>
         </p:spPr>
         <p:txBody>
-          <a:bodyPr/>
+          <a:bodyPr>
+            <a:normAutofit fontScale="92500" lnSpcReduction="20000"/>
+          </a:bodyPr>
           <a:lstStyle/>
           <a:p>
             <a:r>
-              <a:rPr lang="en-GB" sz="2000" dirty="0"/>
+              <a:rPr lang="en-GB" dirty="0"/>
+              <a:t>M1/M2 (de)serializer</a:t>
+            </a:r>
+          </a:p>
+          <a:p>
+            <a:r>
+              <a:rPr lang="en-US" dirty="0"/>
+              <a:t>Low-level serialization API, high-level semantic-enforcing node API</a:t>
+            </a:r>
+          </a:p>
+          <a:p>
+            <a:r>
+              <a:rPr lang="en-GB" dirty="0"/>
+              <a:t>Annotations, dynamic nodes</a:t>
+            </a:r>
+          </a:p>
+          <a:p>
+            <a:r>
+              <a:rPr lang="en-GB" dirty="0"/>
+              <a:t>Generator LionWeb M2 </a:t>
+            </a:r>
+            <a:r>
+              <a:rPr lang="en-GB" dirty="0">
+                <a:sym typeface="Wingdings" panose="05000000000000000000" pitchFamily="2" charset="2"/>
+              </a:rPr>
+              <a:t> Typescript types, </a:t>
+            </a:r>
+            <a:r>
+              <a:rPr lang="en-US" dirty="0">
+                <a:sym typeface="Wingdings" panose="05000000000000000000" pitchFamily="2" charset="2"/>
+              </a:rPr>
+              <a:t>o</a:t>
+            </a:r>
+            <a:r>
+              <a:rPr lang="en-NL" dirty="0" err="1"/>
+              <a:t>ptionally</a:t>
+            </a:r>
+            <a:r>
+              <a:rPr lang="en-NL" dirty="0"/>
+              <a:t> reactive using </a:t>
+            </a:r>
+            <a:r>
+              <a:rPr lang="en-NL" dirty="0" err="1"/>
+              <a:t>mobx</a:t>
+            </a:r>
+            <a:endParaRPr lang="en-GB" dirty="0"/>
+          </a:p>
+          <a:p>
+            <a:r>
+              <a:rPr lang="en-GB" dirty="0"/>
               <a:t>Command line utilities</a:t>
             </a:r>
           </a:p>
           <a:p>
             <a:pPr lvl="1"/>
             <a:r>
-              <a:rPr lang="en-GB" sz="1800" dirty="0"/>
+              <a:rPr lang="en-GB" dirty="0"/>
               <a:t>Validator</a:t>
             </a:r>
           </a:p>
           <a:p>
             <a:pPr lvl="1"/>
             <a:r>
-              <a:rPr lang="en-GB" sz="1800" dirty="0"/>
+              <a:rPr lang="en-GB" dirty="0"/>
               <a:t>Differ</a:t>
             </a:r>
           </a:p>
           <a:p>
             <a:pPr lvl="1"/>
             <a:r>
-              <a:rPr lang="en-GB" sz="1800" dirty="0" err="1"/>
+              <a:rPr lang="en-GB" dirty="0" err="1"/>
               <a:t>Textualizer</a:t>
             </a:r>
-            <a:endParaRPr lang="en-GB" sz="1800" dirty="0"/>
+            <a:endParaRPr lang="en-GB" dirty="0"/>
           </a:p>
           <a:p>
             <a:pPr lvl="1"/>
             <a:r>
-              <a:rPr lang="en-GB" sz="1800" dirty="0"/>
+              <a:rPr lang="en-GB" dirty="0"/>
               <a:t>Diagram generator for languages (</a:t>
             </a:r>
             <a:r>
-              <a:rPr lang="en-GB" sz="1800" dirty="0" err="1"/>
+              <a:rPr lang="en-GB" dirty="0" err="1"/>
               <a:t>PlantUML</a:t>
             </a:r>
             <a:r>
-              <a:rPr lang="en-GB" sz="1800" dirty="0"/>
+              <a:rPr lang="en-GB" dirty="0"/>
               <a:t>/mermaid)</a:t>
             </a:r>
           </a:p>
           <a:p>
             <a:pPr lvl="1"/>
             <a:r>
-              <a:rPr lang="en-GB" sz="1800" dirty="0"/>
+              <a:rPr lang="en-GB" dirty="0"/>
               <a:t>Measure</a:t>
             </a:r>
           </a:p>
           <a:p>
             <a:pPr lvl="1"/>
             <a:r>
-              <a:rPr lang="en-GB" sz="1800" dirty="0"/>
+              <a:rPr lang="en-GB" dirty="0"/>
               <a:t>Repair</a:t>
             </a:r>
           </a:p>
           <a:p>
             <a:pPr lvl="1"/>
             <a:r>
-              <a:rPr lang="en-GB" sz="1800" dirty="0"/>
+              <a:rPr lang="en-GB" dirty="0"/>
               <a:t>Sort</a:t>
             </a:r>
           </a:p>
           <a:p>
             <a:pPr lvl="1"/>
             <a:r>
-              <a:rPr lang="en-GB" sz="1800" dirty="0"/>
+              <a:rPr lang="en-GB" dirty="0"/>
               <a:t>Infer language from JSON instance</a:t>
             </a:r>
+            <a:endParaRPr lang="en-NL" dirty="0"/>
           </a:p>
           <a:p>
             <a:r>
-              <a:rPr lang="en-GB" sz="2000" dirty="0"/>
-              <a:t>Generator</a:t>
-            </a:r>
-          </a:p>
-          <a:p>
-            <a:pPr lvl="1"/>
-            <a:r>
-              <a:rPr lang="en-NL" sz="1800" dirty="0"/>
-              <a:t>Generate TypeScript classes/interfaces for languages/metamodels</a:t>
-            </a:r>
-          </a:p>
-          <a:p>
-            <a:pPr lvl="1"/>
-            <a:r>
-              <a:rPr lang="en-NL" sz="1800" dirty="0"/>
-              <a:t>Optionally reactive using mobx</a:t>
-            </a:r>
-          </a:p>
-          <a:p>
-            <a:r>
-              <a:rPr lang="en-NL" sz="2000" dirty="0"/>
-              <a:t>URL</a:t>
-            </a:r>
-          </a:p>
-          <a:p>
-            <a:pPr lvl="1"/>
-            <a:r>
-              <a:rPr lang="en-GB" sz="1600" dirty="0">
+              <a:rPr lang="en-GB" dirty="0">
                 <a:hlinkClick r:id="rId2"/>
               </a:rPr>
               <a:t>https://github.com/LionWeb-io/lionweb-typescript</a:t>
             </a:r>
             <a:r>
-              <a:rPr lang="en-NL" sz="1600" dirty="0"/>
+              <a:rPr lang="en-NL" dirty="0"/>
               <a:t> </a:t>
             </a:r>
           </a:p>
@@ -21152,18 +21408,71 @@
           <a:lstStyle/>
           <a:p>
             <a:r>
-              <a:rPr lang="en-NL" dirty="0"/>
-              <a:t>TODO</a:t>
+              <a:rPr lang="en-US" dirty="0"/>
+              <a:t>M1 (de)serializer, M2 serializer</a:t>
             </a:r>
           </a:p>
           <a:p>
             <a:r>
-              <a:rPr lang="en-NL" dirty="0"/>
-              <a:t>URL</a:t>
+              <a:rPr lang="en-US" dirty="0"/>
+              <a:t>Annotations, custom extensions for node/concept descriptions</a:t>
+            </a:r>
+          </a:p>
+          <a:p>
+            <a:r>
+              <a:rPr lang="en-US" dirty="0"/>
+              <a:t>MPS Language attributes for LionWeb </a:t>
+            </a:r>
+            <a:r>
+              <a:rPr lang="en-US" dirty="0" err="1"/>
+              <a:t>infos</a:t>
+            </a:r>
+            <a:endParaRPr lang="en-US" dirty="0"/>
+          </a:p>
+          <a:p>
+            <a:r>
+              <a:rPr lang="en-US" dirty="0"/>
+              <a:t>Command line interface to serialize M2</a:t>
+            </a:r>
+          </a:p>
+          <a:p>
+            <a:r>
+              <a:rPr lang="en-US" dirty="0"/>
+              <a:t>Experimental</a:t>
             </a:r>
           </a:p>
           <a:p>
             <a:pPr lvl="1"/>
+            <a:r>
+              <a:rPr lang="en-US" dirty="0"/>
+              <a:t>M2 </a:t>
+            </a:r>
+            <a:r>
+              <a:rPr lang="en-US" dirty="0" err="1"/>
+              <a:t>deserializer</a:t>
+            </a:r>
+            <a:endParaRPr lang="en-US" dirty="0"/>
+          </a:p>
+          <a:p>
+            <a:pPr lvl="1"/>
+            <a:r>
+              <a:rPr lang="en-US" dirty="0"/>
+              <a:t>Bulk-like repository API</a:t>
+            </a:r>
+          </a:p>
+          <a:p>
+            <a:pPr lvl="1"/>
+            <a:r>
+              <a:rPr lang="en-US" dirty="0"/>
+              <a:t>Bulk-like repository client</a:t>
+            </a:r>
+          </a:p>
+          <a:p>
+            <a:endParaRPr lang="en-GB" dirty="0">
+              <a:hlinkClick r:id="rId2"/>
+            </a:endParaRPr>
+          </a:p>
+          <a:p>
             <a:r>
               <a:rPr lang="en-GB" dirty="0">
                 <a:hlinkClick r:id="rId2"/>
@@ -21261,18 +21570,21 @@
           <a:lstStyle/>
           <a:p>
             <a:r>
-              <a:rPr lang="en-NL" dirty="0"/>
-              <a:t>Work in Progress</a:t>
-            </a:r>
-          </a:p>
-          <a:p>
-            <a:r>
-              <a:rPr lang="en-NL" dirty="0"/>
-              <a:t>URL</a:t>
+              <a:rPr lang="en-US" dirty="0"/>
+              <a:t>Bulk repository API</a:t>
             </a:r>
           </a:p>
           <a:p>
             <a:pPr lvl="1"/>
+            <a:r>
+              <a:rPr lang="en-US" dirty="0"/>
+              <a:t>Partial support for references</a:t>
+            </a:r>
+          </a:p>
+          <a:p>
+            <a:endParaRPr lang="en-NL" dirty="0"/>
+          </a:p>
+          <a:p>
             <a:r>
               <a:rPr lang="en-GB" dirty="0">
                 <a:hlinkClick r:id="rId2"/>
@@ -21370,7 +21682,7 @@
           <a:bodyPr/>
           <a:lstStyle/>
           <a:p>
-            <a:endParaRPr lang="en-NL"/>
+            <a:endParaRPr lang="en-NL" dirty="0"/>
           </a:p>
         </p:txBody>
       </p:sp>
@@ -21553,13 +21865,6 @@
             <a:endParaRPr lang="en-NL" dirty="0"/>
           </a:p>
           <a:p>
-            <a:r>
-              <a:rPr lang="en-NL" dirty="0"/>
-              <a:t>URL</a:t>
-            </a:r>
-          </a:p>
-          <a:p>
-            <a:pPr lvl="1"/>
             <a:r>
               <a:rPr lang="en-GB" dirty="0">
                 <a:hlinkClick r:id="rId2"/>
@@ -21788,68 +22093,116 @@
           </a:xfrm>
         </p:spPr>
         <p:txBody>
-          <a:bodyPr/>
+          <a:bodyPr>
+            <a:normAutofit fontScale="85000" lnSpcReduction="20000"/>
+          </a:bodyPr>
           <a:lstStyle/>
           <a:p>
             <a:r>
-              <a:rPr lang="nl-NL" dirty="0" err="1"/>
-              <a:t>Weekly</a:t>
-            </a:r>
-            <a:r>
-              <a:rPr lang="nl-NL" dirty="0"/>
-              <a:t> </a:t>
-            </a:r>
-            <a:r>
-              <a:rPr lang="nl-NL" dirty="0" err="1"/>
-              <a:t>core</a:t>
-            </a:r>
-            <a:r>
-              <a:rPr lang="nl-NL" dirty="0"/>
-              <a:t> team meetings</a:t>
+              <a:rPr lang="en-US" dirty="0"/>
+              <a:t>Specification documents (public)</a:t>
             </a:r>
           </a:p>
           <a:p>
             <a:pPr lvl="1"/>
             <a:r>
-              <a:rPr lang="nl-NL" dirty="0" err="1"/>
-              <a:t>Discuss</a:t>
+              <a:rPr lang="en-US" dirty="0"/>
+              <a:t>Hosted on GitHub: </a:t>
             </a:r>
             <a:r>
-              <a:rPr lang="nl-NL" dirty="0"/>
-              <a:t> </a:t>
+              <a:rPr lang="en-US" dirty="0">
+                <a:hlinkClick r:id="rId2"/>
+              </a:rPr>
+              <a:t>github.com/LionWeb-io/specification</a:t>
+            </a:r>
+            <a:endParaRPr lang="en-US" dirty="0"/>
+          </a:p>
+          <a:p>
+            <a:pPr lvl="1"/>
+            <a:r>
+              <a:rPr lang="en-US" dirty="0"/>
+              <a:t>Published at </a:t>
             </a:r>
             <a:r>
-              <a:rPr lang="nl-NL" dirty="0" err="1"/>
-              <a:t>and</a:t>
+              <a:rPr lang="en-US" dirty="0">
+                <a:hlinkClick r:id="rId3"/>
+              </a:rPr>
+              <a:t>lionweb.io/specification</a:t>
             </a:r>
+            <a:endParaRPr lang="en-US" dirty="0"/>
+          </a:p>
+          <a:p>
+            <a:pPr lvl="1"/>
             <a:r>
-              <a:rPr lang="nl-NL" dirty="0"/>
-              <a:t> get </a:t>
+              <a:rPr lang="en-US" dirty="0"/>
+              <a:t>Refers to issues for details</a:t>
             </a:r>
+          </a:p>
+          <a:p>
             <a:r>
-              <a:rPr lang="nl-NL" dirty="0" err="1"/>
-              <a:t>rough</a:t>
-            </a:r>
-            <a:r>
-              <a:rPr lang="nl-NL" dirty="0"/>
-              <a:t> consensus</a:t>
+              <a:rPr lang="en-US" dirty="0"/>
+              <a:t>Discussion issues (public)</a:t>
             </a:r>
           </a:p>
           <a:p>
             <a:pPr lvl="1"/>
             <a:r>
-              <a:rPr lang="nl-NL" dirty="0" err="1"/>
-              <a:t>Build</a:t>
+              <a:rPr lang="en-US" dirty="0"/>
+              <a:t>Same GitHub repo: </a:t>
             </a:r>
             <a:r>
-              <a:rPr lang="nl-NL" dirty="0"/>
-              <a:t> running code</a:t>
+              <a:rPr lang="en-US" dirty="0">
+                <a:hlinkClick r:id="rId4"/>
+              </a:rPr>
+              <a:t>125 open / 129 closed</a:t>
+            </a:r>
+            <a:endParaRPr lang="en-US" dirty="0"/>
+          </a:p>
+          <a:p>
+            <a:pPr lvl="1"/>
+            <a:r>
+              <a:rPr lang="en-US" dirty="0"/>
+              <a:t>Keep them focused</a:t>
+            </a:r>
+          </a:p>
+          <a:p>
+            <a:pPr lvl="1"/>
+            <a:r>
+              <a:rPr lang="en-US" dirty="0"/>
+              <a:t>Document alternatives and rationale</a:t>
             </a:r>
           </a:p>
           <a:p>
             <a:r>
               <a:rPr lang="en-US" dirty="0"/>
-              <a:t>Implementation mostly by team members</a:t>
+              <a:t>Weekly core team meetings (closed)</a:t>
+            </a:r>
+          </a:p>
+          <a:p>
+            <a:pPr lvl="1"/>
+            <a:r>
+              <a:rPr lang="en-US" dirty="0"/>
+              <a:t>Keep discussions running</a:t>
+            </a:r>
+          </a:p>
+          <a:p>
+            <a:pPr lvl="1"/>
+            <a:r>
+              <a:rPr lang="en-US" dirty="0"/>
+              <a:t>“Rough consensus and running code”</a:t>
+            </a:r>
+          </a:p>
+          <a:p>
+            <a:pPr lvl="1"/>
+            <a:r>
+              <a:rPr lang="en-US" dirty="0"/>
+              <a:t>Meeting logs and video recordings</a:t>
+            </a:r>
+          </a:p>
+          <a:p>
+            <a:r>
+              <a:rPr lang="en-US" dirty="0"/>
+              <a:t>Implementation mostly by team members (public)</a:t>
             </a:r>
           </a:p>
           <a:p>
@@ -21865,7 +22218,6 @@
               <a:rPr lang="en-US" dirty="0"/>
               <a:t>Guided by real-world needs</a:t>
             </a:r>
-            <a:endParaRPr lang="en-NL" dirty="0"/>
           </a:p>
         </p:txBody>
       </p:sp>
@@ -21963,8 +22315,15 @@
           <a:p>
             <a:r>
               <a:rPr lang="en-US" dirty="0"/>
-              <a:t>Released as LionWeb 2023.1</a:t>
+              <a:t>Released as </a:t>
             </a:r>
+            <a:r>
+              <a:rPr lang="en-US" dirty="0">
+                <a:hlinkClick r:id="rId2"/>
+              </a:rPr>
+              <a:t>LionWeb 2023.1</a:t>
+            </a:r>
+            <a:endParaRPr lang="en-US" dirty="0"/>
           </a:p>
           <a:p>
             <a:pPr lvl="1"/>
@@ -22003,16 +22362,30 @@
               <a:t>Added </a:t>
             </a:r>
             <a:r>
-              <a:rPr lang="en-US" dirty="0" err="1"/>
+              <a:rPr lang="en-US" dirty="0" err="1">
+                <a:latin typeface="Consolas" panose="020B0609020204030204" pitchFamily="49" charset="0"/>
+              </a:rPr>
               <a:t>StructuredDataType</a:t>
             </a:r>
-            <a:endParaRPr lang="en-US" dirty="0"/>
+            <a:endParaRPr lang="en-US" dirty="0">
+              <a:latin typeface="Consolas" panose="020B0609020204030204" pitchFamily="49" charset="0"/>
+            </a:endParaRPr>
           </a:p>
           <a:p>
             <a:pPr lvl="1"/>
             <a:r>
               <a:rPr lang="en-US" dirty="0"/>
-              <a:t>Removed JSON </a:t>
+              <a:t>Removed </a:t>
+            </a:r>
+            <a:r>
+              <a:rPr lang="en-US" dirty="0">
+                <a:latin typeface="Consolas" panose="020B0609020204030204" pitchFamily="49" charset="0"/>
+              </a:rPr>
+              <a:t>JSON</a:t>
+            </a:r>
+            <a:r>
+              <a:rPr lang="en-US" dirty="0"/>
+              <a:t> </a:t>
             </a:r>
             <a:r>
               <a:rPr lang="en-US" dirty="0" err="1"/>
@@ -22133,34 +22506,64 @@
           <a:p>
             <a:r>
               <a:rPr lang="en-US" dirty="0"/>
-              <a:t>Working Draft</a:t>
+              <a:t>Working draft</a:t>
             </a:r>
           </a:p>
           <a:p>
             <a:pPr lvl="1"/>
             <a:r>
               <a:rPr lang="en-US" dirty="0"/>
-              <a:t>Delta Protocol</a:t>
+              <a:t>Delta protocol (</a:t>
+            </a:r>
+            <a:r>
+              <a:rPr lang="en-US" dirty="0">
+                <a:hlinkClick r:id="rId2"/>
+              </a:rPr>
+              <a:t>issues</a:t>
+            </a:r>
+            <a:r>
+              <a:rPr lang="en-US" dirty="0"/>
+              <a:t>)</a:t>
             </a:r>
           </a:p>
           <a:p>
             <a:pPr lvl="1"/>
             <a:r>
               <a:rPr lang="en-US" dirty="0"/>
-              <a:t>Formalizing model correctness incl. Language</a:t>
+              <a:t>Formalizing model correctness incl. Language (</a:t>
+            </a:r>
+            <a:r>
+              <a:rPr lang="en-US" dirty="0">
+                <a:hlinkClick r:id="rId3"/>
+              </a:rPr>
+              <a:t>PR</a:t>
+            </a:r>
+            <a:r>
+              <a:rPr lang="en-US" dirty="0"/>
+              <a:t>)</a:t>
             </a:r>
           </a:p>
           <a:p>
             <a:r>
               <a:rPr lang="en-US" dirty="0"/>
-              <a:t>Under Discussion</a:t>
+              <a:t>Under discussion</a:t>
             </a:r>
           </a:p>
           <a:p>
             <a:pPr lvl="1"/>
             <a:r>
               <a:rPr lang="en-US" dirty="0"/>
-              <a:t>Derived models</a:t>
+              <a:t>Derived models (</a:t>
+            </a:r>
+            <a:r>
+              <a:rPr lang="en-US" dirty="0">
+                <a:hlinkClick r:id="rId4"/>
+              </a:rPr>
+              <a:t>issues</a:t>
+            </a:r>
+            <a:r>
+              <a:rPr lang="en-US" dirty="0"/>
+              <a:t>)</a:t>
             </a:r>
           </a:p>
           <a:p>
@@ -23695,6 +24098,11 @@
             </a:endParaRPr>
           </a:p>
           <a:p>
+            <a:pPr>
+              <a:tabLst>
+                <a:tab pos="2155825" algn="l"/>
+              </a:tabLst>
+            </a:pPr>
             <a:r>
               <a:rPr lang="en-US" b="1" dirty="0" err="1">
                 <a:latin typeface="Gilmer Medium" pitchFamily="2" charset="77"/>
@@ -23705,7 +24113,7 @@
               <a:rPr lang="en-US" b="1" dirty="0">
                 <a:latin typeface="Gilmer Medium" pitchFamily="2" charset="77"/>
               </a:rPr>
-              <a:t> Boersma	    </a:t>
+              <a:t> Boersma	</a:t>
             </a:r>
             <a:r>
               <a:rPr lang="en-US" dirty="0">
@@ -23718,11 +24126,16 @@
             </a:endParaRPr>
           </a:p>
           <a:p>
+            <a:pPr>
+              <a:tabLst>
+                <a:tab pos="2155825" algn="l"/>
+              </a:tabLst>
+            </a:pPr>
             <a:r>
               <a:rPr lang="en-US" b="1" dirty="0">
                 <a:latin typeface="Gilmer Medium" pitchFamily="2" charset="77"/>
               </a:rPr>
-              <a:t>Norman Koester	    </a:t>
+              <a:t>Norman Koester	</a:t>
             </a:r>
             <a:r>
               <a:rPr lang="en-US" dirty="0" err="1">
@@ -23741,6 +24154,11 @@
             </a:endParaRPr>
           </a:p>
           <a:p>
+            <a:pPr>
+              <a:tabLst>
+                <a:tab pos="2155825" algn="l"/>
+              </a:tabLst>
+            </a:pPr>
             <a:r>
               <a:rPr lang="en-US" b="1" dirty="0" err="1">
                 <a:latin typeface="Gilmer Medium" pitchFamily="2" charset="77"/>
@@ -23763,7 +24181,7 @@
               <a:rPr lang="en-US" b="1" dirty="0">
                 <a:latin typeface="Gilmer Medium" pitchFamily="2" charset="77"/>
               </a:rPr>
-              <a:t>	    </a:t>
+              <a:t>	</a:t>
             </a:r>
             <a:r>
               <a:rPr lang="en-US" dirty="0">
@@ -23776,6 +24194,11 @@
             </a:endParaRPr>
           </a:p>
           <a:p>
+            <a:pPr>
+              <a:tabLst>
+                <a:tab pos="2155825" algn="l"/>
+              </a:tabLst>
+            </a:pPr>
             <a:r>
               <a:rPr lang="en-US" b="1" dirty="0">
                 <a:latin typeface="Gilmer Medium" pitchFamily="2" charset="77"/>
@@ -23792,7 +24215,7 @@
               <a:rPr lang="en-US" b="1" dirty="0">
                 <a:latin typeface="Gilmer Medium" pitchFamily="2" charset="77"/>
               </a:rPr>
-              <a:t>        </a:t>
+              <a:t>	</a:t>
             </a:r>
             <a:r>
               <a:rPr lang="en-US" dirty="0" err="1">
@@ -23811,11 +24234,16 @@
             </a:endParaRPr>
           </a:p>
           <a:p>
+            <a:pPr>
+              <a:tabLst>
+                <a:tab pos="2155825" algn="l"/>
+              </a:tabLst>
+            </a:pPr>
             <a:r>
               <a:rPr lang="en-US" b="1" dirty="0">
                 <a:latin typeface="Gilmer Medium" pitchFamily="2" charset="77"/>
               </a:rPr>
-              <a:t>Eugen Schindler	    </a:t>
+              <a:t>Eugen Schindler	</a:t>
             </a:r>
             <a:r>
               <a:rPr lang="en-US" dirty="0">
@@ -23857,7 +24285,15 @@
           <a:p>
             <a:r>
               <a:rPr lang="en-NL" dirty="0"/>
-              <a:t>Team – Contact - More Info</a:t>
+              <a:t>Team </a:t>
+            </a:r>
+            <a:r>
+              <a:rPr lang="en-US" dirty="0"/>
+              <a:t>and</a:t>
+            </a:r>
+            <a:r>
+              <a:rPr lang="en-NL" dirty="0"/>
+              <a:t> Contact</a:t>
             </a:r>
           </a:p>
         </p:txBody>
@@ -23976,7 +24412,25 @@
               <a:rPr lang="en-NL" sz="1600" b="1" dirty="0">
                 <a:latin typeface="Gilmer Medium" pitchFamily="2" charset="77"/>
               </a:rPr>
-              <a:t> 			Github:</a:t>
+              <a:t> 			Git</a:t>
+            </a:r>
+            <a:r>
+              <a:rPr lang="en-US" sz="1600" b="1" dirty="0">
+                <a:latin typeface="Gilmer Medium" pitchFamily="2" charset="77"/>
+              </a:rPr>
+              <a:t>H</a:t>
+            </a:r>
+            <a:r>
+              <a:rPr lang="en-NL" sz="1600" b="1" dirty="0" err="1">
+                <a:latin typeface="Gilmer Medium" pitchFamily="2" charset="77"/>
+              </a:rPr>
+              <a:t>ub</a:t>
+            </a:r>
+            <a:r>
+              <a:rPr lang="en-NL" sz="1600" b="1" dirty="0">
+                <a:latin typeface="Gilmer Medium" pitchFamily="2" charset="77"/>
+              </a:rPr>
+              <a:t>:</a:t>
             </a:r>
             <a:endParaRPr lang="en" sz="1600" b="1" dirty="0">
               <a:latin typeface="Gilmer Medium" pitchFamily="2" charset="77"/>
@@ -24031,7 +24485,7 @@
               <a:rPr lang="en" sz="1600" b="1" dirty="0">
                 <a:latin typeface="Gilmer Medium" pitchFamily="2" charset="77"/>
               </a:rPr>
-              <a:t>Want to follow us or use or implement LionWeb</a:t>
+              <a:t>Slack to follow us, use, or implement LionWeb</a:t>
             </a:r>
             <a:r>
               <a:rPr lang="en-NL" sz="1600" b="1" dirty="0">
@@ -24165,6 +24619,11 @@
             </a:endParaRPr>
           </a:p>
           <a:p>
+            <a:pPr>
+              <a:tabLst>
+                <a:tab pos="2155825" algn="l"/>
+              </a:tabLst>
+            </a:pPr>
             <a:r>
               <a:rPr lang="en-US" b="1" dirty="0">
                 <a:latin typeface="Gilmer Medium" pitchFamily="2" charset="77"/>
@@ -24181,7 +24640,7 @@
               <a:rPr lang="en-US" b="1" dirty="0">
                 <a:latin typeface="Gilmer Medium" pitchFamily="2" charset="77"/>
               </a:rPr>
-              <a:t>	           </a:t>
+              <a:t>	</a:t>
             </a:r>
             <a:r>
               <a:rPr lang="en-US" dirty="0" err="1">
@@ -24200,23 +24659,16 @@
             </a:endParaRPr>
           </a:p>
           <a:p>
+            <a:pPr>
+              <a:tabLst>
+                <a:tab pos="2155825" algn="l"/>
+              </a:tabLst>
+            </a:pPr>
             <a:r>
               <a:rPr lang="en-US" b="1" dirty="0">
                 <a:latin typeface="Gilmer Medium" pitchFamily="2" charset="77"/>
               </a:rPr>
-              <a:t>Niko </a:t>
-            </a:r>
-            <a:r>
-              <a:rPr lang="en-US" b="1" dirty="0" err="1">
-                <a:latin typeface="Gilmer Medium" pitchFamily="2" charset="77"/>
-              </a:rPr>
-              <a:t>Stotz</a:t>
-            </a:r>
-            <a:r>
-              <a:rPr lang="en-US" b="1" dirty="0">
-                <a:latin typeface="Gilmer Medium" pitchFamily="2" charset="77"/>
-              </a:rPr>
-              <a:t>	           </a:t>
+              <a:t>Niko Stotz	</a:t>
             </a:r>
             <a:r>
               <a:rPr lang="en-US" dirty="0">
@@ -24226,6 +24678,11 @@
             </a:r>
           </a:p>
           <a:p>
+            <a:pPr>
+              <a:tabLst>
+                <a:tab pos="2155825" algn="l"/>
+              </a:tabLst>
+            </a:pPr>
             <a:r>
               <a:rPr lang="en-US" b="1" dirty="0">
                 <a:latin typeface="Gilmer Medium" pitchFamily="2" charset="77"/>
@@ -24242,7 +24699,7 @@
               <a:rPr lang="en-US" b="1" dirty="0">
                 <a:latin typeface="Gilmer Medium" pitchFamily="2" charset="77"/>
               </a:rPr>
-              <a:t>   </a:t>
+              <a:t>	</a:t>
             </a:r>
             <a:r>
               <a:rPr lang="en-US" dirty="0" err="1">
@@ -24261,6 +24718,11 @@
             </a:endParaRPr>
           </a:p>
           <a:p>
+            <a:pPr>
+              <a:tabLst>
+                <a:tab pos="2155825" algn="l"/>
+              </a:tabLst>
+            </a:pPr>
             <a:r>
               <a:rPr lang="en-US" b="1" dirty="0">
                 <a:latin typeface="Gilmer Medium" pitchFamily="2" charset="77"/>
@@ -24277,7 +24739,7 @@
               <a:rPr lang="en-US" b="1" dirty="0">
                 <a:latin typeface="Gilmer Medium" pitchFamily="2" charset="77"/>
               </a:rPr>
-              <a:t>	           </a:t>
+              <a:t>	</a:t>
             </a:r>
             <a:r>
               <a:rPr lang="en-US" dirty="0">
@@ -24287,11 +24749,16 @@
             </a:r>
           </a:p>
           <a:p>
+            <a:pPr>
+              <a:tabLst>
+                <a:tab pos="2155825" algn="l"/>
+              </a:tabLst>
+            </a:pPr>
             <a:r>
               <a:rPr lang="en-US" b="1" dirty="0">
                 <a:latin typeface="Gilmer Medium" pitchFamily="2" charset="77"/>
               </a:rPr>
-              <a:t>Jos Warmer	           </a:t>
+              <a:t>Jos Warmer	</a:t>
             </a:r>
             <a:r>
               <a:rPr lang="en-US" dirty="0">
@@ -25213,18 +25680,6 @@
             <a:noAutofit/>
           </a:bodyPr>
           <a:lstStyle/>
-          <a:p>
-            <a:pPr algn="ctr"/>
-            <a:r>
-              <a:rPr lang="en-NL" sz="2400" b="1" dirty="0">
-                <a:solidFill>
-                  <a:srgbClr val="E6752A"/>
-                </a:solidFill>
-                <a:latin typeface="Gilmer Bold" pitchFamily="2" charset="77"/>
-              </a:rPr>
-              <a:t> JSON &amp;</a:t>
-            </a:r>
-          </a:p>
           <a:p>
             <a:pPr algn="ctr"/>
             <a:r>
@@ -36209,6 +36664,349 @@
           </a:prstGeom>
         </p:spPr>
       </p:pic>
+      <p:sp>
+        <p:nvSpPr>
+          <p:cNvPr id="6" name="TextBox 5">
+            <a:extLst>
+              <a:ext uri="{FF2B5EF4-FFF2-40B4-BE49-F238E27FC236}">
+                <a16:creationId xmlns:a16="http://schemas.microsoft.com/office/drawing/2014/main" id="{20EE9B38-05B6-2ADE-7851-8D6C92DA9FEB}"/>
+              </a:ext>
+            </a:extLst>
+          </p:cNvPr>
+          <p:cNvSpPr txBox="1"/>
+          <p:nvPr/>
+        </p:nvSpPr>
+        <p:spPr>
+          <a:xfrm>
+            <a:off x="1712644" y="5422444"/>
+            <a:ext cx="506870" cy="584775"/>
+          </a:xfrm>
+          <a:prstGeom prst="rect">
+            <a:avLst/>
+          </a:prstGeom>
+          <a:noFill/>
+        </p:spPr>
+        <p:txBody>
+          <a:bodyPr wrap="none" rtlCol="0">
+            <a:spAutoFit/>
+          </a:bodyPr>
+          <a:lstStyle/>
+          <a:p>
+            <a:r>
+              <a:rPr lang="en-NL" sz="3200" b="1" dirty="0">
+                <a:solidFill>
+                  <a:srgbClr val="00B050"/>
+                </a:solidFill>
+                <a:sym typeface="Wingdings" panose="05000000000000000000" pitchFamily="2" charset="2"/>
+              </a:rPr>
+              <a:t></a:t>
+            </a:r>
+            <a:endParaRPr lang="en-NL" sz="3200" b="1" dirty="0">
+              <a:solidFill>
+                <a:srgbClr val="00B050"/>
+              </a:solidFill>
+            </a:endParaRPr>
+          </a:p>
+        </p:txBody>
+      </p:sp>
+      <p:sp>
+        <p:nvSpPr>
+          <p:cNvPr id="35" name="TextBox 34">
+            <a:extLst>
+              <a:ext uri="{FF2B5EF4-FFF2-40B4-BE49-F238E27FC236}">
+                <a16:creationId xmlns:a16="http://schemas.microsoft.com/office/drawing/2014/main" id="{63FB9BDF-60A7-5237-8E87-EE427F21B96C}"/>
+              </a:ext>
+            </a:extLst>
+          </p:cNvPr>
+          <p:cNvSpPr txBox="1"/>
+          <p:nvPr/>
+        </p:nvSpPr>
+        <p:spPr>
+          <a:xfrm>
+            <a:off x="11553493" y="2673549"/>
+            <a:ext cx="506870" cy="584775"/>
+          </a:xfrm>
+          <a:prstGeom prst="rect">
+            <a:avLst/>
+          </a:prstGeom>
+          <a:noFill/>
+        </p:spPr>
+        <p:txBody>
+          <a:bodyPr wrap="none" rtlCol="0">
+            <a:spAutoFit/>
+          </a:bodyPr>
+          <a:lstStyle/>
+          <a:p>
+            <a:r>
+              <a:rPr lang="en-NL" sz="3200" b="1" dirty="0">
+                <a:solidFill>
+                  <a:srgbClr val="00B050"/>
+                </a:solidFill>
+                <a:sym typeface="Wingdings" panose="05000000000000000000" pitchFamily="2" charset="2"/>
+              </a:rPr>
+              <a:t></a:t>
+            </a:r>
+            <a:endParaRPr lang="en-NL" sz="3200" b="1" dirty="0">
+              <a:solidFill>
+                <a:srgbClr val="00B050"/>
+              </a:solidFill>
+            </a:endParaRPr>
+          </a:p>
+        </p:txBody>
+      </p:sp>
+      <p:sp>
+        <p:nvSpPr>
+          <p:cNvPr id="36" name="TextBox 35">
+            <a:extLst>
+              <a:ext uri="{FF2B5EF4-FFF2-40B4-BE49-F238E27FC236}">
+                <a16:creationId xmlns:a16="http://schemas.microsoft.com/office/drawing/2014/main" id="{90D73178-8C15-8D17-448C-C12295A44CA6}"/>
+              </a:ext>
+            </a:extLst>
+          </p:cNvPr>
+          <p:cNvSpPr txBox="1"/>
+          <p:nvPr/>
+        </p:nvSpPr>
+        <p:spPr>
+          <a:xfrm>
+            <a:off x="11560728" y="3780448"/>
+            <a:ext cx="506870" cy="584775"/>
+          </a:xfrm>
+          <a:prstGeom prst="rect">
+            <a:avLst/>
+          </a:prstGeom>
+          <a:noFill/>
+        </p:spPr>
+        <p:txBody>
+          <a:bodyPr wrap="none" rtlCol="0">
+            <a:spAutoFit/>
+          </a:bodyPr>
+          <a:lstStyle/>
+          <a:p>
+            <a:r>
+              <a:rPr lang="en-NL" sz="3200" b="1" dirty="0">
+                <a:solidFill>
+                  <a:srgbClr val="00B050"/>
+                </a:solidFill>
+                <a:sym typeface="Wingdings" panose="05000000000000000000" pitchFamily="2" charset="2"/>
+              </a:rPr>
+              <a:t></a:t>
+            </a:r>
+            <a:endParaRPr lang="en-NL" sz="3200" b="1" dirty="0">
+              <a:solidFill>
+                <a:srgbClr val="00B050"/>
+              </a:solidFill>
+            </a:endParaRPr>
+          </a:p>
+        </p:txBody>
+      </p:sp>
+      <p:sp>
+        <p:nvSpPr>
+          <p:cNvPr id="37" name="TextBox 36">
+            <a:extLst>
+              <a:ext uri="{FF2B5EF4-FFF2-40B4-BE49-F238E27FC236}">
+                <a16:creationId xmlns:a16="http://schemas.microsoft.com/office/drawing/2014/main" id="{3FE55AF5-57B3-7546-F153-2798CD8F8D15}"/>
+              </a:ext>
+            </a:extLst>
+          </p:cNvPr>
+          <p:cNvSpPr txBox="1"/>
+          <p:nvPr/>
+        </p:nvSpPr>
+        <p:spPr>
+          <a:xfrm>
+            <a:off x="11548622" y="4235738"/>
+            <a:ext cx="506870" cy="584775"/>
+          </a:xfrm>
+          <a:prstGeom prst="rect">
+            <a:avLst/>
+          </a:prstGeom>
+          <a:noFill/>
+        </p:spPr>
+        <p:txBody>
+          <a:bodyPr wrap="none" rtlCol="0">
+            <a:spAutoFit/>
+          </a:bodyPr>
+          <a:lstStyle/>
+          <a:p>
+            <a:r>
+              <a:rPr lang="en-NL" sz="3200" b="1" dirty="0">
+                <a:solidFill>
+                  <a:srgbClr val="00B050"/>
+                </a:solidFill>
+                <a:sym typeface="Wingdings" panose="05000000000000000000" pitchFamily="2" charset="2"/>
+              </a:rPr>
+              <a:t></a:t>
+            </a:r>
+            <a:endParaRPr lang="en-NL" sz="3200" b="1" dirty="0">
+              <a:solidFill>
+                <a:srgbClr val="00B050"/>
+              </a:solidFill>
+            </a:endParaRPr>
+          </a:p>
+        </p:txBody>
+      </p:sp>
+      <p:sp>
+        <p:nvSpPr>
+          <p:cNvPr id="38" name="TextBox 37">
+            <a:extLst>
+              <a:ext uri="{FF2B5EF4-FFF2-40B4-BE49-F238E27FC236}">
+                <a16:creationId xmlns:a16="http://schemas.microsoft.com/office/drawing/2014/main" id="{61469D7F-0FB2-C985-5364-FCC245D66016}"/>
+              </a:ext>
+            </a:extLst>
+          </p:cNvPr>
+          <p:cNvSpPr txBox="1"/>
+          <p:nvPr/>
+        </p:nvSpPr>
+        <p:spPr>
+          <a:xfrm>
+            <a:off x="6240211" y="5892885"/>
+            <a:ext cx="506870" cy="584775"/>
+          </a:xfrm>
+          <a:prstGeom prst="rect">
+            <a:avLst/>
+          </a:prstGeom>
+          <a:noFill/>
+        </p:spPr>
+        <p:txBody>
+          <a:bodyPr wrap="none" rtlCol="0">
+            <a:spAutoFit/>
+          </a:bodyPr>
+          <a:lstStyle/>
+          <a:p>
+            <a:r>
+              <a:rPr lang="en-NL" sz="3200" b="1" dirty="0">
+                <a:solidFill>
+                  <a:srgbClr val="00B050"/>
+                </a:solidFill>
+                <a:sym typeface="Wingdings" panose="05000000000000000000" pitchFamily="2" charset="2"/>
+              </a:rPr>
+              <a:t></a:t>
+            </a:r>
+            <a:endParaRPr lang="en-NL" sz="3200" b="1" dirty="0">
+              <a:solidFill>
+                <a:srgbClr val="00B050"/>
+              </a:solidFill>
+            </a:endParaRPr>
+          </a:p>
+        </p:txBody>
+      </p:sp>
+      <p:sp>
+        <p:nvSpPr>
+          <p:cNvPr id="39" name="TextBox 38">
+            <a:extLst>
+              <a:ext uri="{FF2B5EF4-FFF2-40B4-BE49-F238E27FC236}">
+                <a16:creationId xmlns:a16="http://schemas.microsoft.com/office/drawing/2014/main" id="{B3918BD0-4D3F-538F-7CED-7729B3DCAFEE}"/>
+              </a:ext>
+            </a:extLst>
+          </p:cNvPr>
+          <p:cNvSpPr txBox="1"/>
+          <p:nvPr/>
+        </p:nvSpPr>
+        <p:spPr>
+          <a:xfrm>
+            <a:off x="7158632" y="5890198"/>
+            <a:ext cx="506870" cy="584775"/>
+          </a:xfrm>
+          <a:prstGeom prst="rect">
+            <a:avLst/>
+          </a:prstGeom>
+          <a:noFill/>
+        </p:spPr>
+        <p:txBody>
+          <a:bodyPr wrap="none" rtlCol="0">
+            <a:spAutoFit/>
+          </a:bodyPr>
+          <a:lstStyle/>
+          <a:p>
+            <a:r>
+              <a:rPr lang="en-NL" sz="3200" b="1" dirty="0">
+                <a:ln w="19050">
+                  <a:solidFill>
+                    <a:srgbClr val="00B050"/>
+                  </a:solidFill>
+                </a:ln>
+                <a:solidFill>
+                  <a:schemeClr val="bg1"/>
+                </a:solidFill>
+                <a:sym typeface="Wingdings" panose="05000000000000000000" pitchFamily="2" charset="2"/>
+              </a:rPr>
+              <a:t></a:t>
+            </a:r>
+            <a:endParaRPr lang="en-NL" sz="3200" b="1" dirty="0">
+              <a:ln w="19050">
+                <a:solidFill>
+                  <a:srgbClr val="00B050"/>
+                </a:solidFill>
+              </a:ln>
+              <a:solidFill>
+                <a:schemeClr val="bg1"/>
+              </a:solidFill>
+            </a:endParaRPr>
+          </a:p>
+        </p:txBody>
+      </p:sp>
+      <p:sp>
+        <p:nvSpPr>
+          <p:cNvPr id="40" name="TextBox 39">
+            <a:extLst>
+              <a:ext uri="{FF2B5EF4-FFF2-40B4-BE49-F238E27FC236}">
+                <a16:creationId xmlns:a16="http://schemas.microsoft.com/office/drawing/2014/main" id="{231989F2-255E-D1FB-AAA0-99D7A8A7CA1A}"/>
+              </a:ext>
+            </a:extLst>
+          </p:cNvPr>
+          <p:cNvSpPr txBox="1"/>
+          <p:nvPr/>
+        </p:nvSpPr>
+        <p:spPr>
+          <a:xfrm>
+            <a:off x="1708317" y="5964545"/>
+            <a:ext cx="506870" cy="584775"/>
+          </a:xfrm>
+          <a:prstGeom prst="rect">
+            <a:avLst/>
+          </a:prstGeom>
+          <a:noFill/>
+          <a:ln>
+            <a:solidFill>
+              <a:schemeClr val="tx1"/>
+            </a:solidFill>
+            <a:prstDash val="dash"/>
+          </a:ln>
+        </p:spPr>
+        <p:txBody>
+          <a:bodyPr wrap="none" rtlCol="0">
+            <a:spAutoFit/>
+          </a:bodyPr>
+          <a:lstStyle/>
+          <a:p>
+            <a:r>
+              <a:rPr lang="en-NL" sz="3200" b="1" dirty="0">
+                <a:ln w="19050">
+                  <a:solidFill>
+                    <a:srgbClr val="00B050"/>
+                  </a:solidFill>
+                  <a:prstDash val="sysDot"/>
+                </a:ln>
+                <a:solidFill>
+                  <a:schemeClr val="bg1"/>
+                </a:solidFill>
+                <a:sym typeface="Wingdings" panose="05000000000000000000" pitchFamily="2" charset="2"/>
+              </a:rPr>
+              <a:t></a:t>
+            </a:r>
+            <a:endParaRPr lang="en-NL" sz="3200" b="1" dirty="0">
+              <a:ln w="19050">
+                <a:solidFill>
+                  <a:srgbClr val="00B050"/>
+                </a:solidFill>
+                <a:prstDash val="sysDot"/>
+              </a:ln>
+              <a:solidFill>
+                <a:schemeClr val="bg1"/>
+              </a:solidFill>
+            </a:endParaRPr>
+          </a:p>
+        </p:txBody>
+      </p:sp>
     </p:spTree>
     <p:extLst>
       <p:ext uri="{BB962C8B-B14F-4D97-AF65-F5344CB8AC3E}">
@@ -36651,15 +37449,7 @@
           <a:p>
             <a:r>
               <a:rPr lang="en-US" dirty="0"/>
-              <a:t>Further info: Talk at </a:t>
-            </a:r>
-            <a:r>
-              <a:rPr lang="en-US" dirty="0" err="1"/>
-              <a:t>LangDev</a:t>
-            </a:r>
-            <a:r>
-              <a:rPr lang="en-US" dirty="0"/>
-              <a:t> ‘23</a:t>
+              <a:t>Further info</a:t>
             </a:r>
             <a:endParaRPr lang="en-NL" dirty="0"/>
           </a:p>
@@ -36692,16 +37482,91 @@
           <a:lstStyle/>
           <a:p>
             <a:r>
+              <a:rPr lang="en-US" dirty="0"/>
+              <a:t>Introduction</a:t>
+            </a:r>
+          </a:p>
+          <a:p>
+            <a:pPr lvl="1"/>
+            <a:r>
+              <a:rPr lang="en-US" dirty="0"/>
+              <a:t>Talk at </a:t>
+            </a:r>
+            <a:r>
+              <a:rPr lang="en-US" dirty="0" err="1"/>
+              <a:t>LangDev</a:t>
+            </a:r>
+            <a:r>
+              <a:rPr lang="en-US" dirty="0"/>
+              <a:t> 2023 </a:t>
+            </a:r>
+            <a:r>
+              <a:rPr lang="nl-NL" dirty="0"/>
+              <a:t>(</a:t>
+            </a:r>
+            <a:r>
               <a:rPr lang="nl-NL" dirty="0">
                 <a:hlinkClick r:id="rId2"/>
               </a:rPr>
-              <a:t>https://lionweb.io/#documentation</a:t>
+              <a:t>slides</a:t>
             </a:r>
             <a:r>
               <a:rPr lang="nl-NL" dirty="0"/>
-              <a:t> </a:t>
+              <a:t>, </a:t>
             </a:r>
-            <a:endParaRPr lang="en-NL" dirty="0"/>
+            <a:r>
+              <a:rPr lang="nl-NL" dirty="0">
+                <a:hlinkClick r:id="rId3"/>
+              </a:rPr>
+              <a:t>video</a:t>
+            </a:r>
+            <a:r>
+              <a:rPr lang="nl-NL" dirty="0"/>
+              <a:t>)</a:t>
+            </a:r>
+          </a:p>
+          <a:p>
+            <a:endParaRPr lang="nl-NL" dirty="0"/>
+          </a:p>
+          <a:p>
+            <a:r>
+              <a:rPr lang="en-US" b="1" dirty="0"/>
+              <a:t>Working documents</a:t>
+            </a:r>
+          </a:p>
+          <a:p>
+            <a:pPr lvl="1"/>
+            <a:r>
+              <a:rPr lang="en-US" dirty="0">
+                <a:hlinkClick r:id="rId4"/>
+              </a:rPr>
+              <a:t>Roadmap</a:t>
+            </a:r>
+            <a:endParaRPr lang="en-US" dirty="0"/>
+          </a:p>
+          <a:p>
+            <a:pPr lvl="1"/>
+            <a:r>
+              <a:rPr lang="en-US" dirty="0">
+                <a:hlinkClick r:id="rId5"/>
+              </a:rPr>
+              <a:t>Reference Architecture</a:t>
+            </a:r>
+            <a:endParaRPr lang="en-US" dirty="0"/>
+          </a:p>
+          <a:p>
+            <a:pPr lvl="1"/>
+            <a:r>
+              <a:rPr lang="en-US" dirty="0">
+                <a:hlinkClick r:id="rId6"/>
+              </a:rPr>
+              <a:t>Use Cases</a:t>
+            </a:r>
+            <a:endParaRPr lang="en-US" dirty="0"/>
+          </a:p>
+          <a:p>
+            <a:pPr lvl="1"/>
+            <a:endParaRPr lang="en-US" dirty="0"/>
           </a:p>
         </p:txBody>
       </p:sp>
@@ -36720,10 +37585,10 @@
           <p:nvPr/>
         </p:nvPicPr>
         <p:blipFill>
-          <a:blip r:embed="rId3">
+          <a:blip r:embed="rId7">
             <a:extLst>
               <a:ext uri="{96DAC541-7B7A-43D3-8B79-37D633B846F1}">
-                <asvg:svgBlip xmlns:asvg="http://schemas.microsoft.com/office/drawing/2016/SVG/main" r:embed="rId4"/>
+                <asvg:svgBlip xmlns:asvg="http://schemas.microsoft.com/office/drawing/2016/SVG/main" r:embed="rId8"/>
               </a:ext>
             </a:extLst>
           </a:blip>
@@ -36926,7 +37791,7 @@
           <a:p>
             <a:r>
               <a:rPr lang="en-US" dirty="0"/>
-              <a:t>Talks at Conferences</a:t>
+              <a:t>Talks and Presentations</a:t>
             </a:r>
             <a:endParaRPr lang="en-NL" dirty="0"/>
           </a:p>
@@ -36959,50 +37824,107 @@
           <a:lstStyle/>
           <a:p>
             <a:r>
-              <a:rPr lang="nl-NL" dirty="0" err="1"/>
-              <a:t>Presented</a:t>
-            </a:r>
-            <a:r>
-              <a:rPr lang="nl-NL" dirty="0"/>
-              <a:t> at </a:t>
-            </a:r>
-            <a:r>
-              <a:rPr lang="nl-NL" dirty="0" err="1"/>
-              <a:t>universities</a:t>
-            </a:r>
-            <a:r>
-              <a:rPr lang="nl-NL" dirty="0"/>
-              <a:t> Essen, Aachen</a:t>
+              <a:rPr lang="en-US" dirty="0"/>
+              <a:t>Conferences</a:t>
             </a:r>
           </a:p>
           <a:p>
+            <a:pPr lvl="1"/>
             <a:r>
-              <a:rPr lang="nl-NL" dirty="0" err="1"/>
-              <a:t>Presented</a:t>
+              <a:rPr lang="en-US" dirty="0" err="1">
+                <a:hlinkClick r:id="rId2"/>
+              </a:rPr>
+              <a:t>LangDev</a:t>
             </a:r>
             <a:r>
-              <a:rPr lang="nl-NL" dirty="0"/>
-              <a:t> at </a:t>
+              <a:rPr lang="en-US" dirty="0">
+                <a:hlinkClick r:id="rId2"/>
+              </a:rPr>
+              <a:t> 2023</a:t>
             </a:r>
+            <a:endParaRPr lang="en-US" dirty="0"/>
+          </a:p>
+          <a:p>
+            <a:pPr lvl="1"/>
             <a:r>
-              <a:rPr lang="nl-NL" dirty="0" err="1"/>
+              <a:rPr lang="en-US" dirty="0">
+                <a:hlinkClick r:id="rId3"/>
+              </a:rPr>
+              <a:t>SEN Symposium 2024</a:t>
+            </a:r>
+            <a:endParaRPr lang="en-US" dirty="0"/>
+          </a:p>
+          <a:p>
+            <a:pPr lvl="1"/>
+            <a:r>
+              <a:rPr lang="en-US" dirty="0">
+                <a:hlinkClick r:id="rId4"/>
+              </a:rPr>
+              <a:t>MODELS 2024</a:t>
+            </a:r>
+            <a:endParaRPr lang="en-US" dirty="0"/>
+          </a:p>
+          <a:p>
+            <a:pPr lvl="1"/>
+            <a:endParaRPr lang="en-US" dirty="0"/>
+          </a:p>
+          <a:p>
+            <a:r>
+              <a:rPr lang="en-US" dirty="0"/>
+              <a:t>Meetups</a:t>
+            </a:r>
+          </a:p>
+          <a:p>
+            <a:pPr lvl="1"/>
+            <a:r>
+              <a:rPr lang="en-US" dirty="0">
+                <a:hlinkClick r:id="rId5"/>
+              </a:rPr>
+              <a:t>MPS Community Meetup 2023</a:t>
+            </a:r>
+            <a:endParaRPr lang="en-US" dirty="0"/>
+          </a:p>
+          <a:p>
+            <a:pPr lvl="1"/>
+            <a:r>
+              <a:rPr lang="en-US" dirty="0" err="1">
+                <a:hlinkClick r:id="rId6"/>
+              </a:rPr>
               <a:t>Strumenta</a:t>
             </a:r>
             <a:r>
-              <a:rPr lang="nl-NL" dirty="0"/>
-              <a:t> </a:t>
+              <a:rPr lang="en-US" dirty="0">
+                <a:hlinkClick r:id="rId6"/>
+              </a:rPr>
+              <a:t> Community Panel Session</a:t>
             </a:r>
+            <a:endParaRPr lang="en-US" dirty="0"/>
+          </a:p>
+          <a:p>
+            <a:endParaRPr lang="en-US" dirty="0"/>
+          </a:p>
+          <a:p>
             <a:r>
-              <a:rPr lang="nl-NL" dirty="0" err="1"/>
-              <a:t>meetup</a:t>
-            </a:r>
-            <a:r>
-              <a:rPr lang="nl-NL" dirty="0"/>
-              <a:t>, VERSEN, MODELS</a:t>
+              <a:rPr lang="en-US" dirty="0"/>
+              <a:t>Universities</a:t>
             </a:r>
           </a:p>
           <a:p>
-            <a:endParaRPr lang="en-NL" dirty="0"/>
+            <a:pPr lvl="1"/>
+            <a:r>
+              <a:rPr lang="en-US" dirty="0"/>
+              <a:t>Essen</a:t>
+            </a:r>
+          </a:p>
+          <a:p>
+            <a:pPr lvl="1"/>
+            <a:r>
+              <a:rPr lang="en-US" dirty="0"/>
+              <a:t>Aachen</a:t>
+            </a:r>
+          </a:p>
+          <a:p>
+            <a:endParaRPr lang="en-US" dirty="0"/>
           </a:p>
         </p:txBody>
       </p:sp>
@@ -37021,10 +37943,10 @@
           <p:nvPr/>
         </p:nvPicPr>
         <p:blipFill>
-          <a:blip r:embed="rId2">
+          <a:blip r:embed="rId7">
             <a:extLst>
               <a:ext uri="{96DAC541-7B7A-43D3-8B79-37D633B846F1}">
-                <asvg:svgBlip xmlns:asvg="http://schemas.microsoft.com/office/drawing/2016/SVG/main" r:embed="rId3"/>
+                <asvg:svgBlip xmlns:asvg="http://schemas.microsoft.com/office/drawing/2016/SVG/main" r:embed="rId8"/>
               </a:ext>
             </a:extLst>
           </a:blip>
@@ -37273,7 +38195,7 @@
           <p:cNvPr id="2" name="Title 1">
             <a:extLst>
               <a:ext uri="{FF2B5EF4-FFF2-40B4-BE49-F238E27FC236}">
-                <a16:creationId xmlns:a16="http://schemas.microsoft.com/office/drawing/2014/main" id="{D964022D-3221-7E36-911B-090803A2433E}"/>
+                <a16:creationId xmlns:a16="http://schemas.microsoft.com/office/drawing/2014/main" id="{78699FD9-99A0-5587-382A-DFE4466882D1}"/>
               </a:ext>
             </a:extLst>
           </p:cNvPr>
@@ -37284,21 +38206,14 @@
             <p:ph type="title"/>
           </p:nvPr>
         </p:nvSpPr>
-        <p:spPr>
-          <a:xfrm>
-            <a:off x="0" y="0"/>
-            <a:ext cx="12192000" cy="1264249"/>
-          </a:xfrm>
-        </p:spPr>
+        <p:spPr/>
         <p:txBody>
-          <a:bodyPr>
-            <a:normAutofit/>
-          </a:bodyPr>
+          <a:bodyPr/>
           <a:lstStyle/>
           <a:p>
             <a:r>
               <a:rPr lang="en-US" dirty="0"/>
-              <a:t>(Freon)</a:t>
+              <a:t>Interested Parties</a:t>
             </a:r>
             <a:endParaRPr lang="en-NL" dirty="0"/>
           </a:p>
@@ -37306,10 +38221,10 @@
       </p:sp>
       <p:sp>
         <p:nvSpPr>
-          <p:cNvPr id="6" name="Content Placeholder 5">
+          <p:cNvPr id="3" name="Content Placeholder 2">
             <a:extLst>
               <a:ext uri="{FF2B5EF4-FFF2-40B4-BE49-F238E27FC236}">
-                <a16:creationId xmlns:a16="http://schemas.microsoft.com/office/drawing/2014/main" id="{508C1E28-B038-AE9D-947C-22317E089E1D}"/>
+                <a16:creationId xmlns:a16="http://schemas.microsoft.com/office/drawing/2014/main" id="{1EF446B0-7A92-2E76-9146-8639BA76BF7B}"/>
               </a:ext>
             </a:extLst>
           </p:cNvPr>
@@ -37326,52 +38241,50 @@
           <a:lstStyle/>
           <a:p>
             <a:r>
-              <a:rPr lang="en-NL" dirty="0"/>
-              <a:t>No need for this sheet,  mentioned in Real-world usage</a:t>
+              <a:rPr lang="en-US" dirty="0"/>
+              <a:t>TODO: Do we want that slide? We’d need to talk to each</a:t>
             </a:r>
+          </a:p>
+          <a:p>
+            <a:endParaRPr lang="en-US" dirty="0"/>
+          </a:p>
+          <a:p>
+            <a:r>
+              <a:rPr lang="en-US" dirty="0" err="1"/>
+              <a:t>Langium</a:t>
+            </a:r>
+            <a:endParaRPr lang="en-US" dirty="0"/>
+          </a:p>
+          <a:p>
+            <a:r>
+              <a:rPr lang="en-US" dirty="0"/>
+              <a:t>JetBrains </a:t>
+            </a:r>
+            <a:r>
+              <a:rPr lang="en-US" dirty="0" err="1"/>
+              <a:t>WebMPS</a:t>
+            </a:r>
+            <a:endParaRPr lang="en-US" dirty="0"/>
+          </a:p>
+          <a:p>
+            <a:r>
+              <a:rPr lang="en-US" dirty="0" err="1"/>
+              <a:t>Metadev</a:t>
+            </a:r>
+            <a:r>
+              <a:rPr lang="en-US" dirty="0"/>
+              <a:t> Orca</a:t>
+            </a:r>
+          </a:p>
+          <a:p>
+            <a:endParaRPr lang="en-NL" dirty="0"/>
           </a:p>
         </p:txBody>
       </p:sp>
-      <p:pic>
-        <p:nvPicPr>
-          <p:cNvPr id="3" name="Graphic 2">
-            <a:extLst>
-              <a:ext uri="{FF2B5EF4-FFF2-40B4-BE49-F238E27FC236}">
-                <a16:creationId xmlns:a16="http://schemas.microsoft.com/office/drawing/2014/main" id="{2A8BAF5D-69B7-49FB-6496-2E72CFFBF963}"/>
-              </a:ext>
-            </a:extLst>
-          </p:cNvPr>
-          <p:cNvPicPr>
-            <a:picLocks noChangeAspect="1"/>
-          </p:cNvPicPr>
-          <p:nvPr/>
-        </p:nvPicPr>
-        <p:blipFill>
-          <a:blip r:embed="rId2">
-            <a:extLst>
-              <a:ext uri="{96DAC541-7B7A-43D3-8B79-37D633B846F1}">
-                <asvg:svgBlip xmlns:asvg="http://schemas.microsoft.com/office/drawing/2016/SVG/main" r:embed="rId3"/>
-              </a:ext>
-            </a:extLst>
-          </a:blip>
-          <a:stretch>
-            <a:fillRect/>
-          </a:stretch>
-        </p:blipFill>
-        <p:spPr>
-          <a:xfrm>
-            <a:off x="10931467" y="68262"/>
-            <a:ext cx="1121757" cy="1127724"/>
-          </a:xfrm>
-          <a:prstGeom prst="rect">
-            <a:avLst/>
-          </a:prstGeom>
-        </p:spPr>
-      </p:pic>
     </p:spTree>
     <p:extLst>
       <p:ext uri="{BB962C8B-B14F-4D97-AF65-F5344CB8AC3E}">
-        <p14:creationId xmlns:p14="http://schemas.microsoft.com/office/powerpoint/2010/main" val="86331971"/>
+        <p14:creationId xmlns:p14="http://schemas.microsoft.com/office/powerpoint/2010/main" val="3642432197"/>
       </p:ext>
     </p:extLst>
   </p:cSld>

</xml_diff>

<commit_message>
changes during core team discussion
</commit_message>
<xml_diff>
--- a/resources/LangDev 2024 Talk.pptx
+++ b/resources/LangDev 2024 Talk.pptx
@@ -5,7 +5,7 @@
     <p:sldMasterId id="2147483648" r:id="rId1"/>
   </p:sldMasterIdLst>
   <p:notesMasterIdLst>
-    <p:notesMasterId r:id="rId34"/>
+    <p:notesMasterId r:id="rId31"/>
   </p:notesMasterIdLst>
   <p:sldIdLst>
     <p:sldId id="266" r:id="rId2"/>
@@ -37,9 +37,6 @@
     <p:sldId id="329" r:id="rId28"/>
     <p:sldId id="331" r:id="rId29"/>
     <p:sldId id="324" r:id="rId30"/>
-    <p:sldId id="319" r:id="rId31"/>
-    <p:sldId id="320" r:id="rId32"/>
-    <p:sldId id="321" r:id="rId33"/>
   </p:sldIdLst>
   <p:sldSz cx="12192000" cy="6858000"/>
   <p:notesSz cx="6858000" cy="9144000"/>
@@ -3612,12 +3609,12 @@
     <dgm:cxn modelId="{25BA2731-2CA3-A64C-8556-6E1E23B1C9B8}" type="presOf" srcId="{189425EE-D43E-294D-8B36-254B971B826A}" destId="{2319823D-AB26-544C-9C6D-CF510A6E0BE2}" srcOrd="0" destOrd="0" presId="urn:microsoft.com/office/officeart/2009/layout/CirclePictureHierarchy"/>
     <dgm:cxn modelId="{E46DA632-6AFE-3F40-A695-2210A0368B98}" type="presOf" srcId="{1F5579C1-214E-1F45-BBFE-2626B34C5F36}" destId="{18065C05-7756-6747-B5FD-BAD510BA0F81}" srcOrd="0" destOrd="0" presId="urn:microsoft.com/office/officeart/2009/layout/CirclePictureHierarchy"/>
     <dgm:cxn modelId="{FE6CB63D-1136-0F49-93BB-385DE2FD2B8E}" srcId="{2F00C97E-86D5-FB44-896C-689FCDC1B423}" destId="{FFCD8269-6359-0B47-B683-B39C21E9289F}" srcOrd="0" destOrd="0" parTransId="{0B93AAD1-11C9-8F4C-B3D6-6787A9A8BD2E}" sibTransId="{35CAE358-5E66-C64A-A808-2AF9E0F7AA94}"/>
+    <dgm:cxn modelId="{DF374D68-72D3-6547-9BBA-5BF892EE18D8}" type="presOf" srcId="{84A69D06-4DCA-B644-8933-369AE4F3E19B}" destId="{6B3386BD-CF2E-384B-BE09-BF57C1348A3B}" srcOrd="0" destOrd="0" presId="urn:microsoft.com/office/officeart/2009/layout/CirclePictureHierarchy"/>
+    <dgm:cxn modelId="{A2020D6E-8C1E-BB47-A738-072D16ABED0D}" type="presOf" srcId="{FFCD8269-6359-0B47-B683-B39C21E9289F}" destId="{F749A1ED-7DC7-7642-8B05-9AB36ED104A8}" srcOrd="0" destOrd="0" presId="urn:microsoft.com/office/officeart/2009/layout/CirclePictureHierarchy"/>
     <dgm:cxn modelId="{BBAD8D4E-C3BB-404E-8F7D-D68E55FC7D02}" type="presOf" srcId="{B51E94E8-5EBB-F140-A967-A9BAB466450A}" destId="{81290B24-1AEC-2440-AB9A-0CF3FB71623B}" srcOrd="0" destOrd="0" presId="urn:microsoft.com/office/officeart/2009/layout/CirclePictureHierarchy"/>
     <dgm:cxn modelId="{D3569455-BD10-0842-B6B1-7E3B6FFF394F}" type="presOf" srcId="{ECC3DEB8-0051-1147-847C-7DCC2DFAACFA}" destId="{B6331A6E-3FA1-D84A-AD41-2FD4EC05420E}" srcOrd="0" destOrd="0" presId="urn:microsoft.com/office/officeart/2009/layout/CirclePictureHierarchy"/>
     <dgm:cxn modelId="{368AD655-5653-FB4C-9C61-8D2114FDA1A0}" type="presOf" srcId="{82248127-34D8-824E-9AB2-807628697886}" destId="{9873AD2C-7B29-304E-AB8A-D1C524EFA026}" srcOrd="0" destOrd="0" presId="urn:microsoft.com/office/officeart/2009/layout/CirclePictureHierarchy"/>
     <dgm:cxn modelId="{3DE82459-51F7-FD4F-96CE-A1DD3F31D4BE}" type="presOf" srcId="{01101797-645F-384B-A269-7880D06CCAA2}" destId="{C1151D66-2E81-6243-93E9-06E11E58AAE2}" srcOrd="0" destOrd="0" presId="urn:microsoft.com/office/officeart/2009/layout/CirclePictureHierarchy"/>
-    <dgm:cxn modelId="{DF374D68-72D3-6547-9BBA-5BF892EE18D8}" type="presOf" srcId="{84A69D06-4DCA-B644-8933-369AE4F3E19B}" destId="{6B3386BD-CF2E-384B-BE09-BF57C1348A3B}" srcOrd="0" destOrd="0" presId="urn:microsoft.com/office/officeart/2009/layout/CirclePictureHierarchy"/>
-    <dgm:cxn modelId="{A2020D6E-8C1E-BB47-A738-072D16ABED0D}" type="presOf" srcId="{FFCD8269-6359-0B47-B683-B39C21E9289F}" destId="{F749A1ED-7DC7-7642-8B05-9AB36ED104A8}" srcOrd="0" destOrd="0" presId="urn:microsoft.com/office/officeart/2009/layout/CirclePictureHierarchy"/>
     <dgm:cxn modelId="{6615D97B-5F0B-1847-B2F7-7E552C21C7D7}" type="presOf" srcId="{2F00C97E-86D5-FB44-896C-689FCDC1B423}" destId="{F84B2064-2101-194A-A846-1CB18CDACF7A}" srcOrd="0" destOrd="0" presId="urn:microsoft.com/office/officeart/2009/layout/CirclePictureHierarchy"/>
     <dgm:cxn modelId="{2D306C88-2ABF-CE4F-A8E4-4A9C5FA754D5}" type="presOf" srcId="{38A29F5E-CDED-D54B-8DAF-2D4844B29446}" destId="{DF642858-1507-A945-87B3-0F4EABEE3323}" srcOrd="0" destOrd="0" presId="urn:microsoft.com/office/officeart/2009/layout/CirclePictureHierarchy"/>
     <dgm:cxn modelId="{5404648A-F59C-4741-98C9-06E0EBBEC599}" srcId="{FFCD8269-6359-0B47-B683-B39C21E9289F}" destId="{82248127-34D8-824E-9AB2-807628697886}" srcOrd="1" destOrd="0" parTransId="{E561224A-6CBA-BF40-8B37-C4256F3A6D00}" sibTransId="{B3D968AC-113C-DD42-AF76-07613FD75DD5}"/>
@@ -4031,10 +4028,10 @@
     <dgm:cxn modelId="{CDF33511-A81F-C847-A004-BFB2176AE406}" srcId="{FFCD8269-6359-0B47-B683-B39C21E9289F}" destId="{896AECA1-542B-5A4B-8317-777732D893D0}" srcOrd="1" destOrd="0" parTransId="{DAEBC619-7AED-5C43-9371-006DFC18CDE5}" sibTransId="{891D6C4C-AF1C-8D45-9C15-B8E13EEE7AA2}"/>
     <dgm:cxn modelId="{28E96B20-5EF5-A548-8A92-AF22968294B2}" type="presOf" srcId="{7E4E3A51-D450-C448-B7EE-CEB39CCB71A3}" destId="{850591A1-1303-FC40-8081-23D41A324AC2}" srcOrd="0" destOrd="0" presId="urn:microsoft.com/office/officeart/2009/layout/CirclePictureHierarchy"/>
     <dgm:cxn modelId="{FE6CB63D-1136-0F49-93BB-385DE2FD2B8E}" srcId="{01101797-645F-384B-A269-7880D06CCAA2}" destId="{FFCD8269-6359-0B47-B683-B39C21E9289F}" srcOrd="0" destOrd="0" parTransId="{0B93AAD1-11C9-8F4C-B3D6-6787A9A8BD2E}" sibTransId="{35CAE358-5E66-C64A-A808-2AF9E0F7AA94}"/>
+    <dgm:cxn modelId="{DF0FD55C-E3AC-D44B-BDC5-A94A01CF625E}" srcId="{FFCD8269-6359-0B47-B683-B39C21E9289F}" destId="{9F71DB2B-9F4A-E649-B85A-82E20F1FED66}" srcOrd="0" destOrd="0" parTransId="{7E4E3A51-D450-C448-B7EE-CEB39CCB71A3}" sibTransId="{D86D8590-4B76-3045-B3D2-E2495152121A}"/>
+    <dgm:cxn modelId="{DF374D68-72D3-6547-9BBA-5BF892EE18D8}" type="presOf" srcId="{84A69D06-4DCA-B644-8933-369AE4F3E19B}" destId="{6B3386BD-CF2E-384B-BE09-BF57C1348A3B}" srcOrd="0" destOrd="0" presId="urn:microsoft.com/office/officeart/2009/layout/CirclePictureHierarchy"/>
     <dgm:cxn modelId="{B15A6850-2C47-984A-85B6-DC16EC662E45}" type="presOf" srcId="{01101797-645F-384B-A269-7880D06CCAA2}" destId="{D80B5D43-A76A-AE4F-869E-FB43EB09E3A6}" srcOrd="0" destOrd="0" presId="urn:microsoft.com/office/officeart/2009/layout/CirclePictureHierarchy"/>
     <dgm:cxn modelId="{8FFA6555-FB04-974F-A7F4-1D16C54C56F2}" type="presOf" srcId="{0B93AAD1-11C9-8F4C-B3D6-6787A9A8BD2E}" destId="{4367957F-1173-EC44-89C3-8A2F56C4944E}" srcOrd="0" destOrd="0" presId="urn:microsoft.com/office/officeart/2009/layout/CirclePictureHierarchy"/>
-    <dgm:cxn modelId="{DF0FD55C-E3AC-D44B-BDC5-A94A01CF625E}" srcId="{FFCD8269-6359-0B47-B683-B39C21E9289F}" destId="{9F71DB2B-9F4A-E649-B85A-82E20F1FED66}" srcOrd="0" destOrd="0" parTransId="{7E4E3A51-D450-C448-B7EE-CEB39CCB71A3}" sibTransId="{D86D8590-4B76-3045-B3D2-E2495152121A}"/>
-    <dgm:cxn modelId="{DF374D68-72D3-6547-9BBA-5BF892EE18D8}" type="presOf" srcId="{84A69D06-4DCA-B644-8933-369AE4F3E19B}" destId="{6B3386BD-CF2E-384B-BE09-BF57C1348A3B}" srcOrd="0" destOrd="0" presId="urn:microsoft.com/office/officeart/2009/layout/CirclePictureHierarchy"/>
     <dgm:cxn modelId="{AEC2D47E-8B66-424B-B109-4BE913876A81}" type="presOf" srcId="{FFCD8269-6359-0B47-B683-B39C21E9289F}" destId="{A4677163-1942-2D4D-8F8F-3C02F6BE1D10}" srcOrd="0" destOrd="0" presId="urn:microsoft.com/office/officeart/2009/layout/CirclePictureHierarchy"/>
     <dgm:cxn modelId="{E7BDA18C-519D-1F49-948D-CE9CF91EDFA3}" srcId="{84A69D06-4DCA-B644-8933-369AE4F3E19B}" destId="{01101797-645F-384B-A269-7880D06CCAA2}" srcOrd="0" destOrd="0" parTransId="{ECC3DEB8-0051-1147-847C-7DCC2DFAACFA}" sibTransId="{5E905DE6-BC88-DC47-ABA7-F4887AC985AB}"/>
     <dgm:cxn modelId="{1778CE8F-6467-6B48-B650-D2485403A93E}" type="presOf" srcId="{F17ACAC4-312E-CF41-820D-9F98D1BE14F2}" destId="{B1D6D055-68FD-CF41-B8BC-1AB29ACF217B}" srcOrd="0" destOrd="0" presId="urn:microsoft.com/office/officeart/2009/layout/CirclePictureHierarchy"/>
@@ -4494,10 +4491,10 @@
     <dgm:cxn modelId="{CDF33511-A81F-C847-A004-BFB2176AE406}" srcId="{FFCD8269-6359-0B47-B683-B39C21E9289F}" destId="{896AECA1-542B-5A4B-8317-777732D893D0}" srcOrd="1" destOrd="0" parTransId="{DAEBC619-7AED-5C43-9371-006DFC18CDE5}" sibTransId="{891D6C4C-AF1C-8D45-9C15-B8E13EEE7AA2}"/>
     <dgm:cxn modelId="{5667E311-79AB-6746-8DF9-F994B64E432E}" type="presOf" srcId="{DAEBC619-7AED-5C43-9371-006DFC18CDE5}" destId="{ECD7DA7F-1489-2047-8B39-5D77EE2F619F}" srcOrd="0" destOrd="0" presId="urn:microsoft.com/office/officeart/2009/layout/CirclePictureHierarchy"/>
     <dgm:cxn modelId="{FE6CB63D-1136-0F49-93BB-385DE2FD2B8E}" srcId="{01101797-645F-384B-A269-7880D06CCAA2}" destId="{FFCD8269-6359-0B47-B683-B39C21E9289F}" srcOrd="0" destOrd="0" parTransId="{0B93AAD1-11C9-8F4C-B3D6-6787A9A8BD2E}" sibTransId="{35CAE358-5E66-C64A-A808-2AF9E0F7AA94}"/>
+    <dgm:cxn modelId="{DF0FD55C-E3AC-D44B-BDC5-A94A01CF625E}" srcId="{FFCD8269-6359-0B47-B683-B39C21E9289F}" destId="{9F71DB2B-9F4A-E649-B85A-82E20F1FED66}" srcOrd="0" destOrd="0" parTransId="{7E4E3A51-D450-C448-B7EE-CEB39CCB71A3}" sibTransId="{D86D8590-4B76-3045-B3D2-E2495152121A}"/>
     <dgm:cxn modelId="{B2724344-941B-324F-83F9-DFDABD18A837}" srcId="{01101797-645F-384B-A269-7880D06CCAA2}" destId="{076BAFA0-A3A5-C84B-9240-69BBC15267CF}" srcOrd="1" destOrd="0" parTransId="{386E37EA-0902-2840-8961-F751C9D65ECB}" sibTransId="{E20053DF-E82A-6F4B-9CB8-F024A3171C16}"/>
+    <dgm:cxn modelId="{DF374D68-72D3-6547-9BBA-5BF892EE18D8}" type="presOf" srcId="{84A69D06-4DCA-B644-8933-369AE4F3E19B}" destId="{6B3386BD-CF2E-384B-BE09-BF57C1348A3B}" srcOrd="0" destOrd="0" presId="urn:microsoft.com/office/officeart/2009/layout/CirclePictureHierarchy"/>
     <dgm:cxn modelId="{46E0EC56-97DD-1B4B-9923-DC8E0AE4AF90}" type="presOf" srcId="{0B93AAD1-11C9-8F4C-B3D6-6787A9A8BD2E}" destId="{1700B9FF-875C-AE49-ABE8-38182680A9D1}" srcOrd="0" destOrd="0" presId="urn:microsoft.com/office/officeart/2009/layout/CirclePictureHierarchy"/>
-    <dgm:cxn modelId="{DF0FD55C-E3AC-D44B-BDC5-A94A01CF625E}" srcId="{FFCD8269-6359-0B47-B683-B39C21E9289F}" destId="{9F71DB2B-9F4A-E649-B85A-82E20F1FED66}" srcOrd="0" destOrd="0" parTransId="{7E4E3A51-D450-C448-B7EE-CEB39CCB71A3}" sibTransId="{D86D8590-4B76-3045-B3D2-E2495152121A}"/>
-    <dgm:cxn modelId="{DF374D68-72D3-6547-9BBA-5BF892EE18D8}" type="presOf" srcId="{84A69D06-4DCA-B644-8933-369AE4F3E19B}" destId="{6B3386BD-CF2E-384B-BE09-BF57C1348A3B}" srcOrd="0" destOrd="0" presId="urn:microsoft.com/office/officeart/2009/layout/CirclePictureHierarchy"/>
     <dgm:cxn modelId="{7922CF7A-8D23-4F41-894A-977297009C08}" type="presOf" srcId="{076BAFA0-A3A5-C84B-9240-69BBC15267CF}" destId="{4C45DB5F-E5E5-E646-B43C-725EC0AE9E11}" srcOrd="0" destOrd="0" presId="urn:microsoft.com/office/officeart/2009/layout/CirclePictureHierarchy"/>
     <dgm:cxn modelId="{1DDB957C-7F49-A740-9D6F-4AE07860148B}" type="presOf" srcId="{01101797-645F-384B-A269-7880D06CCAA2}" destId="{AB5C572F-235E-B346-8D49-E9F3A52A6F24}" srcOrd="0" destOrd="0" presId="urn:microsoft.com/office/officeart/2009/layout/CirclePictureHierarchy"/>
     <dgm:cxn modelId="{B8C0187D-B130-F54D-9291-657E1A321C2F}" type="presOf" srcId="{7E4E3A51-D450-C448-B7EE-CEB39CCB71A3}" destId="{165D8681-4E1B-DD4D-9473-5C58DCEFB122}" srcOrd="0" destOrd="0" presId="urn:microsoft.com/office/officeart/2009/layout/CirclePictureHierarchy"/>
@@ -14191,7 +14188,7 @@
           <a:p>
             <a:fld id="{A83D55DB-2215-1E4A-893A-2A5EF07198DE}" type="datetimeFigureOut">
               <a:rPr lang="en-NL" smtClean="0"/>
-              <a:t>09/10/2024</a:t>
+              <a:t>11/10/2024</a:t>
             </a:fld>
             <a:endParaRPr lang="en-NL"/>
           </a:p>
@@ -14693,7 +14690,7 @@
           <a:p>
             <a:fld id="{4B15492D-6F0F-2E4F-9FB6-8AD2245E2E8C}" type="datetimeFigureOut">
               <a:rPr lang="en-NL" smtClean="0"/>
-              <a:t>09/10/2024</a:t>
+              <a:t>11/10/2024</a:t>
             </a:fld>
             <a:endParaRPr lang="en-NL"/>
           </a:p>
@@ -14987,7 +14984,7 @@
           <a:p>
             <a:fld id="{4B15492D-6F0F-2E4F-9FB6-8AD2245E2E8C}" type="datetimeFigureOut">
               <a:rPr lang="en-NL" smtClean="0"/>
-              <a:t>09/10/2024</a:t>
+              <a:t>11/10/2024</a:t>
             </a:fld>
             <a:endParaRPr lang="en-NL"/>
           </a:p>
@@ -15471,7 +15468,7 @@
           <a:p>
             <a:fld id="{4B15492D-6F0F-2E4F-9FB6-8AD2245E2E8C}" type="datetimeFigureOut">
               <a:rPr lang="en-NL" smtClean="0"/>
-              <a:t>09/10/2024</a:t>
+              <a:t>11/10/2024</a:t>
             </a:fld>
             <a:endParaRPr lang="en-NL"/>
           </a:p>
@@ -15809,7 +15806,7 @@
           <a:p>
             <a:fld id="{4B15492D-6F0F-2E4F-9FB6-8AD2245E2E8C}" type="datetimeFigureOut">
               <a:rPr lang="en-NL" smtClean="0"/>
-              <a:t>09/10/2024</a:t>
+              <a:t>11/10/2024</a:t>
             </a:fld>
             <a:endParaRPr lang="en-NL"/>
           </a:p>
@@ -16123,7 +16120,7 @@
           <a:p>
             <a:fld id="{4B15492D-6F0F-2E4F-9FB6-8AD2245E2E8C}" type="datetimeFigureOut">
               <a:rPr lang="en-NL" smtClean="0"/>
-              <a:t>09/10/2024</a:t>
+              <a:t>11/10/2024</a:t>
             </a:fld>
             <a:endParaRPr lang="en-NL"/>
           </a:p>
@@ -16301,7 +16298,7 @@
           <a:p>
             <a:fld id="{4B15492D-6F0F-2E4F-9FB6-8AD2245E2E8C}" type="datetimeFigureOut">
               <a:rPr lang="en-NL" smtClean="0"/>
-              <a:t>09/10/2024</a:t>
+              <a:t>11/10/2024</a:t>
             </a:fld>
             <a:endParaRPr lang="en-NL"/>
           </a:p>
@@ -16450,7 +16447,7 @@
           <a:p>
             <a:fld id="{4B15492D-6F0F-2E4F-9FB6-8AD2245E2E8C}" type="datetimeFigureOut">
               <a:rPr lang="en-NL" smtClean="0"/>
-              <a:t>09/10/2024</a:t>
+              <a:t>11/10/2024</a:t>
             </a:fld>
             <a:endParaRPr lang="en-NL"/>
           </a:p>
@@ -16763,7 +16760,7 @@
           <a:p>
             <a:fld id="{4B15492D-6F0F-2E4F-9FB6-8AD2245E2E8C}" type="datetimeFigureOut">
               <a:rPr lang="en-NL" smtClean="0"/>
-              <a:t>09/10/2024</a:t>
+              <a:t>11/10/2024</a:t>
             </a:fld>
             <a:endParaRPr lang="en-NL"/>
           </a:p>
@@ -17056,7 +17053,7 @@
           <a:p>
             <a:fld id="{4B15492D-6F0F-2E4F-9FB6-8AD2245E2E8C}" type="datetimeFigureOut">
               <a:rPr lang="en-NL" smtClean="0"/>
-              <a:t>09/10/2024</a:t>
+              <a:t>11/10/2024</a:t>
             </a:fld>
             <a:endParaRPr lang="en-NL"/>
           </a:p>
@@ -17256,7 +17253,7 @@
           <a:p>
             <a:fld id="{4B15492D-6F0F-2E4F-9FB6-8AD2245E2E8C}" type="datetimeFigureOut">
               <a:rPr lang="en-NL" smtClean="0"/>
-              <a:t>09/10/2024</a:t>
+              <a:t>11/10/2024</a:t>
             </a:fld>
             <a:endParaRPr lang="en-NL"/>
           </a:p>
@@ -17541,7 +17538,7 @@
             <a:fld id="{4B15492D-6F0F-2E4F-9FB6-8AD2245E2E8C}" type="datetimeFigureOut">
               <a:rPr lang="en-NL" smtClean="0"/>
               <a:pPr/>
-              <a:t>09/10/2024</a:t>
+              <a:t>11/10/2024</a:t>
             </a:fld>
             <a:endParaRPr lang="en-NL" dirty="0"/>
           </a:p>
@@ -22123,7 +22120,7 @@
           <p:nvPr>
             <p:extLst>
               <p:ext uri="{D42A27DB-BD31-4B8C-83A1-F6EECF244321}">
-                <p14:modId xmlns:p14="http://schemas.microsoft.com/office/powerpoint/2010/main" val="1203834876"/>
+                <p14:modId xmlns:p14="http://schemas.microsoft.com/office/powerpoint/2010/main" val="3195930362"/>
               </p:ext>
             </p:extLst>
           </p:nvPr>
@@ -22363,7 +22360,7 @@
                         <a:rPr lang="en-GB" sz="1600" b="0" i="0" dirty="0">
                           <a:latin typeface="Gill Sans MT" panose="020B0502020104020203" pitchFamily="34" charset="77"/>
                         </a:rPr>
-                        <a:t>DSL Consulting</a:t>
+                        <a:t>DSL Consultancy</a:t>
                       </a:r>
                       <a:endParaRPr lang="en-NL" sz="1600" b="0" i="0" dirty="0">
                         <a:latin typeface="Gill Sans MT" panose="020B0502020104020203" pitchFamily="34" charset="77"/>
@@ -22930,14 +22927,14 @@
           <a:p>
             <a:r>
               <a:rPr lang="en-US" dirty="0"/>
-              <a:t>Weekly core team meetings (closed)</a:t>
+              <a:t>Weekly core team meetings</a:t>
             </a:r>
           </a:p>
           <a:p>
             <a:pPr lvl="1"/>
             <a:r>
               <a:rPr lang="en-US" dirty="0"/>
-              <a:t>keep discussions running</a:t>
+              <a:t>keep discussions running (more than 2 years already!)</a:t>
             </a:r>
           </a:p>
           <a:p>
@@ -23153,16 +23150,30 @@
               <a:t>added </a:t>
             </a:r>
             <a:r>
-              <a:rPr lang="en-US" dirty="0" err="1"/>
+              <a:rPr lang="en-US" dirty="0" err="1">
+                <a:latin typeface="Consolas" panose="020B0609020204030204" pitchFamily="49" charset="0"/>
+              </a:rPr>
               <a:t>StructuredDataType</a:t>
             </a:r>
-            <a:endParaRPr lang="en-US" dirty="0"/>
+            <a:endParaRPr lang="en-US" dirty="0">
+              <a:latin typeface="Consolas" panose="020B0609020204030204" pitchFamily="49" charset="0"/>
+            </a:endParaRPr>
           </a:p>
           <a:p>
             <a:pPr lvl="1"/>
             <a:r>
               <a:rPr lang="en-US" dirty="0"/>
-              <a:t>removed JSON </a:t>
+              <a:t>removed </a:t>
+            </a:r>
+            <a:r>
+              <a:rPr lang="en-US" dirty="0">
+                <a:latin typeface="Consolas" panose="020B0609020204030204" pitchFamily="49" charset="0"/>
+              </a:rPr>
+              <a:t>JSON</a:t>
+            </a:r>
+            <a:r>
+              <a:rPr lang="en-US" dirty="0"/>
+              <a:t> </a:t>
             </a:r>
             <a:r>
               <a:rPr lang="en-US" dirty="0" err="1"/>
@@ -25722,6 +25733,13 @@
             </a:r>
           </a:p>
           <a:p>
+            <a:pPr marL="1028700" lvl="1" indent="-342900"/>
+            <a:r>
+              <a:rPr lang="en-US" dirty="0"/>
+              <a:t>language agnostic</a:t>
+            </a:r>
+          </a:p>
+          <a:p>
             <a:r>
               <a:rPr lang="en-US" dirty="0"/>
               <a:t>Supports multiple repositories</a:t>
@@ -25737,6 +25755,13 @@
             <a:r>
               <a:rPr lang="en-US" dirty="0"/>
               <a:t>Optimized methods for uploading huge models</a:t>
+            </a:r>
+          </a:p>
+          <a:p>
+            <a:pPr marL="1028700" lvl="1" indent="-342900"/>
+            <a:r>
+              <a:rPr lang="en-US" dirty="0"/>
+              <a:t>millions of nodes</a:t>
             </a:r>
           </a:p>
           <a:p>
@@ -26030,7 +26055,7 @@
             <a:pPr lvl="1"/>
             <a:r>
               <a:rPr lang="en-US" dirty="0"/>
-              <a:t>server written in TypeScript</a:t>
+              <a:t>written in TypeScript</a:t>
             </a:r>
           </a:p>
           <a:p>
@@ -26456,6 +26481,13 @@
             </a:r>
           </a:p>
           <a:p>
+            <a:pPr marL="1028700" lvl="1" indent="-342900"/>
+            <a:r>
+              <a:rPr lang="en-US" dirty="0"/>
+              <a:t>additional binary wire formats</a:t>
+            </a:r>
+          </a:p>
+          <a:p>
             <a:r>
               <a:rPr lang="en-US" dirty="0"/>
               <a:t>Low-level serialization API, high-level node API</a:t>
@@ -26643,7 +26675,7 @@
           <a:p>
             <a:r>
               <a:rPr lang="en-US" dirty="0"/>
-              <a:t>Kotlin-like adaptions of Java APIs</a:t>
+              <a:t>Idiomatic Kotlin adaptions of Java APIs</a:t>
             </a:r>
           </a:p>
           <a:p>
@@ -26661,7 +26693,7 @@
               <a:rPr lang="en-US" dirty="0" err="1">
                 <a:sym typeface="Wingdings" panose="05000000000000000000" pitchFamily="2" charset="2"/>
               </a:rPr>
-              <a:t>Starlasu</a:t>
+              <a:t>StarLasu</a:t>
             </a:r>
             <a:r>
               <a:rPr lang="en-US" dirty="0">
@@ -26693,7 +26725,7 @@
               <a:rPr lang="en-US" dirty="0">
                 <a:sym typeface="Wingdings" panose="05000000000000000000" pitchFamily="2" charset="2"/>
               </a:rPr>
-              <a:t>mass upload API</a:t>
+              <a:t>huge model upload API</a:t>
             </a:r>
           </a:p>
           <a:p>
@@ -26876,15 +26908,7 @@
               <a:rPr lang="en-US" dirty="0">
                 <a:sym typeface="Wingdings" panose="05000000000000000000" pitchFamily="2" charset="2"/>
               </a:rPr>
-              <a:t> TypeScript types, o</a:t>
-            </a:r>
-            <a:r>
-              <a:rPr lang="en-US" dirty="0"/>
-              <a:t>ptionally reactive using </a:t>
-            </a:r>
-            <a:r>
-              <a:rPr lang="en-US" dirty="0" err="1"/>
-              <a:t>mobx</a:t>
+              <a:t> TypeScript types</a:t>
             </a:r>
             <a:endParaRPr lang="en-US" dirty="0"/>
           </a:p>
@@ -26928,7 +26952,7 @@
             </a:r>
             <a:r>
               <a:rPr lang="en-US" dirty="0"/>
-              <a:t>/mermaid)</a:t>
+              <a:t>/Mermaid)</a:t>
             </a:r>
           </a:p>
           <a:p>
@@ -27115,7 +27139,7 @@
           <a:p>
             <a:r>
               <a:rPr lang="en-US" dirty="0"/>
-              <a:t>MPS Language attributes for LionWeb </a:t>
+              <a:t>MPS language attributes for LionWeb </a:t>
             </a:r>
             <a:r>
               <a:rPr lang="en-US" dirty="0" err="1"/>
@@ -27458,14 +27482,7 @@
             <a:pPr lvl="1"/>
             <a:r>
               <a:rPr lang="en-GB" dirty="0"/>
-              <a:t>store to JSON</a:t>
-            </a:r>
-          </a:p>
-          <a:p>
-            <a:pPr lvl="1"/>
-            <a:r>
-              <a:rPr lang="en-GB" dirty="0"/>
-              <a:t>use in other LionWeb-enabled tools</a:t>
+              <a:t>load/store JSON</a:t>
             </a:r>
           </a:p>
           <a:p>
@@ -27602,6 +27619,55 @@
           <a:bodyPr/>
           <a:lstStyle/>
           <a:p>
+            <a:r>
+              <a:rPr lang="en-US" dirty="0"/>
+              <a:t>M1 (de)serializer, M2 </a:t>
+            </a:r>
+            <a:r>
+              <a:rPr lang="en-US" dirty="0" err="1"/>
+              <a:t>deserializer</a:t>
+            </a:r>
+            <a:endParaRPr lang="en-US" dirty="0"/>
+          </a:p>
+          <a:p>
+            <a:r>
+              <a:rPr lang="en-US" dirty="0"/>
+              <a:t>Annotations, generalizations, references</a:t>
+            </a:r>
+          </a:p>
+          <a:p>
+            <a:r>
+              <a:rPr lang="en-US" dirty="0"/>
+              <a:t>Custom-made pointers and </a:t>
+            </a:r>
+            <a:r>
+              <a:rPr lang="en-US" dirty="0" err="1"/>
+              <a:t>lionspace</a:t>
+            </a:r>
+            <a:r>
+              <a:rPr lang="en-US" dirty="0"/>
+              <a:t> for </a:t>
+            </a:r>
+            <a:r>
+              <a:rPr lang="en-US" dirty="0" err="1"/>
+              <a:t>LionCore</a:t>
+            </a:r>
+            <a:r>
+              <a:rPr lang="en-US" dirty="0"/>
+              <a:t> languages and nodes</a:t>
+            </a:r>
+          </a:p>
+          <a:p>
+            <a:r>
+              <a:rPr lang="en-US" dirty="0"/>
+              <a:t>Rascal terminal to invoke transformations</a:t>
+            </a:r>
+          </a:p>
+          <a:p>
+            <a:r>
+              <a:rPr lang="en-US" dirty="0"/>
+              <a:t>https://github.com/UlyanaTikhonova/lionweb-rascal</a:t>
+            </a:r>
             <a:endParaRPr lang="en-NL" dirty="0"/>
           </a:p>
         </p:txBody>
@@ -27970,7 +28036,7 @@
           </a:lstStyle>
           <a:p>
             <a:r>
-              <a:rPr lang="en-GB" sz="2800" dirty="0">
+              <a:rPr lang="en-GB" sz="2400" dirty="0">
                 <a:latin typeface="Gill Sans MT" panose="020B0502020104020203" pitchFamily="34" charset="77"/>
               </a:rPr>
               <a:t>Team</a:t>
@@ -28189,7 +28255,7 @@
           </a:lstStyle>
           <a:p>
             <a:r>
-              <a:rPr lang="en-GB" sz="2000" dirty="0">
+              <a:rPr lang="en-GB" sz="2400" dirty="0">
                 <a:latin typeface="Gill Sans MT" panose="020B0502020104020203" pitchFamily="34" charset="77"/>
               </a:rPr>
               <a:t>Contact</a:t>
@@ -28241,7 +28307,7 @@
           <a:p>
             <a:pPr>
               <a:tabLst>
-                <a:tab pos="2155825" algn="l"/>
+                <a:tab pos="2508250" algn="l"/>
               </a:tabLst>
             </a:pPr>
             <a:r>
@@ -28281,7 +28347,7 @@
           <a:p>
             <a:pPr>
               <a:tabLst>
-                <a:tab pos="2155825" algn="l"/>
+                <a:tab pos="2508250" algn="l"/>
               </a:tabLst>
             </a:pPr>
             <a:r>
@@ -28300,7 +28366,7 @@
           <a:p>
             <a:pPr>
               <a:tabLst>
-                <a:tab pos="2155825" algn="l"/>
+                <a:tab pos="2508250" algn="l"/>
               </a:tabLst>
             </a:pPr>
             <a:r>
@@ -28327,12 +28393,6 @@
               </a:rPr>
               <a:t>Strumenta</a:t>
             </a:r>
-            <a:r>
-              <a:rPr lang="en-US" dirty="0">
-                <a:latin typeface="Gill Sans MT" panose="020B0502020104020203" pitchFamily="34" charset="77"/>
-              </a:rPr>
-              <a:t> (ANTLR)</a:t>
-            </a:r>
             <a:endParaRPr lang="en-NL" dirty="0">
               <a:latin typeface="Gill Sans MT" panose="020B0502020104020203" pitchFamily="34" charset="77"/>
             </a:endParaRPr>
@@ -28340,7 +28400,7 @@
           <a:p>
             <a:pPr>
               <a:tabLst>
-                <a:tab pos="2155825" algn="l"/>
+                <a:tab pos="2508250" algn="l"/>
               </a:tabLst>
             </a:pPr>
             <a:r>
@@ -28371,7 +28431,7 @@
           <a:p>
             <a:pPr>
               <a:tabLst>
-                <a:tab pos="2155825" algn="l"/>
+                <a:tab pos="2508250" algn="l"/>
               </a:tabLst>
             </a:pPr>
             <a:r>
@@ -28701,375 +28761,6 @@
     <p:extLst>
       <p:ext uri="{BB962C8B-B14F-4D97-AF65-F5344CB8AC3E}">
         <p14:creationId xmlns:p14="http://schemas.microsoft.com/office/powerpoint/2010/main" val="935580841"/>
-      </p:ext>
-    </p:extLst>
-  </p:cSld>
-  <p:clrMapOvr>
-    <a:masterClrMapping/>
-  </p:clrMapOvr>
-</p:sld>
-</file>
-
-<file path=ppt/slides/slide30.xml><?xml version="1.0" encoding="utf-8"?>
-<p:sld xmlns:a="http://schemas.openxmlformats.org/drawingml/2006/main" xmlns:r="http://schemas.openxmlformats.org/officeDocument/2006/relationships" xmlns:p="http://schemas.openxmlformats.org/presentationml/2006/main">
-  <p:cSld>
-    <p:spTree>
-      <p:nvGrpSpPr>
-        <p:cNvPr id="1" name=""/>
-        <p:cNvGrpSpPr/>
-        <p:nvPr/>
-      </p:nvGrpSpPr>
-      <p:grpSpPr>
-        <a:xfrm>
-          <a:off x="0" y="0"/>
-          <a:ext cx="0" cy="0"/>
-          <a:chOff x="0" y="0"/>
-          <a:chExt cx="0" cy="0"/>
-        </a:xfrm>
-      </p:grpSpPr>
-      <p:sp>
-        <p:nvSpPr>
-          <p:cNvPr id="2" name="Title 1">
-            <a:extLst>
-              <a:ext uri="{FF2B5EF4-FFF2-40B4-BE49-F238E27FC236}">
-                <a16:creationId xmlns:a16="http://schemas.microsoft.com/office/drawing/2014/main" id="{D3C8AF22-A3CB-1174-82D4-314AE927CBCD}"/>
-              </a:ext>
-            </a:extLst>
-          </p:cNvPr>
-          <p:cNvSpPr>
-            <a:spLocks noGrp="1"/>
-          </p:cNvSpPr>
-          <p:nvPr>
-            <p:ph type="title"/>
-          </p:nvPr>
-        </p:nvSpPr>
-        <p:spPr>
-          <a:xfrm>
-            <a:off x="0" y="1709738"/>
-            <a:ext cx="12192000" cy="3185396"/>
-          </a:xfrm>
-        </p:spPr>
-        <p:txBody>
-          <a:bodyPr/>
-          <a:lstStyle/>
-          <a:p>
-            <a:r>
-              <a:rPr lang="en-US" dirty="0"/>
-              <a:t>Backup</a:t>
-            </a:r>
-            <a:endParaRPr lang="en-NL" dirty="0"/>
-          </a:p>
-        </p:txBody>
-      </p:sp>
-      <p:sp>
-        <p:nvSpPr>
-          <p:cNvPr id="5" name="Text Placeholder 4">
-            <a:extLst>
-              <a:ext uri="{FF2B5EF4-FFF2-40B4-BE49-F238E27FC236}">
-                <a16:creationId xmlns:a16="http://schemas.microsoft.com/office/drawing/2014/main" id="{4CC05947-9517-F35F-92BF-808FC0E9D3FF}"/>
-              </a:ext>
-            </a:extLst>
-          </p:cNvPr>
-          <p:cNvSpPr>
-            <a:spLocks noGrp="1"/>
-          </p:cNvSpPr>
-          <p:nvPr>
-            <p:ph type="body" idx="1"/>
-          </p:nvPr>
-        </p:nvSpPr>
-        <p:spPr/>
-        <p:txBody>
-          <a:bodyPr/>
-          <a:lstStyle/>
-          <a:p>
-            <a:endParaRPr lang="en-NL"/>
-          </a:p>
-        </p:txBody>
-      </p:sp>
-      <p:pic>
-        <p:nvPicPr>
-          <p:cNvPr id="6" name="Graphic 5">
-            <a:extLst>
-              <a:ext uri="{FF2B5EF4-FFF2-40B4-BE49-F238E27FC236}">
-                <a16:creationId xmlns:a16="http://schemas.microsoft.com/office/drawing/2014/main" id="{D8EB2202-2552-9B62-DBD0-38C0B76A2BBA}"/>
-              </a:ext>
-            </a:extLst>
-          </p:cNvPr>
-          <p:cNvPicPr>
-            <a:picLocks noChangeAspect="1"/>
-          </p:cNvPicPr>
-          <p:nvPr/>
-        </p:nvPicPr>
-        <p:blipFill>
-          <a:blip r:embed="rId2">
-            <a:extLst>
-              <a:ext uri="{96DAC541-7B7A-43D3-8B79-37D633B846F1}">
-                <asvg:svgBlip xmlns:asvg="http://schemas.microsoft.com/office/drawing/2016/SVG/main" r:embed="rId3"/>
-              </a:ext>
-            </a:extLst>
-          </a:blip>
-          <a:stretch>
-            <a:fillRect/>
-          </a:stretch>
-        </p:blipFill>
-        <p:spPr>
-          <a:xfrm>
-            <a:off x="5535121" y="3394947"/>
-            <a:ext cx="1121757" cy="1127724"/>
-          </a:xfrm>
-          <a:prstGeom prst="rect">
-            <a:avLst/>
-          </a:prstGeom>
-        </p:spPr>
-      </p:pic>
-    </p:spTree>
-    <p:extLst>
-      <p:ext uri="{BB962C8B-B14F-4D97-AF65-F5344CB8AC3E}">
-        <p14:creationId xmlns:p14="http://schemas.microsoft.com/office/powerpoint/2010/main" val="75751534"/>
-      </p:ext>
-    </p:extLst>
-  </p:cSld>
-  <p:clrMapOvr>
-    <a:masterClrMapping/>
-  </p:clrMapOvr>
-</p:sld>
-</file>
-
-<file path=ppt/slides/slide31.xml><?xml version="1.0" encoding="utf-8"?>
-<p:sld xmlns:a="http://schemas.openxmlformats.org/drawingml/2006/main" xmlns:r="http://schemas.openxmlformats.org/officeDocument/2006/relationships" xmlns:p="http://schemas.openxmlformats.org/presentationml/2006/main">
-  <p:cSld>
-    <p:spTree>
-      <p:nvGrpSpPr>
-        <p:cNvPr id="1" name=""/>
-        <p:cNvGrpSpPr/>
-        <p:nvPr/>
-      </p:nvGrpSpPr>
-      <p:grpSpPr>
-        <a:xfrm>
-          <a:off x="0" y="0"/>
-          <a:ext cx="0" cy="0"/>
-          <a:chOff x="0" y="0"/>
-          <a:chExt cx="0" cy="0"/>
-        </a:xfrm>
-      </p:grpSpPr>
-      <p:sp>
-        <p:nvSpPr>
-          <p:cNvPr id="2" name="Title 1">
-            <a:extLst>
-              <a:ext uri="{FF2B5EF4-FFF2-40B4-BE49-F238E27FC236}">
-                <a16:creationId xmlns:a16="http://schemas.microsoft.com/office/drawing/2014/main" id="{08FD2630-0129-88C9-0E00-9C4F2946D621}"/>
-              </a:ext>
-            </a:extLst>
-          </p:cNvPr>
-          <p:cNvSpPr>
-            <a:spLocks noGrp="1"/>
-          </p:cNvSpPr>
-          <p:nvPr>
-            <p:ph type="title"/>
-          </p:nvPr>
-        </p:nvSpPr>
-        <p:spPr/>
-        <p:txBody>
-          <a:bodyPr>
-            <a:normAutofit/>
-          </a:bodyPr>
-          <a:lstStyle/>
-          <a:p>
-            <a:r>
-              <a:rPr lang="en-US" dirty="0"/>
-              <a:t>Example Issue: Multiple Inheritance</a:t>
-            </a:r>
-            <a:endParaRPr lang="en-NL" dirty="0"/>
-          </a:p>
-        </p:txBody>
-      </p:sp>
-      <p:sp>
-        <p:nvSpPr>
-          <p:cNvPr id="3" name="Text Placeholder 2">
-            <a:extLst>
-              <a:ext uri="{FF2B5EF4-FFF2-40B4-BE49-F238E27FC236}">
-                <a16:creationId xmlns:a16="http://schemas.microsoft.com/office/drawing/2014/main" id="{E4413443-8780-D402-FBA5-189230D35845}"/>
-              </a:ext>
-            </a:extLst>
-          </p:cNvPr>
-          <p:cNvSpPr>
-            <a:spLocks noGrp="1"/>
-          </p:cNvSpPr>
-          <p:nvPr>
-            <p:ph type="body" idx="1"/>
-          </p:nvPr>
-        </p:nvSpPr>
-        <p:spPr/>
-        <p:txBody>
-          <a:bodyPr/>
-          <a:lstStyle/>
-          <a:p>
-            <a:endParaRPr lang="en-NL"/>
-          </a:p>
-        </p:txBody>
-      </p:sp>
-      <p:pic>
-        <p:nvPicPr>
-          <p:cNvPr id="4" name="Graphic 3">
-            <a:extLst>
-              <a:ext uri="{FF2B5EF4-FFF2-40B4-BE49-F238E27FC236}">
-                <a16:creationId xmlns:a16="http://schemas.microsoft.com/office/drawing/2014/main" id="{59FA73A6-F728-809A-68EE-984E4E55FA4E}"/>
-              </a:ext>
-            </a:extLst>
-          </p:cNvPr>
-          <p:cNvPicPr>
-            <a:picLocks noChangeAspect="1"/>
-          </p:cNvPicPr>
-          <p:nvPr/>
-        </p:nvPicPr>
-        <p:blipFill>
-          <a:blip r:embed="rId2">
-            <a:extLst>
-              <a:ext uri="{96DAC541-7B7A-43D3-8B79-37D633B846F1}">
-                <asvg:svgBlip xmlns:asvg="http://schemas.microsoft.com/office/drawing/2016/SVG/main" r:embed="rId3"/>
-              </a:ext>
-            </a:extLst>
-          </a:blip>
-          <a:stretch>
-            <a:fillRect/>
-          </a:stretch>
-        </p:blipFill>
-        <p:spPr>
-          <a:xfrm>
-            <a:off x="10973281" y="67963"/>
-            <a:ext cx="1121757" cy="1127724"/>
-          </a:xfrm>
-          <a:prstGeom prst="rect">
-            <a:avLst/>
-          </a:prstGeom>
-        </p:spPr>
-      </p:pic>
-    </p:spTree>
-    <p:extLst>
-      <p:ext uri="{BB962C8B-B14F-4D97-AF65-F5344CB8AC3E}">
-        <p14:creationId xmlns:p14="http://schemas.microsoft.com/office/powerpoint/2010/main" val="3885154609"/>
-      </p:ext>
-    </p:extLst>
-  </p:cSld>
-  <p:clrMapOvr>
-    <a:masterClrMapping/>
-  </p:clrMapOvr>
-</p:sld>
-</file>
-
-<file path=ppt/slides/slide32.xml><?xml version="1.0" encoding="utf-8"?>
-<p:sld xmlns:a="http://schemas.openxmlformats.org/drawingml/2006/main" xmlns:r="http://schemas.openxmlformats.org/officeDocument/2006/relationships" xmlns:p="http://schemas.openxmlformats.org/presentationml/2006/main">
-  <p:cSld>
-    <p:spTree>
-      <p:nvGrpSpPr>
-        <p:cNvPr id="1" name=""/>
-        <p:cNvGrpSpPr/>
-        <p:nvPr/>
-      </p:nvGrpSpPr>
-      <p:grpSpPr>
-        <a:xfrm>
-          <a:off x="0" y="0"/>
-          <a:ext cx="0" cy="0"/>
-          <a:chOff x="0" y="0"/>
-          <a:chExt cx="0" cy="0"/>
-        </a:xfrm>
-      </p:grpSpPr>
-      <p:sp>
-        <p:nvSpPr>
-          <p:cNvPr id="2" name="Title 1">
-            <a:extLst>
-              <a:ext uri="{FF2B5EF4-FFF2-40B4-BE49-F238E27FC236}">
-                <a16:creationId xmlns:a16="http://schemas.microsoft.com/office/drawing/2014/main" id="{DE21DF74-0A1A-4D13-5302-91D54D3DF5DB}"/>
-              </a:ext>
-            </a:extLst>
-          </p:cNvPr>
-          <p:cNvSpPr>
-            <a:spLocks noGrp="1"/>
-          </p:cNvSpPr>
-          <p:nvPr>
-            <p:ph type="title"/>
-          </p:nvPr>
-        </p:nvSpPr>
-        <p:spPr/>
-        <p:txBody>
-          <a:bodyPr>
-            <a:normAutofit/>
-          </a:bodyPr>
-          <a:lstStyle/>
-          <a:p>
-            <a:r>
-              <a:rPr lang="en-US" dirty="0"/>
-              <a:t>Example Issue: Derived Models</a:t>
-            </a:r>
-            <a:endParaRPr lang="en-NL" dirty="0"/>
-          </a:p>
-        </p:txBody>
-      </p:sp>
-      <p:sp>
-        <p:nvSpPr>
-          <p:cNvPr id="3" name="Text Placeholder 2">
-            <a:extLst>
-              <a:ext uri="{FF2B5EF4-FFF2-40B4-BE49-F238E27FC236}">
-                <a16:creationId xmlns:a16="http://schemas.microsoft.com/office/drawing/2014/main" id="{876EF2DF-EEC4-6F0D-C2B6-B5F7BC6FC294}"/>
-              </a:ext>
-            </a:extLst>
-          </p:cNvPr>
-          <p:cNvSpPr>
-            <a:spLocks noGrp="1"/>
-          </p:cNvSpPr>
-          <p:nvPr>
-            <p:ph type="body" idx="1"/>
-          </p:nvPr>
-        </p:nvSpPr>
-        <p:spPr/>
-        <p:txBody>
-          <a:bodyPr/>
-          <a:lstStyle/>
-          <a:p>
-            <a:endParaRPr lang="en-NL"/>
-          </a:p>
-        </p:txBody>
-      </p:sp>
-      <p:pic>
-        <p:nvPicPr>
-          <p:cNvPr id="4" name="Graphic 3">
-            <a:extLst>
-              <a:ext uri="{FF2B5EF4-FFF2-40B4-BE49-F238E27FC236}">
-                <a16:creationId xmlns:a16="http://schemas.microsoft.com/office/drawing/2014/main" id="{AF4C969F-9C11-D4A0-0F16-D44B9899863C}"/>
-              </a:ext>
-            </a:extLst>
-          </p:cNvPr>
-          <p:cNvPicPr>
-            <a:picLocks noChangeAspect="1"/>
-          </p:cNvPicPr>
-          <p:nvPr/>
-        </p:nvPicPr>
-        <p:blipFill>
-          <a:blip r:embed="rId2">
-            <a:extLst>
-              <a:ext uri="{96DAC541-7B7A-43D3-8B79-37D633B846F1}">
-                <asvg:svgBlip xmlns:asvg="http://schemas.microsoft.com/office/drawing/2016/SVG/main" r:embed="rId3"/>
-              </a:ext>
-            </a:extLst>
-          </a:blip>
-          <a:stretch>
-            <a:fillRect/>
-          </a:stretch>
-        </p:blipFill>
-        <p:spPr>
-          <a:xfrm>
-            <a:off x="10973281" y="67963"/>
-            <a:ext cx="1121757" cy="1127724"/>
-          </a:xfrm>
-          <a:prstGeom prst="rect">
-            <a:avLst/>
-          </a:prstGeom>
-        </p:spPr>
-      </p:pic>
-    </p:spTree>
-    <p:extLst>
-      <p:ext uri="{BB962C8B-B14F-4D97-AF65-F5344CB8AC3E}">
-        <p14:creationId xmlns:p14="http://schemas.microsoft.com/office/powerpoint/2010/main" val="484315480"/>
       </p:ext>
     </p:extLst>
   </p:cSld>
@@ -42230,8 +41921,12 @@
           </a:p>
           <a:p>
             <a:r>
+              <a:rPr lang="en-US" dirty="0" err="1"/>
+              <a:t>Strumenta</a:t>
+            </a:r>
+            <a:r>
               <a:rPr lang="en-US" dirty="0"/>
-              <a:t>Federico</a:t>
+              <a:t> Code Insight Studio</a:t>
             </a:r>
           </a:p>
           <a:p>
@@ -42381,7 +42076,7 @@
           <a:p>
             <a:r>
               <a:rPr lang="en-US" dirty="0"/>
-              <a:t>Interested Parties</a:t>
+              <a:t>Interested in Integration</a:t>
             </a:r>
             <a:endParaRPr lang="en-NL" dirty="0"/>
           </a:p>
@@ -42414,19 +42109,13 @@
           <a:lstStyle/>
           <a:p>
             <a:r>
-              <a:rPr lang="en-US" dirty="0"/>
-              <a:t>TODO: Do we want that slide? We’d need to talk to each</a:t>
-            </a:r>
-          </a:p>
-          <a:p>
-            <a:endParaRPr lang="en-US" dirty="0"/>
-          </a:p>
-          <a:p>
-            <a:r>
               <a:rPr lang="en-US" dirty="0" err="1"/>
               <a:t>Langium</a:t>
             </a:r>
-            <a:endParaRPr lang="en-US" dirty="0"/>
+            <a:r>
+              <a:rPr lang="en-US" dirty="0"/>
+              <a:t> - Niko</a:t>
+            </a:r>
           </a:p>
           <a:p>
             <a:r>
@@ -42446,13 +42135,31 @@
             </a:r>
             <a:r>
               <a:rPr lang="en-US" dirty="0"/>
-              <a:t> Orca</a:t>
+              <a:t> Orca - Federico</a:t>
             </a:r>
           </a:p>
           <a:p>
             <a:r>
               <a:rPr lang="en-US" dirty="0" err="1"/>
               <a:t>Dclare</a:t>
+            </a:r>
+            <a:r>
+              <a:rPr lang="en-US" dirty="0"/>
+              <a:t> - Niko</a:t>
+            </a:r>
+          </a:p>
+          <a:p>
+            <a:r>
+              <a:rPr lang="en-US" dirty="0" err="1"/>
+              <a:t>Spoofax</a:t>
+            </a:r>
+            <a:r>
+              <a:rPr lang="en-US" dirty="0"/>
+              <a:t> - </a:t>
+            </a:r>
+            <a:r>
+              <a:rPr lang="en-US" dirty="0" err="1"/>
+              <a:t>Meinte</a:t>
             </a:r>
             <a:endParaRPr lang="en-US" dirty="0"/>
           </a:p>

</xml_diff>

<commit_message>
added trumpf description; slack QR; app/library/plugin suffix to implementation headings
</commit_message>
<xml_diff>
--- a/resources/LangDev 2024 Talk.pptx
+++ b/resources/LangDev 2024 Talk.pptx
@@ -25689,7 +25689,7 @@
           <a:p>
             <a:r>
               <a:rPr lang="en-US" dirty="0"/>
-              <a:t>Repository</a:t>
+              <a:t>Repository App</a:t>
             </a:r>
             <a:endParaRPr lang="en-NL" dirty="0"/>
           </a:p>
@@ -26007,7 +26007,7 @@
           <a:p>
             <a:r>
               <a:rPr lang="en-US" dirty="0"/>
-              <a:t>Repository Implementation</a:t>
+              <a:t>Repository App: Implementation</a:t>
             </a:r>
             <a:endParaRPr lang="en-NL" dirty="0"/>
           </a:p>
@@ -26206,7 +26206,7 @@
           <a:p>
             <a:r>
               <a:rPr lang="nl-NL" dirty="0"/>
-              <a:t>C#</a:t>
+              <a:t>C# Library</a:t>
             </a:r>
             <a:endParaRPr lang="en-NL" dirty="0"/>
           </a:p>
@@ -26443,7 +26443,7 @@
           <a:p>
             <a:r>
               <a:rPr lang="en-US" dirty="0"/>
-              <a:t>Java</a:t>
+              <a:t>Java Library</a:t>
             </a:r>
             <a:endParaRPr lang="en-NL" dirty="0"/>
           </a:p>
@@ -26646,7 +26646,7 @@
           <a:p>
             <a:r>
               <a:rPr lang="en-US" dirty="0"/>
-              <a:t>Kotlin</a:t>
+              <a:t>Kotlin Library</a:t>
             </a:r>
             <a:endParaRPr lang="en-NL" dirty="0"/>
           </a:p>
@@ -26848,7 +26848,7 @@
           <a:p>
             <a:r>
               <a:rPr lang="en-US" dirty="0"/>
-              <a:t>TypeScript</a:t>
+              <a:t>TypeScript Library</a:t>
             </a:r>
             <a:endParaRPr lang="en-NL" dirty="0"/>
           </a:p>
@@ -27093,7 +27093,7 @@
           <a:p>
             <a:r>
               <a:rPr lang="en-US" dirty="0"/>
-              <a:t>MPS</a:t>
+              <a:t>MPS Plugin</a:t>
             </a:r>
             <a:endParaRPr lang="en-NL" dirty="0"/>
           </a:p>
@@ -27298,6 +27298,10 @@
               <a:rPr lang="en-US" dirty="0" err="1"/>
               <a:t>Modelix</a:t>
             </a:r>
+            <a:r>
+              <a:rPr lang="en-US" dirty="0"/>
+              <a:t> Plugin</a:t>
+            </a:r>
             <a:endParaRPr lang="en-NL" dirty="0"/>
           </a:p>
         </p:txBody>
@@ -27443,6 +27447,11 @@
               <a:rPr lang="en-NL" dirty="0"/>
               <a:t>Freon LionWeb Core Editor</a:t>
             </a:r>
+            <a:r>
+              <a:rPr lang="en-US" dirty="0"/>
+              <a:t> App</a:t>
+            </a:r>
+            <a:endParaRPr lang="en-NL" dirty="0"/>
           </a:p>
         </p:txBody>
       </p:sp>
@@ -27592,7 +27601,7 @@
           <a:p>
             <a:r>
               <a:rPr lang="en-US" dirty="0"/>
-              <a:t>Rascal</a:t>
+              <a:t>Rascal Plugin</a:t>
             </a:r>
             <a:endParaRPr lang="en-NL" dirty="0"/>
           </a:p>
@@ -27664,9 +27673,18 @@
             </a:r>
           </a:p>
           <a:p>
+            <a:endParaRPr lang="en-US" dirty="0"/>
+          </a:p>
+          <a:p>
+            <a:r>
+              <a:rPr lang="en-US" dirty="0">
+                <a:hlinkClick r:id="rId2"/>
+              </a:rPr>
+              <a:t>https://github.com/UlyanaTikhonova/lionweb-rascal</a:t>
+            </a:r>
             <a:r>
               <a:rPr lang="en-US" dirty="0"/>
-              <a:t>https://github.com/UlyanaTikhonova/lionweb-rascal</a:t>
+              <a:t> </a:t>
             </a:r>
             <a:endParaRPr lang="en-NL" dirty="0"/>
           </a:p>
@@ -27687,10 +27705,10 @@
           <p:nvPr/>
         </p:nvPicPr>
         <p:blipFill>
-          <a:blip r:embed="rId2">
+          <a:blip r:embed="rId3">
             <a:extLst>
               <a:ext uri="{96DAC541-7B7A-43D3-8B79-37D633B846F1}">
-                <asvg:svgBlip xmlns:asvg="http://schemas.microsoft.com/office/drawing/2016/SVG/main" r:embed="rId3"/>
+                <asvg:svgBlip xmlns:asvg="http://schemas.microsoft.com/office/drawing/2016/SVG/main" r:embed="rId4"/>
               </a:ext>
             </a:extLst>
           </a:blip>
@@ -28090,13 +28108,13 @@
               <a:rPr lang="en" sz="1600" b="1" dirty="0">
                 <a:latin typeface="Gill Sans MT" panose="020B0502020104020203" pitchFamily="34" charset="77"/>
               </a:rPr>
-              <a:t>Want to work with us: 	</a:t>
+              <a:t>Want to work with us:	</a:t>
             </a:r>
             <a:r>
               <a:rPr lang="en-NL" sz="1600" b="1" dirty="0">
                 <a:latin typeface="Gill Sans MT" panose="020B0502020104020203" pitchFamily="34" charset="77"/>
               </a:rPr>
-              <a:t> 				Git</a:t>
+              <a:t>Git</a:t>
             </a:r>
             <a:r>
               <a:rPr lang="en-US" sz="1600" b="1" dirty="0">
@@ -28138,7 +28156,7 @@
                 </a:solidFill>
                 <a:latin typeface="Gill Sans MT" panose="020B0502020104020203" pitchFamily="34" charset="77"/>
               </a:rPr>
-              <a:t>						</a:t>
+              <a:t>		</a:t>
             </a:r>
             <a:r>
               <a:rPr lang="en-GB" sz="1600" dirty="0">
@@ -28515,6 +28533,36 @@
           <a:xfrm>
             <a:off x="96962" y="67963"/>
             <a:ext cx="1121757" cy="1127724"/>
+          </a:xfrm>
+          <a:prstGeom prst="rect">
+            <a:avLst/>
+          </a:prstGeom>
+        </p:spPr>
+      </p:pic>
+      <p:pic>
+        <p:nvPicPr>
+          <p:cNvPr id="4" name="Picture 3">
+            <a:extLst>
+              <a:ext uri="{FF2B5EF4-FFF2-40B4-BE49-F238E27FC236}">
+                <a16:creationId xmlns:a16="http://schemas.microsoft.com/office/drawing/2014/main" id="{3741BE83-1A3F-FC65-CCD2-F1B246C71913}"/>
+              </a:ext>
+            </a:extLst>
+          </p:cNvPr>
+          <p:cNvPicPr>
+            <a:picLocks noChangeAspect="1"/>
+          </p:cNvPicPr>
+          <p:nvPr/>
+        </p:nvPicPr>
+        <p:blipFill>
+          <a:blip r:embed="rId7"/>
+          <a:stretch>
+            <a:fillRect/>
+          </a:stretch>
+        </p:blipFill>
+        <p:spPr>
+          <a:xfrm>
+            <a:off x="9470584" y="4366647"/>
+            <a:ext cx="1998852" cy="1998852"/>
           </a:xfrm>
           <a:prstGeom prst="rect">
             <a:avLst/>
@@ -41913,10 +41961,12 @@
             <a:endParaRPr lang="en-US" dirty="0"/>
           </a:p>
           <a:p>
-            <a:pPr lvl="1"/>
+            <a:pPr marL="457200" lvl="1" indent="0">
+              <a:buNone/>
+            </a:pPr>
             <a:r>
               <a:rPr lang="en-US" dirty="0"/>
-              <a:t>TODO</a:t>
+              <a:t>Customers use different software to work with their laser tools. The next generation of software uses LionWeb to assure data consistency, reducing user friction.</a:t>
             </a:r>
           </a:p>
           <a:p>
@@ -42119,8 +42169,12 @@
           </a:p>
           <a:p>
             <a:r>
+              <a:rPr lang="en-US" dirty="0" err="1"/>
+              <a:t>Jetbrains</a:t>
+            </a:r>
+            <a:r>
               <a:rPr lang="en-US" dirty="0"/>
-              <a:t>JetBrains </a:t>
+              <a:t> </a:t>
             </a:r>
             <a:r>
               <a:rPr lang="en-US" dirty="0" err="1"/>
@@ -42135,8 +42189,13 @@
             </a:r>
             <a:r>
               <a:rPr lang="en-US" dirty="0"/>
-              <a:t> Orca - Federico</a:t>
+              <a:t> </a:t>
             </a:r>
+            <a:r>
+              <a:rPr lang="en-US" dirty="0" err="1"/>
+              <a:t>Daga</a:t>
+            </a:r>
+            <a:endParaRPr lang="en-US" dirty="0"/>
           </a:p>
           <a:p>
             <a:r>

</xml_diff>

<commit_message>
confirmed more interested parties, added TypeFox Typir
</commit_message>
<xml_diff>
--- a/resources/LangDev 2024 Talk.pptx
+++ b/resources/LangDev 2024 Talk.pptx
@@ -14188,7 +14188,7 @@
           <a:p>
             <a:fld id="{A83D55DB-2215-1E4A-893A-2A5EF07198DE}" type="datetimeFigureOut">
               <a:rPr lang="en-NL" smtClean="0"/>
-              <a:t>13/10/2024</a:t>
+              <a:t>14/10/2024</a:t>
             </a:fld>
             <a:endParaRPr lang="en-NL"/>
           </a:p>
@@ -14690,7 +14690,7 @@
           <a:p>
             <a:fld id="{4B15492D-6F0F-2E4F-9FB6-8AD2245E2E8C}" type="datetimeFigureOut">
               <a:rPr lang="en-NL" smtClean="0"/>
-              <a:t>13/10/2024</a:t>
+              <a:t>14/10/2024</a:t>
             </a:fld>
             <a:endParaRPr lang="en-NL"/>
           </a:p>
@@ -14984,7 +14984,7 @@
           <a:p>
             <a:fld id="{4B15492D-6F0F-2E4F-9FB6-8AD2245E2E8C}" type="datetimeFigureOut">
               <a:rPr lang="en-NL" smtClean="0"/>
-              <a:t>13/10/2024</a:t>
+              <a:t>14/10/2024</a:t>
             </a:fld>
             <a:endParaRPr lang="en-NL"/>
           </a:p>
@@ -15468,7 +15468,7 @@
           <a:p>
             <a:fld id="{4B15492D-6F0F-2E4F-9FB6-8AD2245E2E8C}" type="datetimeFigureOut">
               <a:rPr lang="en-NL" smtClean="0"/>
-              <a:t>13/10/2024</a:t>
+              <a:t>14/10/2024</a:t>
             </a:fld>
             <a:endParaRPr lang="en-NL"/>
           </a:p>
@@ -15806,7 +15806,7 @@
           <a:p>
             <a:fld id="{4B15492D-6F0F-2E4F-9FB6-8AD2245E2E8C}" type="datetimeFigureOut">
               <a:rPr lang="en-NL" smtClean="0"/>
-              <a:t>13/10/2024</a:t>
+              <a:t>14/10/2024</a:t>
             </a:fld>
             <a:endParaRPr lang="en-NL"/>
           </a:p>
@@ -16120,7 +16120,7 @@
           <a:p>
             <a:fld id="{4B15492D-6F0F-2E4F-9FB6-8AD2245E2E8C}" type="datetimeFigureOut">
               <a:rPr lang="en-NL" smtClean="0"/>
-              <a:t>13/10/2024</a:t>
+              <a:t>14/10/2024</a:t>
             </a:fld>
             <a:endParaRPr lang="en-NL"/>
           </a:p>
@@ -16298,7 +16298,7 @@
           <a:p>
             <a:fld id="{4B15492D-6F0F-2E4F-9FB6-8AD2245E2E8C}" type="datetimeFigureOut">
               <a:rPr lang="en-NL" smtClean="0"/>
-              <a:t>13/10/2024</a:t>
+              <a:t>14/10/2024</a:t>
             </a:fld>
             <a:endParaRPr lang="en-NL"/>
           </a:p>
@@ -16447,7 +16447,7 @@
           <a:p>
             <a:fld id="{4B15492D-6F0F-2E4F-9FB6-8AD2245E2E8C}" type="datetimeFigureOut">
               <a:rPr lang="en-NL" smtClean="0"/>
-              <a:t>13/10/2024</a:t>
+              <a:t>14/10/2024</a:t>
             </a:fld>
             <a:endParaRPr lang="en-NL"/>
           </a:p>
@@ -16760,7 +16760,7 @@
           <a:p>
             <a:fld id="{4B15492D-6F0F-2E4F-9FB6-8AD2245E2E8C}" type="datetimeFigureOut">
               <a:rPr lang="en-NL" smtClean="0"/>
-              <a:t>13/10/2024</a:t>
+              <a:t>14/10/2024</a:t>
             </a:fld>
             <a:endParaRPr lang="en-NL"/>
           </a:p>
@@ -17053,7 +17053,7 @@
           <a:p>
             <a:fld id="{4B15492D-6F0F-2E4F-9FB6-8AD2245E2E8C}" type="datetimeFigureOut">
               <a:rPr lang="en-NL" smtClean="0"/>
-              <a:t>13/10/2024</a:t>
+              <a:t>14/10/2024</a:t>
             </a:fld>
             <a:endParaRPr lang="en-NL"/>
           </a:p>
@@ -17253,7 +17253,7 @@
           <a:p>
             <a:fld id="{4B15492D-6F0F-2E4F-9FB6-8AD2245E2E8C}" type="datetimeFigureOut">
               <a:rPr lang="en-NL" smtClean="0"/>
-              <a:t>13/10/2024</a:t>
+              <a:t>14/10/2024</a:t>
             </a:fld>
             <a:endParaRPr lang="en-NL"/>
           </a:p>
@@ -17538,7 +17538,7 @@
             <a:fld id="{4B15492D-6F0F-2E4F-9FB6-8AD2245E2E8C}" type="datetimeFigureOut">
               <a:rPr lang="en-NL" smtClean="0"/>
               <a:pPr/>
-              <a:t>13/10/2024</a:t>
+              <a:t>14/10/2024</a:t>
             </a:fld>
             <a:endParaRPr lang="en-NL" dirty="0"/>
           </a:p>
@@ -42508,24 +42508,6 @@
           <a:p>
             <a:r>
               <a:rPr lang="en-US" dirty="0" err="1"/>
-              <a:t>TypeFox</a:t>
-            </a:r>
-            <a:r>
-              <a:rPr lang="en-US" dirty="0"/>
-              <a:t> </a:t>
-            </a:r>
-            <a:r>
-              <a:rPr lang="en-US" dirty="0" err="1"/>
-              <a:t>Langium</a:t>
-            </a:r>
-            <a:r>
-              <a:rPr lang="en-US" dirty="0"/>
-              <a:t> - Niko</a:t>
-            </a:r>
-          </a:p>
-          <a:p>
-            <a:r>
-              <a:rPr lang="en-US" dirty="0" err="1"/>
               <a:t>Jetbrains</a:t>
             </a:r>
             <a:r>
@@ -42566,10 +42548,7 @@
               <a:rPr lang="en-US" dirty="0" err="1"/>
               <a:t>Dclare</a:t>
             </a:r>
-            <a:r>
-              <a:rPr lang="en-US" dirty="0"/>
-              <a:t> - Niko</a:t>
-            </a:r>
+            <a:endParaRPr lang="en-US" dirty="0"/>
           </a:p>
           <a:p>
             <a:r>
@@ -42591,7 +42570,34 @@
             <a:endParaRPr lang="en-US" dirty="0"/>
           </a:p>
           <a:p>
-            <a:endParaRPr lang="en-NL" dirty="0"/>
+            <a:r>
+              <a:rPr lang="en-US" dirty="0" err="1"/>
+              <a:t>TypeFox</a:t>
+            </a:r>
+            <a:r>
+              <a:rPr lang="en-US" dirty="0"/>
+              <a:t> </a:t>
+            </a:r>
+            <a:r>
+              <a:rPr lang="en-US" dirty="0" err="1"/>
+              <a:t>Langium</a:t>
+            </a:r>
+            <a:endParaRPr lang="en-US" dirty="0"/>
+          </a:p>
+          <a:p>
+            <a:r>
+              <a:rPr lang="en-US" dirty="0" err="1"/>
+              <a:t>TypeFox</a:t>
+            </a:r>
+            <a:r>
+              <a:rPr lang="en-US" dirty="0"/>
+              <a:t> </a:t>
+            </a:r>
+            <a:r>
+              <a:rPr lang="en-US" dirty="0" err="1"/>
+              <a:t>Typir</a:t>
+            </a:r>
+            <a:endParaRPr lang="en-US" dirty="0"/>
           </a:p>
         </p:txBody>
       </p:sp>

</xml_diff>

<commit_message>
Add link to Langium blog Add "Contents(JSON)" to architecture slide.
</commit_message>
<xml_diff>
--- a/resources/LangDev 2024 Talk.pptx
+++ b/resources/LangDev 2024 Talk.pptx
@@ -3609,12 +3609,12 @@
     <dgm:cxn modelId="{25BA2731-2CA3-A64C-8556-6E1E23B1C9B8}" type="presOf" srcId="{189425EE-D43E-294D-8B36-254B971B826A}" destId="{2319823D-AB26-544C-9C6D-CF510A6E0BE2}" srcOrd="0" destOrd="0" presId="urn:microsoft.com/office/officeart/2009/layout/CirclePictureHierarchy"/>
     <dgm:cxn modelId="{E46DA632-6AFE-3F40-A695-2210A0368B98}" type="presOf" srcId="{1F5579C1-214E-1F45-BBFE-2626B34C5F36}" destId="{18065C05-7756-6747-B5FD-BAD510BA0F81}" srcOrd="0" destOrd="0" presId="urn:microsoft.com/office/officeart/2009/layout/CirclePictureHierarchy"/>
     <dgm:cxn modelId="{FE6CB63D-1136-0F49-93BB-385DE2FD2B8E}" srcId="{2F00C97E-86D5-FB44-896C-689FCDC1B423}" destId="{FFCD8269-6359-0B47-B683-B39C21E9289F}" srcOrd="0" destOrd="0" parTransId="{0B93AAD1-11C9-8F4C-B3D6-6787A9A8BD2E}" sibTransId="{35CAE358-5E66-C64A-A808-2AF9E0F7AA94}"/>
-    <dgm:cxn modelId="{DF374D68-72D3-6547-9BBA-5BF892EE18D8}" type="presOf" srcId="{84A69D06-4DCA-B644-8933-369AE4F3E19B}" destId="{6B3386BD-CF2E-384B-BE09-BF57C1348A3B}" srcOrd="0" destOrd="0" presId="urn:microsoft.com/office/officeart/2009/layout/CirclePictureHierarchy"/>
-    <dgm:cxn modelId="{A2020D6E-8C1E-BB47-A738-072D16ABED0D}" type="presOf" srcId="{FFCD8269-6359-0B47-B683-B39C21E9289F}" destId="{F749A1ED-7DC7-7642-8B05-9AB36ED104A8}" srcOrd="0" destOrd="0" presId="urn:microsoft.com/office/officeart/2009/layout/CirclePictureHierarchy"/>
     <dgm:cxn modelId="{BBAD8D4E-C3BB-404E-8F7D-D68E55FC7D02}" type="presOf" srcId="{B51E94E8-5EBB-F140-A967-A9BAB466450A}" destId="{81290B24-1AEC-2440-AB9A-0CF3FB71623B}" srcOrd="0" destOrd="0" presId="urn:microsoft.com/office/officeart/2009/layout/CirclePictureHierarchy"/>
     <dgm:cxn modelId="{D3569455-BD10-0842-B6B1-7E3B6FFF394F}" type="presOf" srcId="{ECC3DEB8-0051-1147-847C-7DCC2DFAACFA}" destId="{B6331A6E-3FA1-D84A-AD41-2FD4EC05420E}" srcOrd="0" destOrd="0" presId="urn:microsoft.com/office/officeart/2009/layout/CirclePictureHierarchy"/>
     <dgm:cxn modelId="{368AD655-5653-FB4C-9C61-8D2114FDA1A0}" type="presOf" srcId="{82248127-34D8-824E-9AB2-807628697886}" destId="{9873AD2C-7B29-304E-AB8A-D1C524EFA026}" srcOrd="0" destOrd="0" presId="urn:microsoft.com/office/officeart/2009/layout/CirclePictureHierarchy"/>
     <dgm:cxn modelId="{3DE82459-51F7-FD4F-96CE-A1DD3F31D4BE}" type="presOf" srcId="{01101797-645F-384B-A269-7880D06CCAA2}" destId="{C1151D66-2E81-6243-93E9-06E11E58AAE2}" srcOrd="0" destOrd="0" presId="urn:microsoft.com/office/officeart/2009/layout/CirclePictureHierarchy"/>
+    <dgm:cxn modelId="{DF374D68-72D3-6547-9BBA-5BF892EE18D8}" type="presOf" srcId="{84A69D06-4DCA-B644-8933-369AE4F3E19B}" destId="{6B3386BD-CF2E-384B-BE09-BF57C1348A3B}" srcOrd="0" destOrd="0" presId="urn:microsoft.com/office/officeart/2009/layout/CirclePictureHierarchy"/>
+    <dgm:cxn modelId="{A2020D6E-8C1E-BB47-A738-072D16ABED0D}" type="presOf" srcId="{FFCD8269-6359-0B47-B683-B39C21E9289F}" destId="{F749A1ED-7DC7-7642-8B05-9AB36ED104A8}" srcOrd="0" destOrd="0" presId="urn:microsoft.com/office/officeart/2009/layout/CirclePictureHierarchy"/>
     <dgm:cxn modelId="{6615D97B-5F0B-1847-B2F7-7E552C21C7D7}" type="presOf" srcId="{2F00C97E-86D5-FB44-896C-689FCDC1B423}" destId="{F84B2064-2101-194A-A846-1CB18CDACF7A}" srcOrd="0" destOrd="0" presId="urn:microsoft.com/office/officeart/2009/layout/CirclePictureHierarchy"/>
     <dgm:cxn modelId="{2D306C88-2ABF-CE4F-A8E4-4A9C5FA754D5}" type="presOf" srcId="{38A29F5E-CDED-D54B-8DAF-2D4844B29446}" destId="{DF642858-1507-A945-87B3-0F4EABEE3323}" srcOrd="0" destOrd="0" presId="urn:microsoft.com/office/officeart/2009/layout/CirclePictureHierarchy"/>
     <dgm:cxn modelId="{5404648A-F59C-4741-98C9-06E0EBBEC599}" srcId="{FFCD8269-6359-0B47-B683-B39C21E9289F}" destId="{82248127-34D8-824E-9AB2-807628697886}" srcOrd="1" destOrd="0" parTransId="{E561224A-6CBA-BF40-8B37-C4256F3A6D00}" sibTransId="{B3D968AC-113C-DD42-AF76-07613FD75DD5}"/>
@@ -4028,10 +4028,10 @@
     <dgm:cxn modelId="{CDF33511-A81F-C847-A004-BFB2176AE406}" srcId="{FFCD8269-6359-0B47-B683-B39C21E9289F}" destId="{896AECA1-542B-5A4B-8317-777732D893D0}" srcOrd="1" destOrd="0" parTransId="{DAEBC619-7AED-5C43-9371-006DFC18CDE5}" sibTransId="{891D6C4C-AF1C-8D45-9C15-B8E13EEE7AA2}"/>
     <dgm:cxn modelId="{28E96B20-5EF5-A548-8A92-AF22968294B2}" type="presOf" srcId="{7E4E3A51-D450-C448-B7EE-CEB39CCB71A3}" destId="{850591A1-1303-FC40-8081-23D41A324AC2}" srcOrd="0" destOrd="0" presId="urn:microsoft.com/office/officeart/2009/layout/CirclePictureHierarchy"/>
     <dgm:cxn modelId="{FE6CB63D-1136-0F49-93BB-385DE2FD2B8E}" srcId="{01101797-645F-384B-A269-7880D06CCAA2}" destId="{FFCD8269-6359-0B47-B683-B39C21E9289F}" srcOrd="0" destOrd="0" parTransId="{0B93AAD1-11C9-8F4C-B3D6-6787A9A8BD2E}" sibTransId="{35CAE358-5E66-C64A-A808-2AF9E0F7AA94}"/>
+    <dgm:cxn modelId="{B15A6850-2C47-984A-85B6-DC16EC662E45}" type="presOf" srcId="{01101797-645F-384B-A269-7880D06CCAA2}" destId="{D80B5D43-A76A-AE4F-869E-FB43EB09E3A6}" srcOrd="0" destOrd="0" presId="urn:microsoft.com/office/officeart/2009/layout/CirclePictureHierarchy"/>
+    <dgm:cxn modelId="{8FFA6555-FB04-974F-A7F4-1D16C54C56F2}" type="presOf" srcId="{0B93AAD1-11C9-8F4C-B3D6-6787A9A8BD2E}" destId="{4367957F-1173-EC44-89C3-8A2F56C4944E}" srcOrd="0" destOrd="0" presId="urn:microsoft.com/office/officeart/2009/layout/CirclePictureHierarchy"/>
     <dgm:cxn modelId="{DF0FD55C-E3AC-D44B-BDC5-A94A01CF625E}" srcId="{FFCD8269-6359-0B47-B683-B39C21E9289F}" destId="{9F71DB2B-9F4A-E649-B85A-82E20F1FED66}" srcOrd="0" destOrd="0" parTransId="{7E4E3A51-D450-C448-B7EE-CEB39CCB71A3}" sibTransId="{D86D8590-4B76-3045-B3D2-E2495152121A}"/>
     <dgm:cxn modelId="{DF374D68-72D3-6547-9BBA-5BF892EE18D8}" type="presOf" srcId="{84A69D06-4DCA-B644-8933-369AE4F3E19B}" destId="{6B3386BD-CF2E-384B-BE09-BF57C1348A3B}" srcOrd="0" destOrd="0" presId="urn:microsoft.com/office/officeart/2009/layout/CirclePictureHierarchy"/>
-    <dgm:cxn modelId="{B15A6850-2C47-984A-85B6-DC16EC662E45}" type="presOf" srcId="{01101797-645F-384B-A269-7880D06CCAA2}" destId="{D80B5D43-A76A-AE4F-869E-FB43EB09E3A6}" srcOrd="0" destOrd="0" presId="urn:microsoft.com/office/officeart/2009/layout/CirclePictureHierarchy"/>
-    <dgm:cxn modelId="{8FFA6555-FB04-974F-A7F4-1D16C54C56F2}" type="presOf" srcId="{0B93AAD1-11C9-8F4C-B3D6-6787A9A8BD2E}" destId="{4367957F-1173-EC44-89C3-8A2F56C4944E}" srcOrd="0" destOrd="0" presId="urn:microsoft.com/office/officeart/2009/layout/CirclePictureHierarchy"/>
     <dgm:cxn modelId="{AEC2D47E-8B66-424B-B109-4BE913876A81}" type="presOf" srcId="{FFCD8269-6359-0B47-B683-B39C21E9289F}" destId="{A4677163-1942-2D4D-8F8F-3C02F6BE1D10}" srcOrd="0" destOrd="0" presId="urn:microsoft.com/office/officeart/2009/layout/CirclePictureHierarchy"/>
     <dgm:cxn modelId="{E7BDA18C-519D-1F49-948D-CE9CF91EDFA3}" srcId="{84A69D06-4DCA-B644-8933-369AE4F3E19B}" destId="{01101797-645F-384B-A269-7880D06CCAA2}" srcOrd="0" destOrd="0" parTransId="{ECC3DEB8-0051-1147-847C-7DCC2DFAACFA}" sibTransId="{5E905DE6-BC88-DC47-ABA7-F4887AC985AB}"/>
     <dgm:cxn modelId="{1778CE8F-6467-6B48-B650-D2485403A93E}" type="presOf" srcId="{F17ACAC4-312E-CF41-820D-9F98D1BE14F2}" destId="{B1D6D055-68FD-CF41-B8BC-1AB29ACF217B}" srcOrd="0" destOrd="0" presId="urn:microsoft.com/office/officeart/2009/layout/CirclePictureHierarchy"/>
@@ -4491,10 +4491,10 @@
     <dgm:cxn modelId="{CDF33511-A81F-C847-A004-BFB2176AE406}" srcId="{FFCD8269-6359-0B47-B683-B39C21E9289F}" destId="{896AECA1-542B-5A4B-8317-777732D893D0}" srcOrd="1" destOrd="0" parTransId="{DAEBC619-7AED-5C43-9371-006DFC18CDE5}" sibTransId="{891D6C4C-AF1C-8D45-9C15-B8E13EEE7AA2}"/>
     <dgm:cxn modelId="{5667E311-79AB-6746-8DF9-F994B64E432E}" type="presOf" srcId="{DAEBC619-7AED-5C43-9371-006DFC18CDE5}" destId="{ECD7DA7F-1489-2047-8B39-5D77EE2F619F}" srcOrd="0" destOrd="0" presId="urn:microsoft.com/office/officeart/2009/layout/CirclePictureHierarchy"/>
     <dgm:cxn modelId="{FE6CB63D-1136-0F49-93BB-385DE2FD2B8E}" srcId="{01101797-645F-384B-A269-7880D06CCAA2}" destId="{FFCD8269-6359-0B47-B683-B39C21E9289F}" srcOrd="0" destOrd="0" parTransId="{0B93AAD1-11C9-8F4C-B3D6-6787A9A8BD2E}" sibTransId="{35CAE358-5E66-C64A-A808-2AF9E0F7AA94}"/>
+    <dgm:cxn modelId="{B2724344-941B-324F-83F9-DFDABD18A837}" srcId="{01101797-645F-384B-A269-7880D06CCAA2}" destId="{076BAFA0-A3A5-C84B-9240-69BBC15267CF}" srcOrd="1" destOrd="0" parTransId="{386E37EA-0902-2840-8961-F751C9D65ECB}" sibTransId="{E20053DF-E82A-6F4B-9CB8-F024A3171C16}"/>
+    <dgm:cxn modelId="{46E0EC56-97DD-1B4B-9923-DC8E0AE4AF90}" type="presOf" srcId="{0B93AAD1-11C9-8F4C-B3D6-6787A9A8BD2E}" destId="{1700B9FF-875C-AE49-ABE8-38182680A9D1}" srcOrd="0" destOrd="0" presId="urn:microsoft.com/office/officeart/2009/layout/CirclePictureHierarchy"/>
     <dgm:cxn modelId="{DF0FD55C-E3AC-D44B-BDC5-A94A01CF625E}" srcId="{FFCD8269-6359-0B47-B683-B39C21E9289F}" destId="{9F71DB2B-9F4A-E649-B85A-82E20F1FED66}" srcOrd="0" destOrd="0" parTransId="{7E4E3A51-D450-C448-B7EE-CEB39CCB71A3}" sibTransId="{D86D8590-4B76-3045-B3D2-E2495152121A}"/>
-    <dgm:cxn modelId="{B2724344-941B-324F-83F9-DFDABD18A837}" srcId="{01101797-645F-384B-A269-7880D06CCAA2}" destId="{076BAFA0-A3A5-C84B-9240-69BBC15267CF}" srcOrd="1" destOrd="0" parTransId="{386E37EA-0902-2840-8961-F751C9D65ECB}" sibTransId="{E20053DF-E82A-6F4B-9CB8-F024A3171C16}"/>
     <dgm:cxn modelId="{DF374D68-72D3-6547-9BBA-5BF892EE18D8}" type="presOf" srcId="{84A69D06-4DCA-B644-8933-369AE4F3E19B}" destId="{6B3386BD-CF2E-384B-BE09-BF57C1348A3B}" srcOrd="0" destOrd="0" presId="urn:microsoft.com/office/officeart/2009/layout/CirclePictureHierarchy"/>
-    <dgm:cxn modelId="{46E0EC56-97DD-1B4B-9923-DC8E0AE4AF90}" type="presOf" srcId="{0B93AAD1-11C9-8F4C-B3D6-6787A9A8BD2E}" destId="{1700B9FF-875C-AE49-ABE8-38182680A9D1}" srcOrd="0" destOrd="0" presId="urn:microsoft.com/office/officeart/2009/layout/CirclePictureHierarchy"/>
     <dgm:cxn modelId="{7922CF7A-8D23-4F41-894A-977297009C08}" type="presOf" srcId="{076BAFA0-A3A5-C84B-9240-69BBC15267CF}" destId="{4C45DB5F-E5E5-E646-B43C-725EC0AE9E11}" srcOrd="0" destOrd="0" presId="urn:microsoft.com/office/officeart/2009/layout/CirclePictureHierarchy"/>
     <dgm:cxn modelId="{1DDB957C-7F49-A740-9D6F-4AE07860148B}" type="presOf" srcId="{01101797-645F-384B-A269-7880D06CCAA2}" destId="{AB5C572F-235E-B346-8D49-E9F3A52A6F24}" srcOrd="0" destOrd="0" presId="urn:microsoft.com/office/officeart/2009/layout/CirclePictureHierarchy"/>
     <dgm:cxn modelId="{B8C0187D-B130-F54D-9291-657E1A321C2F}" type="presOf" srcId="{7E4E3A51-D450-C448-B7EE-CEB39CCB71A3}" destId="{165D8681-4E1B-DD4D-9473-5C58DCEFB122}" srcOrd="0" destOrd="0" presId="urn:microsoft.com/office/officeart/2009/layout/CirclePictureHierarchy"/>
@@ -14188,7 +14188,7 @@
           <a:p>
             <a:fld id="{A83D55DB-2215-1E4A-893A-2A5EF07198DE}" type="datetimeFigureOut">
               <a:rPr lang="en-NL" smtClean="0"/>
-              <a:t>14/10/2024</a:t>
+              <a:t>15/10/2024</a:t>
             </a:fld>
             <a:endParaRPr lang="en-NL"/>
           </a:p>
@@ -14690,7 +14690,7 @@
           <a:p>
             <a:fld id="{4B15492D-6F0F-2E4F-9FB6-8AD2245E2E8C}" type="datetimeFigureOut">
               <a:rPr lang="en-NL" smtClean="0"/>
-              <a:t>14/10/2024</a:t>
+              <a:t>15/10/2024</a:t>
             </a:fld>
             <a:endParaRPr lang="en-NL"/>
           </a:p>
@@ -14984,7 +14984,7 @@
           <a:p>
             <a:fld id="{4B15492D-6F0F-2E4F-9FB6-8AD2245E2E8C}" type="datetimeFigureOut">
               <a:rPr lang="en-NL" smtClean="0"/>
-              <a:t>14/10/2024</a:t>
+              <a:t>15/10/2024</a:t>
             </a:fld>
             <a:endParaRPr lang="en-NL"/>
           </a:p>
@@ -15468,7 +15468,7 @@
           <a:p>
             <a:fld id="{4B15492D-6F0F-2E4F-9FB6-8AD2245E2E8C}" type="datetimeFigureOut">
               <a:rPr lang="en-NL" smtClean="0"/>
-              <a:t>14/10/2024</a:t>
+              <a:t>15/10/2024</a:t>
             </a:fld>
             <a:endParaRPr lang="en-NL"/>
           </a:p>
@@ -15806,7 +15806,7 @@
           <a:p>
             <a:fld id="{4B15492D-6F0F-2E4F-9FB6-8AD2245E2E8C}" type="datetimeFigureOut">
               <a:rPr lang="en-NL" smtClean="0"/>
-              <a:t>14/10/2024</a:t>
+              <a:t>15/10/2024</a:t>
             </a:fld>
             <a:endParaRPr lang="en-NL"/>
           </a:p>
@@ -16120,7 +16120,7 @@
           <a:p>
             <a:fld id="{4B15492D-6F0F-2E4F-9FB6-8AD2245E2E8C}" type="datetimeFigureOut">
               <a:rPr lang="en-NL" smtClean="0"/>
-              <a:t>14/10/2024</a:t>
+              <a:t>15/10/2024</a:t>
             </a:fld>
             <a:endParaRPr lang="en-NL"/>
           </a:p>
@@ -16298,7 +16298,7 @@
           <a:p>
             <a:fld id="{4B15492D-6F0F-2E4F-9FB6-8AD2245E2E8C}" type="datetimeFigureOut">
               <a:rPr lang="en-NL" smtClean="0"/>
-              <a:t>14/10/2024</a:t>
+              <a:t>15/10/2024</a:t>
             </a:fld>
             <a:endParaRPr lang="en-NL"/>
           </a:p>
@@ -16447,7 +16447,7 @@
           <a:p>
             <a:fld id="{4B15492D-6F0F-2E4F-9FB6-8AD2245E2E8C}" type="datetimeFigureOut">
               <a:rPr lang="en-NL" smtClean="0"/>
-              <a:t>14/10/2024</a:t>
+              <a:t>15/10/2024</a:t>
             </a:fld>
             <a:endParaRPr lang="en-NL"/>
           </a:p>
@@ -16760,7 +16760,7 @@
           <a:p>
             <a:fld id="{4B15492D-6F0F-2E4F-9FB6-8AD2245E2E8C}" type="datetimeFigureOut">
               <a:rPr lang="en-NL" smtClean="0"/>
-              <a:t>14/10/2024</a:t>
+              <a:t>15/10/2024</a:t>
             </a:fld>
             <a:endParaRPr lang="en-NL"/>
           </a:p>
@@ -17053,7 +17053,7 @@
           <a:p>
             <a:fld id="{4B15492D-6F0F-2E4F-9FB6-8AD2245E2E8C}" type="datetimeFigureOut">
               <a:rPr lang="en-NL" smtClean="0"/>
-              <a:t>14/10/2024</a:t>
+              <a:t>15/10/2024</a:t>
             </a:fld>
             <a:endParaRPr lang="en-NL"/>
           </a:p>
@@ -17253,7 +17253,7 @@
           <a:p>
             <a:fld id="{4B15492D-6F0F-2E4F-9FB6-8AD2245E2E8C}" type="datetimeFigureOut">
               <a:rPr lang="en-NL" smtClean="0"/>
-              <a:t>14/10/2024</a:t>
+              <a:t>15/10/2024</a:t>
             </a:fld>
             <a:endParaRPr lang="en-NL"/>
           </a:p>
@@ -17538,7 +17538,7 @@
             <a:fld id="{4B15492D-6F0F-2E4F-9FB6-8AD2245E2E8C}" type="datetimeFigureOut">
               <a:rPr lang="en-NL" smtClean="0"/>
               <a:pPr/>
-              <a:t>14/10/2024</a:t>
+              <a:t>15/10/2024</a:t>
             </a:fld>
             <a:endParaRPr lang="en-NL" dirty="0"/>
           </a:p>
@@ -22228,6 +22228,69 @@
           </p:txBody>
         </p:sp>
       </p:grpSp>
+      <p:sp>
+        <p:nvSpPr>
+          <p:cNvPr id="54" name="Title 1">
+            <a:extLst>
+              <a:ext uri="{FF2B5EF4-FFF2-40B4-BE49-F238E27FC236}">
+                <a16:creationId xmlns:a16="http://schemas.microsoft.com/office/drawing/2014/main" id="{D1DD1D03-07A5-0058-4E05-97759FC28F40}"/>
+              </a:ext>
+            </a:extLst>
+          </p:cNvPr>
+          <p:cNvSpPr txBox="1">
+            <a:spLocks/>
+          </p:cNvSpPr>
+          <p:nvPr/>
+        </p:nvSpPr>
+        <p:spPr>
+          <a:xfrm>
+            <a:off x="236147" y="71948"/>
+            <a:ext cx="12192000" cy="5004262"/>
+          </a:xfrm>
+          <a:prstGeom prst="rect">
+            <a:avLst/>
+          </a:prstGeom>
+          <a:solidFill>
+            <a:srgbClr val="E6752A"/>
+          </a:solidFill>
+        </p:spPr>
+        <p:txBody>
+          <a:bodyPr vert="horz" lIns="91440" tIns="648000" rIns="91440" bIns="45720" rtlCol="0" anchor="t">
+            <a:normAutofit/>
+          </a:bodyPr>
+          <a:lstStyle>
+            <a:lvl1pPr algn="ctr" defTabSz="914400" rtl="0" eaLnBrk="1" latinLnBrk="0" hangingPunct="1">
+              <a:lnSpc>
+                <a:spcPct val="90000"/>
+              </a:lnSpc>
+              <a:spcBef>
+                <a:spcPct val="0"/>
+              </a:spcBef>
+              <a:buNone/>
+              <a:defRPr lang="en-NL" sz="6000" b="1" i="0" kern="1200">
+                <a:ln>
+                  <a:solidFill>
+                    <a:schemeClr val="bg1"/>
+                  </a:solidFill>
+                </a:ln>
+                <a:solidFill>
+                  <a:schemeClr val="bg1"/>
+                </a:solidFill>
+                <a:latin typeface="Gill Sans MT" panose="020B0502020104020203" pitchFamily="34" charset="77"/>
+                <a:ea typeface="+mj-ea"/>
+                <a:cs typeface="+mj-cs"/>
+              </a:defRPr>
+            </a:lvl1pPr>
+          </a:lstStyle>
+          <a:p>
+            <a:r>
+              <a:rPr lang="en-US"/>
+              <a:t>LionWeb: Status Update</a:t>
+            </a:r>
+            <a:endParaRPr lang="en-US" dirty="0"/>
+          </a:p>
+        </p:txBody>
+      </p:sp>
     </p:spTree>
     <p:extLst>
       <p:ext uri="{BB962C8B-B14F-4D97-AF65-F5344CB8AC3E}">
@@ -38892,6 +38955,18 @@
                 <a:t>rotocols (bulk      / delta     )</a:t>
               </a:r>
             </a:p>
+            <a:p>
+              <a:pPr algn="ctr"/>
+              <a:r>
+                <a:rPr lang="en-NL" sz="2400" b="1" dirty="0">
+                  <a:solidFill>
+                    <a:srgbClr val="E6752A"/>
+                  </a:solidFill>
+                  <a:latin typeface="Gill Sans MT" panose="020B0502020104020203" pitchFamily="34" charset="77"/>
+                </a:rPr>
+                <a:t>Contents (JSON)</a:t>
+              </a:r>
+            </a:p>
           </p:txBody>
         </p:sp>
         <p:pic>
@@ -38967,368 +39042,6 @@
           </a:prstGeom>
         </p:spPr>
       </p:pic>
-      <p:grpSp>
-        <p:nvGrpSpPr>
-          <p:cNvPr id="8" name="Group 7">
-            <a:extLst>
-              <a:ext uri="{FF2B5EF4-FFF2-40B4-BE49-F238E27FC236}">
-                <a16:creationId xmlns:a16="http://schemas.microsoft.com/office/drawing/2014/main" id="{8E316A58-36E0-44CD-C9D3-2302E8D4684C}"/>
-              </a:ext>
-            </a:extLst>
-          </p:cNvPr>
-          <p:cNvGrpSpPr/>
-          <p:nvPr/>
-        </p:nvGrpSpPr>
-        <p:grpSpPr>
-          <a:xfrm>
-            <a:off x="1708317" y="2708750"/>
-            <a:ext cx="10324499" cy="3840570"/>
-            <a:chOff x="1708317" y="2708750"/>
-            <a:chExt cx="10324499" cy="3840570"/>
-          </a:xfrm>
-        </p:grpSpPr>
-        <p:sp>
-          <p:nvSpPr>
-            <p:cNvPr id="6" name="TextBox 5">
-              <a:extLst>
-                <a:ext uri="{FF2B5EF4-FFF2-40B4-BE49-F238E27FC236}">
-                  <a16:creationId xmlns:a16="http://schemas.microsoft.com/office/drawing/2014/main" id="{20EE9B38-05B6-2ADE-7851-8D6C92DA9FEB}"/>
-                </a:ext>
-              </a:extLst>
-            </p:cNvPr>
-            <p:cNvSpPr txBox="1"/>
-            <p:nvPr/>
-          </p:nvSpPr>
-          <p:spPr>
-            <a:xfrm>
-              <a:off x="1712644" y="5515883"/>
-              <a:ext cx="506870" cy="584775"/>
-            </a:xfrm>
-            <a:prstGeom prst="rect">
-              <a:avLst/>
-            </a:prstGeom>
-            <a:noFill/>
-          </p:spPr>
-          <p:txBody>
-            <a:bodyPr wrap="none" rtlCol="0">
-              <a:spAutoFit/>
-            </a:bodyPr>
-            <a:lstStyle/>
-            <a:p>
-              <a:r>
-                <a:rPr lang="en-NL" sz="3200" b="1" dirty="0">
-                  <a:solidFill>
-                    <a:srgbClr val="00B050"/>
-                  </a:solidFill>
-                  <a:sym typeface="Wingdings" panose="05000000000000000000" pitchFamily="2" charset="2"/>
-                </a:rPr>
-                <a:t></a:t>
-              </a:r>
-              <a:endParaRPr lang="en-NL" sz="3200" b="1" dirty="0">
-                <a:solidFill>
-                  <a:srgbClr val="00B050"/>
-                </a:solidFill>
-              </a:endParaRPr>
-            </a:p>
-          </p:txBody>
-        </p:sp>
-        <p:sp>
-          <p:nvSpPr>
-            <p:cNvPr id="35" name="TextBox 34">
-              <a:extLst>
-                <a:ext uri="{FF2B5EF4-FFF2-40B4-BE49-F238E27FC236}">
-                  <a16:creationId xmlns:a16="http://schemas.microsoft.com/office/drawing/2014/main" id="{63FB9BDF-60A7-5237-8E87-EE427F21B96C}"/>
-                </a:ext>
-              </a:extLst>
-            </p:cNvPr>
-            <p:cNvSpPr txBox="1"/>
-            <p:nvPr/>
-          </p:nvSpPr>
-          <p:spPr>
-            <a:xfrm>
-              <a:off x="11525946" y="2708750"/>
-              <a:ext cx="506870" cy="584775"/>
-            </a:xfrm>
-            <a:prstGeom prst="rect">
-              <a:avLst/>
-            </a:prstGeom>
-            <a:noFill/>
-          </p:spPr>
-          <p:txBody>
-            <a:bodyPr wrap="none" rtlCol="0">
-              <a:spAutoFit/>
-            </a:bodyPr>
-            <a:lstStyle/>
-            <a:p>
-              <a:r>
-                <a:rPr lang="en-NL" sz="3200" b="1" dirty="0">
-                  <a:solidFill>
-                    <a:srgbClr val="00B050"/>
-                  </a:solidFill>
-                  <a:sym typeface="Wingdings" panose="05000000000000000000" pitchFamily="2" charset="2"/>
-                </a:rPr>
-                <a:t></a:t>
-              </a:r>
-              <a:endParaRPr lang="en-NL" sz="3200" b="1" dirty="0">
-                <a:solidFill>
-                  <a:srgbClr val="00B050"/>
-                </a:solidFill>
-              </a:endParaRPr>
-            </a:p>
-          </p:txBody>
-        </p:sp>
-        <p:sp>
-          <p:nvSpPr>
-            <p:cNvPr id="36" name="TextBox 35">
-              <a:extLst>
-                <a:ext uri="{FF2B5EF4-FFF2-40B4-BE49-F238E27FC236}">
-                  <a16:creationId xmlns:a16="http://schemas.microsoft.com/office/drawing/2014/main" id="{90D73178-8C15-8D17-448C-C12295A44CA6}"/>
-                </a:ext>
-              </a:extLst>
-            </p:cNvPr>
-            <p:cNvSpPr txBox="1"/>
-            <p:nvPr/>
-          </p:nvSpPr>
-          <p:spPr>
-            <a:xfrm>
-              <a:off x="11525946" y="3975026"/>
-              <a:ext cx="506870" cy="584775"/>
-            </a:xfrm>
-            <a:prstGeom prst="rect">
-              <a:avLst/>
-            </a:prstGeom>
-            <a:noFill/>
-          </p:spPr>
-          <p:txBody>
-            <a:bodyPr wrap="none" rtlCol="0">
-              <a:spAutoFit/>
-            </a:bodyPr>
-            <a:lstStyle/>
-            <a:p>
-              <a:r>
-                <a:rPr lang="en-NL" sz="3200" b="1" dirty="0">
-                  <a:solidFill>
-                    <a:srgbClr val="00B050"/>
-                  </a:solidFill>
-                  <a:sym typeface="Wingdings" panose="05000000000000000000" pitchFamily="2" charset="2"/>
-                </a:rPr>
-                <a:t></a:t>
-              </a:r>
-              <a:endParaRPr lang="en-NL" sz="3200" b="1" dirty="0">
-                <a:solidFill>
-                  <a:srgbClr val="00B050"/>
-                </a:solidFill>
-              </a:endParaRPr>
-            </a:p>
-          </p:txBody>
-        </p:sp>
-        <p:sp>
-          <p:nvSpPr>
-            <p:cNvPr id="37" name="TextBox 36">
-              <a:extLst>
-                <a:ext uri="{FF2B5EF4-FFF2-40B4-BE49-F238E27FC236}">
-                  <a16:creationId xmlns:a16="http://schemas.microsoft.com/office/drawing/2014/main" id="{3FE55AF5-57B3-7546-F153-2798CD8F8D15}"/>
-                </a:ext>
-              </a:extLst>
-            </p:cNvPr>
-            <p:cNvSpPr txBox="1"/>
-            <p:nvPr/>
-          </p:nvSpPr>
-          <p:spPr>
-            <a:xfrm>
-              <a:off x="11525946" y="4301683"/>
-              <a:ext cx="506870" cy="584775"/>
-            </a:xfrm>
-            <a:prstGeom prst="rect">
-              <a:avLst/>
-            </a:prstGeom>
-            <a:noFill/>
-          </p:spPr>
-          <p:txBody>
-            <a:bodyPr wrap="none" rtlCol="0">
-              <a:spAutoFit/>
-            </a:bodyPr>
-            <a:lstStyle/>
-            <a:p>
-              <a:r>
-                <a:rPr lang="en-NL" sz="3200" b="1" dirty="0">
-                  <a:solidFill>
-                    <a:srgbClr val="00B050"/>
-                  </a:solidFill>
-                  <a:sym typeface="Wingdings" panose="05000000000000000000" pitchFamily="2" charset="2"/>
-                </a:rPr>
-                <a:t></a:t>
-              </a:r>
-              <a:endParaRPr lang="en-NL" sz="3200" b="1" dirty="0">
-                <a:solidFill>
-                  <a:srgbClr val="00B050"/>
-                </a:solidFill>
-              </a:endParaRPr>
-            </a:p>
-          </p:txBody>
-        </p:sp>
-        <p:sp>
-          <p:nvSpPr>
-            <p:cNvPr id="38" name="TextBox 37">
-              <a:extLst>
-                <a:ext uri="{FF2B5EF4-FFF2-40B4-BE49-F238E27FC236}">
-                  <a16:creationId xmlns:a16="http://schemas.microsoft.com/office/drawing/2014/main" id="{61469D7F-0FB2-C985-5364-FCC245D66016}"/>
-                </a:ext>
-              </a:extLst>
-            </p:cNvPr>
-            <p:cNvSpPr txBox="1"/>
-            <p:nvPr/>
-          </p:nvSpPr>
-          <p:spPr>
-            <a:xfrm>
-              <a:off x="6963179" y="5562600"/>
-              <a:ext cx="506870" cy="584775"/>
-            </a:xfrm>
-            <a:prstGeom prst="rect">
-              <a:avLst/>
-            </a:prstGeom>
-            <a:noFill/>
-          </p:spPr>
-          <p:txBody>
-            <a:bodyPr wrap="none" rtlCol="0">
-              <a:spAutoFit/>
-            </a:bodyPr>
-            <a:lstStyle/>
-            <a:p>
-              <a:r>
-                <a:rPr lang="en-NL" sz="3200" b="1" dirty="0">
-                  <a:solidFill>
-                    <a:srgbClr val="00B050"/>
-                  </a:solidFill>
-                  <a:sym typeface="Wingdings" panose="05000000000000000000" pitchFamily="2" charset="2"/>
-                </a:rPr>
-                <a:t></a:t>
-              </a:r>
-              <a:endParaRPr lang="en-NL" sz="3200" b="1" dirty="0">
-                <a:solidFill>
-                  <a:srgbClr val="00B050"/>
-                </a:solidFill>
-              </a:endParaRPr>
-            </a:p>
-          </p:txBody>
-        </p:sp>
-        <p:sp>
-          <p:nvSpPr>
-            <p:cNvPr id="39" name="TextBox 38">
-              <a:extLst>
-                <a:ext uri="{FF2B5EF4-FFF2-40B4-BE49-F238E27FC236}">
-                  <a16:creationId xmlns:a16="http://schemas.microsoft.com/office/drawing/2014/main" id="{B3918BD0-4D3F-538F-7CED-7729B3DCAFEE}"/>
-                </a:ext>
-              </a:extLst>
-            </p:cNvPr>
-            <p:cNvSpPr txBox="1"/>
-            <p:nvPr/>
-          </p:nvSpPr>
-          <p:spPr>
-            <a:xfrm>
-              <a:off x="8286565" y="5562600"/>
-              <a:ext cx="506870" cy="584775"/>
-            </a:xfrm>
-            <a:prstGeom prst="rect">
-              <a:avLst/>
-            </a:prstGeom>
-            <a:noFill/>
-          </p:spPr>
-          <p:txBody>
-            <a:bodyPr wrap="none" rtlCol="0">
-              <a:spAutoFit/>
-            </a:bodyPr>
-            <a:lstStyle/>
-            <a:p>
-              <a:r>
-                <a:rPr lang="en-NL" sz="3200" b="1" dirty="0">
-                  <a:ln w="19050">
-                    <a:solidFill>
-                      <a:srgbClr val="00B050"/>
-                    </a:solidFill>
-                  </a:ln>
-                  <a:solidFill>
-                    <a:schemeClr val="bg1"/>
-                  </a:solidFill>
-                  <a:sym typeface="Wingdings" panose="05000000000000000000" pitchFamily="2" charset="2"/>
-                </a:rPr>
-                <a:t></a:t>
-              </a:r>
-              <a:endParaRPr lang="en-NL" sz="3200" b="1" dirty="0">
-                <a:ln w="19050">
-                  <a:solidFill>
-                    <a:srgbClr val="00B050"/>
-                  </a:solidFill>
-                </a:ln>
-                <a:solidFill>
-                  <a:schemeClr val="bg1"/>
-                </a:solidFill>
-              </a:endParaRPr>
-            </a:p>
-          </p:txBody>
-        </p:sp>
-        <p:sp>
-          <p:nvSpPr>
-            <p:cNvPr id="40" name="TextBox 39">
-              <a:extLst>
-                <a:ext uri="{FF2B5EF4-FFF2-40B4-BE49-F238E27FC236}">
-                  <a16:creationId xmlns:a16="http://schemas.microsoft.com/office/drawing/2014/main" id="{231989F2-255E-D1FB-AAA0-99D7A8A7CA1A}"/>
-                </a:ext>
-              </a:extLst>
-            </p:cNvPr>
-            <p:cNvSpPr txBox="1"/>
-            <p:nvPr/>
-          </p:nvSpPr>
-          <p:spPr>
-            <a:xfrm>
-              <a:off x="1708317" y="5964545"/>
-              <a:ext cx="506870" cy="584775"/>
-            </a:xfrm>
-            <a:prstGeom prst="rect">
-              <a:avLst/>
-            </a:prstGeom>
-            <a:noFill/>
-            <a:ln>
-              <a:noFill/>
-              <a:prstDash val="dash"/>
-            </a:ln>
-          </p:spPr>
-          <p:txBody>
-            <a:bodyPr wrap="none" rtlCol="0">
-              <a:spAutoFit/>
-            </a:bodyPr>
-            <a:lstStyle/>
-            <a:p>
-              <a:r>
-                <a:rPr lang="en-NL" sz="3200" b="1" dirty="0">
-                  <a:ln w="19050">
-                    <a:solidFill>
-                      <a:srgbClr val="00B050"/>
-                    </a:solidFill>
-                    <a:prstDash val="sysDot"/>
-                  </a:ln>
-                  <a:solidFill>
-                    <a:schemeClr val="bg1"/>
-                  </a:solidFill>
-                  <a:sym typeface="Wingdings" panose="05000000000000000000" pitchFamily="2" charset="2"/>
-                </a:rPr>
-                <a:t></a:t>
-              </a:r>
-              <a:endParaRPr lang="en-NL" sz="3200" b="1" dirty="0">
-                <a:ln w="19050">
-                  <a:solidFill>
-                    <a:srgbClr val="00B050"/>
-                  </a:solidFill>
-                  <a:prstDash val="sysDot"/>
-                </a:ln>
-                <a:solidFill>
-                  <a:schemeClr val="bg1"/>
-                </a:solidFill>
-              </a:endParaRPr>
-            </a:p>
-          </p:txBody>
-        </p:sp>
-      </p:grpSp>
       <p:grpSp>
         <p:nvGrpSpPr>
           <p:cNvPr id="548" name="Group 547">
@@ -41056,6 +40769,434 @@
           </p:sp>
         </p:grpSp>
       </p:grpSp>
+      <p:grpSp>
+        <p:nvGrpSpPr>
+          <p:cNvPr id="13" name="Group 12">
+            <a:extLst>
+              <a:ext uri="{FF2B5EF4-FFF2-40B4-BE49-F238E27FC236}">
+                <a16:creationId xmlns:a16="http://schemas.microsoft.com/office/drawing/2014/main" id="{683BB52C-5627-0DDF-B2BB-3515BD7292A5}"/>
+              </a:ext>
+            </a:extLst>
+          </p:cNvPr>
+          <p:cNvGrpSpPr/>
+          <p:nvPr/>
+        </p:nvGrpSpPr>
+        <p:grpSpPr>
+          <a:xfrm>
+            <a:off x="1708317" y="2708750"/>
+            <a:ext cx="10324499" cy="3840570"/>
+            <a:chOff x="1708317" y="2708750"/>
+            <a:chExt cx="10324499" cy="3840570"/>
+          </a:xfrm>
+        </p:grpSpPr>
+        <p:grpSp>
+          <p:nvGrpSpPr>
+            <p:cNvPr id="11" name="Group 10">
+              <a:extLst>
+                <a:ext uri="{FF2B5EF4-FFF2-40B4-BE49-F238E27FC236}">
+                  <a16:creationId xmlns:a16="http://schemas.microsoft.com/office/drawing/2014/main" id="{FB53CE36-1D6F-B3BF-3ABE-1A8C9290056B}"/>
+                </a:ext>
+              </a:extLst>
+            </p:cNvPr>
+            <p:cNvGrpSpPr/>
+            <p:nvPr/>
+          </p:nvGrpSpPr>
+          <p:grpSpPr>
+            <a:xfrm>
+              <a:off x="1708317" y="2708750"/>
+              <a:ext cx="10324499" cy="3840570"/>
+              <a:chOff x="1708317" y="2708750"/>
+              <a:chExt cx="10324499" cy="3840570"/>
+            </a:xfrm>
+          </p:grpSpPr>
+          <p:sp>
+            <p:nvSpPr>
+              <p:cNvPr id="6" name="TextBox 5">
+                <a:extLst>
+                  <a:ext uri="{FF2B5EF4-FFF2-40B4-BE49-F238E27FC236}">
+                    <a16:creationId xmlns:a16="http://schemas.microsoft.com/office/drawing/2014/main" id="{20EE9B38-05B6-2ADE-7851-8D6C92DA9FEB}"/>
+                  </a:ext>
+                </a:extLst>
+              </p:cNvPr>
+              <p:cNvSpPr txBox="1"/>
+              <p:nvPr/>
+            </p:nvSpPr>
+            <p:spPr>
+              <a:xfrm>
+                <a:off x="1712644" y="5515883"/>
+                <a:ext cx="506870" cy="584775"/>
+              </a:xfrm>
+              <a:prstGeom prst="rect">
+                <a:avLst/>
+              </a:prstGeom>
+              <a:noFill/>
+            </p:spPr>
+            <p:txBody>
+              <a:bodyPr wrap="none" rtlCol="0">
+                <a:spAutoFit/>
+              </a:bodyPr>
+              <a:lstStyle/>
+              <a:p>
+                <a:r>
+                  <a:rPr lang="en-NL" sz="3200" b="1" dirty="0">
+                    <a:solidFill>
+                      <a:srgbClr val="00B050"/>
+                    </a:solidFill>
+                    <a:sym typeface="Wingdings" panose="05000000000000000000" pitchFamily="2" charset="2"/>
+                  </a:rPr>
+                  <a:t></a:t>
+                </a:r>
+                <a:endParaRPr lang="en-NL" sz="3200" b="1" dirty="0">
+                  <a:solidFill>
+                    <a:srgbClr val="00B050"/>
+                  </a:solidFill>
+                </a:endParaRPr>
+              </a:p>
+            </p:txBody>
+          </p:sp>
+          <p:sp>
+            <p:nvSpPr>
+              <p:cNvPr id="35" name="TextBox 34">
+                <a:extLst>
+                  <a:ext uri="{FF2B5EF4-FFF2-40B4-BE49-F238E27FC236}">
+                    <a16:creationId xmlns:a16="http://schemas.microsoft.com/office/drawing/2014/main" id="{63FB9BDF-60A7-5237-8E87-EE427F21B96C}"/>
+                  </a:ext>
+                </a:extLst>
+              </p:cNvPr>
+              <p:cNvSpPr txBox="1"/>
+              <p:nvPr/>
+            </p:nvSpPr>
+            <p:spPr>
+              <a:xfrm>
+                <a:off x="11525946" y="2708750"/>
+                <a:ext cx="506870" cy="584775"/>
+              </a:xfrm>
+              <a:prstGeom prst="rect">
+                <a:avLst/>
+              </a:prstGeom>
+              <a:noFill/>
+            </p:spPr>
+            <p:txBody>
+              <a:bodyPr wrap="none" rtlCol="0">
+                <a:spAutoFit/>
+              </a:bodyPr>
+              <a:lstStyle/>
+              <a:p>
+                <a:r>
+                  <a:rPr lang="en-NL" sz="3200" b="1" dirty="0">
+                    <a:solidFill>
+                      <a:srgbClr val="00B050"/>
+                    </a:solidFill>
+                    <a:sym typeface="Wingdings" panose="05000000000000000000" pitchFamily="2" charset="2"/>
+                  </a:rPr>
+                  <a:t></a:t>
+                </a:r>
+                <a:endParaRPr lang="en-NL" sz="3200" b="1" dirty="0">
+                  <a:solidFill>
+                    <a:srgbClr val="00B050"/>
+                  </a:solidFill>
+                </a:endParaRPr>
+              </a:p>
+            </p:txBody>
+          </p:sp>
+          <p:sp>
+            <p:nvSpPr>
+              <p:cNvPr id="36" name="TextBox 35">
+                <a:extLst>
+                  <a:ext uri="{FF2B5EF4-FFF2-40B4-BE49-F238E27FC236}">
+                    <a16:creationId xmlns:a16="http://schemas.microsoft.com/office/drawing/2014/main" id="{90D73178-8C15-8D17-448C-C12295A44CA6}"/>
+                  </a:ext>
+                </a:extLst>
+              </p:cNvPr>
+              <p:cNvSpPr txBox="1"/>
+              <p:nvPr/>
+            </p:nvSpPr>
+            <p:spPr>
+              <a:xfrm>
+                <a:off x="11525946" y="3975026"/>
+                <a:ext cx="506870" cy="584775"/>
+              </a:xfrm>
+              <a:prstGeom prst="rect">
+                <a:avLst/>
+              </a:prstGeom>
+              <a:noFill/>
+            </p:spPr>
+            <p:txBody>
+              <a:bodyPr wrap="none" rtlCol="0">
+                <a:spAutoFit/>
+              </a:bodyPr>
+              <a:lstStyle/>
+              <a:p>
+                <a:r>
+                  <a:rPr lang="en-NL" sz="3200" b="1" dirty="0">
+                    <a:solidFill>
+                      <a:srgbClr val="00B050"/>
+                    </a:solidFill>
+                    <a:sym typeface="Wingdings" panose="05000000000000000000" pitchFamily="2" charset="2"/>
+                  </a:rPr>
+                  <a:t></a:t>
+                </a:r>
+                <a:endParaRPr lang="en-NL" sz="3200" b="1" dirty="0">
+                  <a:solidFill>
+                    <a:srgbClr val="00B050"/>
+                  </a:solidFill>
+                </a:endParaRPr>
+              </a:p>
+            </p:txBody>
+          </p:sp>
+          <p:sp>
+            <p:nvSpPr>
+              <p:cNvPr id="37" name="TextBox 36">
+                <a:extLst>
+                  <a:ext uri="{FF2B5EF4-FFF2-40B4-BE49-F238E27FC236}">
+                    <a16:creationId xmlns:a16="http://schemas.microsoft.com/office/drawing/2014/main" id="{3FE55AF5-57B3-7546-F153-2798CD8F8D15}"/>
+                  </a:ext>
+                </a:extLst>
+              </p:cNvPr>
+              <p:cNvSpPr txBox="1"/>
+              <p:nvPr/>
+            </p:nvSpPr>
+            <p:spPr>
+              <a:xfrm>
+                <a:off x="11525946" y="4301683"/>
+                <a:ext cx="506870" cy="584775"/>
+              </a:xfrm>
+              <a:prstGeom prst="rect">
+                <a:avLst/>
+              </a:prstGeom>
+              <a:noFill/>
+            </p:spPr>
+            <p:txBody>
+              <a:bodyPr wrap="none" rtlCol="0">
+                <a:spAutoFit/>
+              </a:bodyPr>
+              <a:lstStyle/>
+              <a:p>
+                <a:r>
+                  <a:rPr lang="en-NL" sz="3200" b="1" dirty="0">
+                    <a:solidFill>
+                      <a:srgbClr val="00B050"/>
+                    </a:solidFill>
+                    <a:sym typeface="Wingdings" panose="05000000000000000000" pitchFamily="2" charset="2"/>
+                  </a:rPr>
+                  <a:t></a:t>
+                </a:r>
+                <a:endParaRPr lang="en-NL" sz="3200" b="1" dirty="0">
+                  <a:solidFill>
+                    <a:srgbClr val="00B050"/>
+                  </a:solidFill>
+                </a:endParaRPr>
+              </a:p>
+            </p:txBody>
+          </p:sp>
+          <p:sp>
+            <p:nvSpPr>
+              <p:cNvPr id="38" name="TextBox 37">
+                <a:extLst>
+                  <a:ext uri="{FF2B5EF4-FFF2-40B4-BE49-F238E27FC236}">
+                    <a16:creationId xmlns:a16="http://schemas.microsoft.com/office/drawing/2014/main" id="{61469D7F-0FB2-C985-5364-FCC245D66016}"/>
+                  </a:ext>
+                </a:extLst>
+              </p:cNvPr>
+              <p:cNvSpPr txBox="1"/>
+              <p:nvPr/>
+            </p:nvSpPr>
+            <p:spPr>
+              <a:xfrm>
+                <a:off x="6963179" y="5382561"/>
+                <a:ext cx="506870" cy="584775"/>
+              </a:xfrm>
+              <a:prstGeom prst="rect">
+                <a:avLst/>
+              </a:prstGeom>
+              <a:noFill/>
+            </p:spPr>
+            <p:txBody>
+              <a:bodyPr wrap="none" rtlCol="0">
+                <a:spAutoFit/>
+              </a:bodyPr>
+              <a:lstStyle/>
+              <a:p>
+                <a:r>
+                  <a:rPr lang="en-NL" sz="3200" b="1" dirty="0">
+                    <a:solidFill>
+                      <a:srgbClr val="00B050"/>
+                    </a:solidFill>
+                    <a:sym typeface="Wingdings" panose="05000000000000000000" pitchFamily="2" charset="2"/>
+                  </a:rPr>
+                  <a:t></a:t>
+                </a:r>
+                <a:endParaRPr lang="en-NL" sz="3200" b="1" dirty="0">
+                  <a:solidFill>
+                    <a:srgbClr val="00B050"/>
+                  </a:solidFill>
+                </a:endParaRPr>
+              </a:p>
+            </p:txBody>
+          </p:sp>
+          <p:sp>
+            <p:nvSpPr>
+              <p:cNvPr id="39" name="TextBox 38">
+                <a:extLst>
+                  <a:ext uri="{FF2B5EF4-FFF2-40B4-BE49-F238E27FC236}">
+                    <a16:creationId xmlns:a16="http://schemas.microsoft.com/office/drawing/2014/main" id="{B3918BD0-4D3F-538F-7CED-7729B3DCAFEE}"/>
+                  </a:ext>
+                </a:extLst>
+              </p:cNvPr>
+              <p:cNvSpPr txBox="1"/>
+              <p:nvPr/>
+            </p:nvSpPr>
+            <p:spPr>
+              <a:xfrm>
+                <a:off x="8286565" y="5382561"/>
+                <a:ext cx="506870" cy="584775"/>
+              </a:xfrm>
+              <a:prstGeom prst="rect">
+                <a:avLst/>
+              </a:prstGeom>
+              <a:noFill/>
+            </p:spPr>
+            <p:txBody>
+              <a:bodyPr wrap="none" rtlCol="0">
+                <a:spAutoFit/>
+              </a:bodyPr>
+              <a:lstStyle/>
+              <a:p>
+                <a:r>
+                  <a:rPr lang="en-NL" sz="3200" b="1" dirty="0">
+                    <a:ln w="19050">
+                      <a:solidFill>
+                        <a:srgbClr val="00B050"/>
+                      </a:solidFill>
+                    </a:ln>
+                    <a:solidFill>
+                      <a:schemeClr val="bg1"/>
+                    </a:solidFill>
+                    <a:sym typeface="Wingdings" panose="05000000000000000000" pitchFamily="2" charset="2"/>
+                  </a:rPr>
+                  <a:t></a:t>
+                </a:r>
+                <a:endParaRPr lang="en-NL" sz="3200" b="1" dirty="0">
+                  <a:ln w="19050">
+                    <a:solidFill>
+                      <a:srgbClr val="00B050"/>
+                    </a:solidFill>
+                  </a:ln>
+                  <a:solidFill>
+                    <a:schemeClr val="bg1"/>
+                  </a:solidFill>
+                </a:endParaRPr>
+              </a:p>
+            </p:txBody>
+          </p:sp>
+          <p:sp>
+            <p:nvSpPr>
+              <p:cNvPr id="40" name="TextBox 39">
+                <a:extLst>
+                  <a:ext uri="{FF2B5EF4-FFF2-40B4-BE49-F238E27FC236}">
+                    <a16:creationId xmlns:a16="http://schemas.microsoft.com/office/drawing/2014/main" id="{231989F2-255E-D1FB-AAA0-99D7A8A7CA1A}"/>
+                  </a:ext>
+                </a:extLst>
+              </p:cNvPr>
+              <p:cNvSpPr txBox="1"/>
+              <p:nvPr/>
+            </p:nvSpPr>
+            <p:spPr>
+              <a:xfrm>
+                <a:off x="1708317" y="5964545"/>
+                <a:ext cx="506870" cy="584775"/>
+              </a:xfrm>
+              <a:prstGeom prst="rect">
+                <a:avLst/>
+              </a:prstGeom>
+              <a:noFill/>
+              <a:ln>
+                <a:noFill/>
+                <a:prstDash val="dash"/>
+              </a:ln>
+            </p:spPr>
+            <p:txBody>
+              <a:bodyPr wrap="none" rtlCol="0">
+                <a:spAutoFit/>
+              </a:bodyPr>
+              <a:lstStyle/>
+              <a:p>
+                <a:r>
+                  <a:rPr lang="en-NL" sz="3200" b="1" dirty="0">
+                    <a:ln w="19050">
+                      <a:solidFill>
+                        <a:srgbClr val="00B050"/>
+                      </a:solidFill>
+                      <a:prstDash val="sysDot"/>
+                    </a:ln>
+                    <a:solidFill>
+                      <a:schemeClr val="bg1"/>
+                    </a:solidFill>
+                    <a:sym typeface="Wingdings" panose="05000000000000000000" pitchFamily="2" charset="2"/>
+                  </a:rPr>
+                  <a:t></a:t>
+                </a:r>
+                <a:endParaRPr lang="en-NL" sz="3200" b="1" dirty="0">
+                  <a:ln w="19050">
+                    <a:solidFill>
+                      <a:srgbClr val="00B050"/>
+                    </a:solidFill>
+                    <a:prstDash val="sysDot"/>
+                  </a:ln>
+                  <a:solidFill>
+                    <a:schemeClr val="bg1"/>
+                  </a:solidFill>
+                </a:endParaRPr>
+              </a:p>
+            </p:txBody>
+          </p:sp>
+        </p:grpSp>
+        <p:sp>
+          <p:nvSpPr>
+            <p:cNvPr id="10" name="TextBox 9">
+              <a:extLst>
+                <a:ext uri="{FF2B5EF4-FFF2-40B4-BE49-F238E27FC236}">
+                  <a16:creationId xmlns:a16="http://schemas.microsoft.com/office/drawing/2014/main" id="{606327B0-AED6-D187-F61D-F0061C1CFEAE}"/>
+                </a:ext>
+              </a:extLst>
+            </p:cNvPr>
+            <p:cNvSpPr txBox="1"/>
+            <p:nvPr/>
+          </p:nvSpPr>
+          <p:spPr>
+            <a:xfrm>
+              <a:off x="7985908" y="5739919"/>
+              <a:ext cx="506870" cy="584775"/>
+            </a:xfrm>
+            <a:prstGeom prst="rect">
+              <a:avLst/>
+            </a:prstGeom>
+            <a:noFill/>
+          </p:spPr>
+          <p:txBody>
+            <a:bodyPr wrap="none" rtlCol="0">
+              <a:spAutoFit/>
+            </a:bodyPr>
+            <a:lstStyle/>
+            <a:p>
+              <a:r>
+                <a:rPr lang="en-NL" sz="3200" b="1" dirty="0">
+                  <a:solidFill>
+                    <a:srgbClr val="00B050"/>
+                  </a:solidFill>
+                  <a:sym typeface="Wingdings" panose="05000000000000000000" pitchFamily="2" charset="2"/>
+                </a:rPr>
+                <a:t></a:t>
+              </a:r>
+              <a:endParaRPr lang="en-NL" sz="3200" b="1" dirty="0">
+                <a:solidFill>
+                  <a:srgbClr val="00B050"/>
+                </a:solidFill>
+              </a:endParaRPr>
+            </a:p>
+          </p:txBody>
+        </p:sp>
+      </p:grpSp>
     </p:spTree>
     <p:extLst>
       <p:ext uri="{BB962C8B-B14F-4D97-AF65-F5344CB8AC3E}">
@@ -41601,7 +41742,7 @@
                                           </p:stCondLst>
                                         </p:cTn>
                                         <p:tgtEl>
-                                          <p:spTgt spid="8"/>
+                                          <p:spTgt spid="13"/>
                                         </p:tgtEl>
                                         <p:attrNameLst>
                                           <p:attrName>style.visibility</p:attrName>
@@ -42585,6 +42726,19 @@
             <a:endParaRPr lang="en-US" dirty="0"/>
           </a:p>
           <a:p>
+            <a:pPr lvl="1"/>
+            <a:r>
+              <a:rPr lang="en-US" dirty="0">
+                <a:hlinkClick r:id="rId2"/>
+              </a:rPr>
+              <a:t>https://www.typefox.io/blog/lionweb-langium/</a:t>
+            </a:r>
+            <a:r>
+              <a:rPr lang="en-US" dirty="0"/>
+              <a:t> </a:t>
+            </a:r>
+          </a:p>
+          <a:p>
             <a:r>
               <a:rPr lang="en-US" dirty="0" err="1"/>
               <a:t>TypeFox</a:t>
@@ -42616,10 +42770,10 @@
           <p:nvPr/>
         </p:nvPicPr>
         <p:blipFill>
-          <a:blip r:embed="rId2">
+          <a:blip r:embed="rId3">
             <a:extLst>
               <a:ext uri="{96DAC541-7B7A-43D3-8B79-37D633B846F1}">
-                <asvg:svgBlip xmlns:asvg="http://schemas.microsoft.com/office/drawing/2016/SVG/main" r:embed="rId3"/>
+                <asvg:svgBlip xmlns:asvg="http://schemas.microsoft.com/office/drawing/2016/SVG/main" r:embed="rId4"/>
               </a:ext>
             </a:extLst>
           </a:blip>

</xml_diff>

<commit_message>
removed "Meinte" from Spoofax interested party
</commit_message>
<xml_diff>
--- a/resources/LangDev 2024 Talk.pptx
+++ b/resources/LangDev 2024 Talk.pptx
@@ -14188,7 +14188,7 @@
           <a:p>
             <a:fld id="{A83D55DB-2215-1E4A-893A-2A5EF07198DE}" type="datetimeFigureOut">
               <a:rPr lang="en-NL" smtClean="0"/>
-              <a:t>17/10/2024</a:t>
+              <a:t>21/10/2024</a:t>
             </a:fld>
             <a:endParaRPr lang="en-NL"/>
           </a:p>
@@ -14690,7 +14690,7 @@
           <a:p>
             <a:fld id="{4B15492D-6F0F-2E4F-9FB6-8AD2245E2E8C}" type="datetimeFigureOut">
               <a:rPr lang="en-NL" smtClean="0"/>
-              <a:t>17/10/2024</a:t>
+              <a:t>21/10/2024</a:t>
             </a:fld>
             <a:endParaRPr lang="en-NL"/>
           </a:p>
@@ -14984,7 +14984,7 @@
           <a:p>
             <a:fld id="{4B15492D-6F0F-2E4F-9FB6-8AD2245E2E8C}" type="datetimeFigureOut">
               <a:rPr lang="en-NL" smtClean="0"/>
-              <a:t>17/10/2024</a:t>
+              <a:t>21/10/2024</a:t>
             </a:fld>
             <a:endParaRPr lang="en-NL"/>
           </a:p>
@@ -15468,7 +15468,7 @@
           <a:p>
             <a:fld id="{4B15492D-6F0F-2E4F-9FB6-8AD2245E2E8C}" type="datetimeFigureOut">
               <a:rPr lang="en-NL" smtClean="0"/>
-              <a:t>17/10/2024</a:t>
+              <a:t>21/10/2024</a:t>
             </a:fld>
             <a:endParaRPr lang="en-NL"/>
           </a:p>
@@ -15806,7 +15806,7 @@
           <a:p>
             <a:fld id="{4B15492D-6F0F-2E4F-9FB6-8AD2245E2E8C}" type="datetimeFigureOut">
               <a:rPr lang="en-NL" smtClean="0"/>
-              <a:t>17/10/2024</a:t>
+              <a:t>21/10/2024</a:t>
             </a:fld>
             <a:endParaRPr lang="en-NL"/>
           </a:p>
@@ -16120,7 +16120,7 @@
           <a:p>
             <a:fld id="{4B15492D-6F0F-2E4F-9FB6-8AD2245E2E8C}" type="datetimeFigureOut">
               <a:rPr lang="en-NL" smtClean="0"/>
-              <a:t>17/10/2024</a:t>
+              <a:t>21/10/2024</a:t>
             </a:fld>
             <a:endParaRPr lang="en-NL"/>
           </a:p>
@@ -16298,7 +16298,7 @@
           <a:p>
             <a:fld id="{4B15492D-6F0F-2E4F-9FB6-8AD2245E2E8C}" type="datetimeFigureOut">
               <a:rPr lang="en-NL" smtClean="0"/>
-              <a:t>17/10/2024</a:t>
+              <a:t>21/10/2024</a:t>
             </a:fld>
             <a:endParaRPr lang="en-NL"/>
           </a:p>
@@ -16447,7 +16447,7 @@
           <a:p>
             <a:fld id="{4B15492D-6F0F-2E4F-9FB6-8AD2245E2E8C}" type="datetimeFigureOut">
               <a:rPr lang="en-NL" smtClean="0"/>
-              <a:t>17/10/2024</a:t>
+              <a:t>21/10/2024</a:t>
             </a:fld>
             <a:endParaRPr lang="en-NL"/>
           </a:p>
@@ -16760,7 +16760,7 @@
           <a:p>
             <a:fld id="{4B15492D-6F0F-2E4F-9FB6-8AD2245E2E8C}" type="datetimeFigureOut">
               <a:rPr lang="en-NL" smtClean="0"/>
-              <a:t>17/10/2024</a:t>
+              <a:t>21/10/2024</a:t>
             </a:fld>
             <a:endParaRPr lang="en-NL"/>
           </a:p>
@@ -17053,7 +17053,7 @@
           <a:p>
             <a:fld id="{4B15492D-6F0F-2E4F-9FB6-8AD2245E2E8C}" type="datetimeFigureOut">
               <a:rPr lang="en-NL" smtClean="0"/>
-              <a:t>17/10/2024</a:t>
+              <a:t>21/10/2024</a:t>
             </a:fld>
             <a:endParaRPr lang="en-NL"/>
           </a:p>
@@ -17253,7 +17253,7 @@
           <a:p>
             <a:fld id="{4B15492D-6F0F-2E4F-9FB6-8AD2245E2E8C}" type="datetimeFigureOut">
               <a:rPr lang="en-NL" smtClean="0"/>
-              <a:t>17/10/2024</a:t>
+              <a:t>21/10/2024</a:t>
             </a:fld>
             <a:endParaRPr lang="en-NL"/>
           </a:p>
@@ -17538,7 +17538,7 @@
             <a:fld id="{4B15492D-6F0F-2E4F-9FB6-8AD2245E2E8C}" type="datetimeFigureOut">
               <a:rPr lang="en-NL" smtClean="0"/>
               <a:pPr/>
-              <a:t>17/10/2024</a:t>
+              <a:t>21/10/2024</a:t>
             </a:fld>
             <a:endParaRPr lang="en-NL" dirty="0"/>
           </a:p>
@@ -42700,14 +42700,6 @@
               <a:rPr lang="en-US" dirty="0" err="1"/>
               <a:t>Spoofax</a:t>
             </a:r>
-            <a:r>
-              <a:rPr lang="en-US" dirty="0"/>
-              <a:t> - </a:t>
-            </a:r>
-            <a:r>
-              <a:rPr lang="en-US" dirty="0" err="1"/>
-              <a:t>Meinte</a:t>
-            </a:r>
             <a:endParaRPr lang="en-US" dirty="0"/>
           </a:p>
           <a:p>

</xml_diff>